<commit_message>
Aula 06 IoT Python AVA 11042023
</commit_message>
<xml_diff>
--- a/01 Classes/Aula 06 - Aplicação Cloud Indústria 40 Python IoT Plataforma Raspberry PI.pptx
+++ b/01 Classes/Aula 06 - Aplicação Cloud Indústria 40 Python IoT Plataforma Raspberry PI.pptx
@@ -5,7 +5,7 @@
     <p:sldMasterId id="2147483648" r:id="rId1"/>
   </p:sldMasterIdLst>
   <p:notesMasterIdLst>
-    <p:notesMasterId r:id="rId24"/>
+    <p:notesMasterId r:id="rId29"/>
   </p:notesMasterIdLst>
   <p:sldIdLst>
     <p:sldId id="383" r:id="rId2"/>
@@ -25,11 +25,16 @@
     <p:sldId id="364" r:id="rId16"/>
     <p:sldId id="376" r:id="rId17"/>
     <p:sldId id="377" r:id="rId18"/>
-    <p:sldId id="333" r:id="rId19"/>
-    <p:sldId id="323" r:id="rId20"/>
-    <p:sldId id="334" r:id="rId21"/>
-    <p:sldId id="337" r:id="rId22"/>
-    <p:sldId id="385" r:id="rId23"/>
+    <p:sldId id="386" r:id="rId19"/>
+    <p:sldId id="387" r:id="rId20"/>
+    <p:sldId id="388" r:id="rId21"/>
+    <p:sldId id="389" r:id="rId22"/>
+    <p:sldId id="390" r:id="rId23"/>
+    <p:sldId id="333" r:id="rId24"/>
+    <p:sldId id="323" r:id="rId25"/>
+    <p:sldId id="334" r:id="rId26"/>
+    <p:sldId id="337" r:id="rId27"/>
+    <p:sldId id="385" r:id="rId28"/>
   </p:sldIdLst>
   <p:sldSz cx="9144000" cy="5143500" type="screen16x9"/>
   <p:notesSz cx="6858000" cy="9144000"/>
@@ -1094,7 +1099,7 @@
     </p:spTree>
     <p:extLst>
       <p:ext uri="{BB962C8B-B14F-4D97-AF65-F5344CB8AC3E}">
-        <p14:creationId xmlns:p14="http://schemas.microsoft.com/office/powerpoint/2010/main" val="585304384"/>
+        <p14:creationId xmlns:p14="http://schemas.microsoft.com/office/powerpoint/2010/main" val="119661871"/>
       </p:ext>
     </p:extLst>
   </p:cSld>
@@ -1160,7 +1165,7 @@
     </p:spTree>
     <p:extLst>
       <p:ext uri="{BB962C8B-B14F-4D97-AF65-F5344CB8AC3E}">
-        <p14:creationId xmlns:p14="http://schemas.microsoft.com/office/powerpoint/2010/main" val="2709569597"/>
+        <p14:creationId xmlns:p14="http://schemas.microsoft.com/office/powerpoint/2010/main" val="3351834299"/>
       </p:ext>
     </p:extLst>
   </p:cSld>
@@ -1226,7 +1231,7 @@
     </p:spTree>
     <p:extLst>
       <p:ext uri="{BB962C8B-B14F-4D97-AF65-F5344CB8AC3E}">
-        <p14:creationId xmlns:p14="http://schemas.microsoft.com/office/powerpoint/2010/main" val="2296249050"/>
+        <p14:creationId xmlns:p14="http://schemas.microsoft.com/office/powerpoint/2010/main" val="470989309"/>
       </p:ext>
     </p:extLst>
   </p:cSld>
@@ -1303,6 +1308,336 @@
 </file>
 
 <file path=ppt/notesSlides/notesSlide20.xml><?xml version="1.0" encoding="utf-8"?>
+<p:notes xmlns:a="http://schemas.openxmlformats.org/drawingml/2006/main" xmlns:r="http://schemas.openxmlformats.org/officeDocument/2006/relationships" xmlns:p="http://schemas.openxmlformats.org/presentationml/2006/main">
+  <p:cSld>
+    <p:spTree>
+      <p:nvGrpSpPr>
+        <p:cNvPr id="1" name=""/>
+        <p:cNvGrpSpPr/>
+        <p:nvPr/>
+      </p:nvGrpSpPr>
+      <p:grpSpPr>
+        <a:xfrm>
+          <a:off x="0" y="0"/>
+          <a:ext cx="0" cy="0"/>
+          <a:chOff x="0" y="0"/>
+          <a:chExt cx="0" cy="0"/>
+        </a:xfrm>
+      </p:grpSpPr>
+      <p:sp>
+        <p:nvSpPr>
+          <p:cNvPr id="2" name="Espaço Reservado para Imagem de Slide 1"/>
+          <p:cNvSpPr>
+            <a:spLocks noGrp="1" noRot="1" noChangeAspect="1"/>
+          </p:cNvSpPr>
+          <p:nvPr>
+            <p:ph type="sldImg"/>
+          </p:nvPr>
+        </p:nvSpPr>
+        <p:spPr>
+          <a:xfrm>
+            <a:off x="381000" y="685800"/>
+            <a:ext cx="6096000" cy="3429000"/>
+          </a:xfrm>
+        </p:spPr>
+      </p:sp>
+      <p:sp>
+        <p:nvSpPr>
+          <p:cNvPr id="3" name="Espaço Reservado para Anotações 2"/>
+          <p:cNvSpPr>
+            <a:spLocks noGrp="1"/>
+          </p:cNvSpPr>
+          <p:nvPr>
+            <p:ph type="body" idx="1"/>
+          </p:nvPr>
+        </p:nvSpPr>
+        <p:spPr/>
+        <p:txBody>
+          <a:bodyPr/>
+          <a:lstStyle/>
+          <a:p>
+            <a:endParaRPr lang="pt-BR" dirty="0"/>
+          </a:p>
+        </p:txBody>
+      </p:sp>
+    </p:spTree>
+    <p:extLst>
+      <p:ext uri="{BB962C8B-B14F-4D97-AF65-F5344CB8AC3E}">
+        <p14:creationId xmlns:p14="http://schemas.microsoft.com/office/powerpoint/2010/main" val="84197120"/>
+      </p:ext>
+    </p:extLst>
+  </p:cSld>
+  <p:clrMapOvr>
+    <a:masterClrMapping/>
+  </p:clrMapOvr>
+</p:notes>
+</file>
+
+<file path=ppt/notesSlides/notesSlide21.xml><?xml version="1.0" encoding="utf-8"?>
+<p:notes xmlns:a="http://schemas.openxmlformats.org/drawingml/2006/main" xmlns:r="http://schemas.openxmlformats.org/officeDocument/2006/relationships" xmlns:p="http://schemas.openxmlformats.org/presentationml/2006/main">
+  <p:cSld>
+    <p:spTree>
+      <p:nvGrpSpPr>
+        <p:cNvPr id="1" name=""/>
+        <p:cNvGrpSpPr/>
+        <p:nvPr/>
+      </p:nvGrpSpPr>
+      <p:grpSpPr>
+        <a:xfrm>
+          <a:off x="0" y="0"/>
+          <a:ext cx="0" cy="0"/>
+          <a:chOff x="0" y="0"/>
+          <a:chExt cx="0" cy="0"/>
+        </a:xfrm>
+      </p:grpSpPr>
+      <p:sp>
+        <p:nvSpPr>
+          <p:cNvPr id="2" name="Espaço Reservado para Imagem de Slide 1"/>
+          <p:cNvSpPr>
+            <a:spLocks noGrp="1" noRot="1" noChangeAspect="1"/>
+          </p:cNvSpPr>
+          <p:nvPr>
+            <p:ph type="sldImg"/>
+          </p:nvPr>
+        </p:nvSpPr>
+        <p:spPr>
+          <a:xfrm>
+            <a:off x="381000" y="685800"/>
+            <a:ext cx="6096000" cy="3429000"/>
+          </a:xfrm>
+        </p:spPr>
+      </p:sp>
+      <p:sp>
+        <p:nvSpPr>
+          <p:cNvPr id="3" name="Espaço Reservado para Anotações 2"/>
+          <p:cNvSpPr>
+            <a:spLocks noGrp="1"/>
+          </p:cNvSpPr>
+          <p:nvPr>
+            <p:ph type="body" idx="1"/>
+          </p:nvPr>
+        </p:nvSpPr>
+        <p:spPr/>
+        <p:txBody>
+          <a:bodyPr/>
+          <a:lstStyle/>
+          <a:p>
+            <a:endParaRPr lang="pt-BR" dirty="0"/>
+          </a:p>
+        </p:txBody>
+      </p:sp>
+    </p:spTree>
+    <p:extLst>
+      <p:ext uri="{BB962C8B-B14F-4D97-AF65-F5344CB8AC3E}">
+        <p14:creationId xmlns:p14="http://schemas.microsoft.com/office/powerpoint/2010/main" val="1755262018"/>
+      </p:ext>
+    </p:extLst>
+  </p:cSld>
+  <p:clrMapOvr>
+    <a:masterClrMapping/>
+  </p:clrMapOvr>
+</p:notes>
+</file>
+
+<file path=ppt/notesSlides/notesSlide22.xml><?xml version="1.0" encoding="utf-8"?>
+<p:notes xmlns:a="http://schemas.openxmlformats.org/drawingml/2006/main" xmlns:r="http://schemas.openxmlformats.org/officeDocument/2006/relationships" xmlns:p="http://schemas.openxmlformats.org/presentationml/2006/main">
+  <p:cSld>
+    <p:spTree>
+      <p:nvGrpSpPr>
+        <p:cNvPr id="1" name=""/>
+        <p:cNvGrpSpPr/>
+        <p:nvPr/>
+      </p:nvGrpSpPr>
+      <p:grpSpPr>
+        <a:xfrm>
+          <a:off x="0" y="0"/>
+          <a:ext cx="0" cy="0"/>
+          <a:chOff x="0" y="0"/>
+          <a:chExt cx="0" cy="0"/>
+        </a:xfrm>
+      </p:grpSpPr>
+      <p:sp>
+        <p:nvSpPr>
+          <p:cNvPr id="2" name="Espaço Reservado para Imagem de Slide 1"/>
+          <p:cNvSpPr>
+            <a:spLocks noGrp="1" noRot="1" noChangeAspect="1"/>
+          </p:cNvSpPr>
+          <p:nvPr>
+            <p:ph type="sldImg"/>
+          </p:nvPr>
+        </p:nvSpPr>
+        <p:spPr>
+          <a:xfrm>
+            <a:off x="381000" y="685800"/>
+            <a:ext cx="6096000" cy="3429000"/>
+          </a:xfrm>
+        </p:spPr>
+      </p:sp>
+      <p:sp>
+        <p:nvSpPr>
+          <p:cNvPr id="3" name="Espaço Reservado para Anotações 2"/>
+          <p:cNvSpPr>
+            <a:spLocks noGrp="1"/>
+          </p:cNvSpPr>
+          <p:nvPr>
+            <p:ph type="body" idx="1"/>
+          </p:nvPr>
+        </p:nvSpPr>
+        <p:spPr/>
+        <p:txBody>
+          <a:bodyPr/>
+          <a:lstStyle/>
+          <a:p>
+            <a:endParaRPr lang="pt-BR" dirty="0"/>
+          </a:p>
+        </p:txBody>
+      </p:sp>
+    </p:spTree>
+    <p:extLst>
+      <p:ext uri="{BB962C8B-B14F-4D97-AF65-F5344CB8AC3E}">
+        <p14:creationId xmlns:p14="http://schemas.microsoft.com/office/powerpoint/2010/main" val="585304384"/>
+      </p:ext>
+    </p:extLst>
+  </p:cSld>
+  <p:clrMapOvr>
+    <a:masterClrMapping/>
+  </p:clrMapOvr>
+</p:notes>
+</file>
+
+<file path=ppt/notesSlides/notesSlide23.xml><?xml version="1.0" encoding="utf-8"?>
+<p:notes xmlns:a="http://schemas.openxmlformats.org/drawingml/2006/main" xmlns:r="http://schemas.openxmlformats.org/officeDocument/2006/relationships" xmlns:p="http://schemas.openxmlformats.org/presentationml/2006/main">
+  <p:cSld>
+    <p:spTree>
+      <p:nvGrpSpPr>
+        <p:cNvPr id="1" name=""/>
+        <p:cNvGrpSpPr/>
+        <p:nvPr/>
+      </p:nvGrpSpPr>
+      <p:grpSpPr>
+        <a:xfrm>
+          <a:off x="0" y="0"/>
+          <a:ext cx="0" cy="0"/>
+          <a:chOff x="0" y="0"/>
+          <a:chExt cx="0" cy="0"/>
+        </a:xfrm>
+      </p:grpSpPr>
+      <p:sp>
+        <p:nvSpPr>
+          <p:cNvPr id="2" name="Espaço Reservado para Imagem de Slide 1"/>
+          <p:cNvSpPr>
+            <a:spLocks noGrp="1" noRot="1" noChangeAspect="1"/>
+          </p:cNvSpPr>
+          <p:nvPr>
+            <p:ph type="sldImg"/>
+          </p:nvPr>
+        </p:nvSpPr>
+        <p:spPr>
+          <a:xfrm>
+            <a:off x="381000" y="685800"/>
+            <a:ext cx="6096000" cy="3429000"/>
+          </a:xfrm>
+        </p:spPr>
+      </p:sp>
+      <p:sp>
+        <p:nvSpPr>
+          <p:cNvPr id="3" name="Espaço Reservado para Anotações 2"/>
+          <p:cNvSpPr>
+            <a:spLocks noGrp="1"/>
+          </p:cNvSpPr>
+          <p:nvPr>
+            <p:ph type="body" idx="1"/>
+          </p:nvPr>
+        </p:nvSpPr>
+        <p:spPr/>
+        <p:txBody>
+          <a:bodyPr/>
+          <a:lstStyle/>
+          <a:p>
+            <a:endParaRPr lang="pt-BR" dirty="0"/>
+          </a:p>
+        </p:txBody>
+      </p:sp>
+    </p:spTree>
+    <p:extLst>
+      <p:ext uri="{BB962C8B-B14F-4D97-AF65-F5344CB8AC3E}">
+        <p14:creationId xmlns:p14="http://schemas.microsoft.com/office/powerpoint/2010/main" val="2709569597"/>
+      </p:ext>
+    </p:extLst>
+  </p:cSld>
+  <p:clrMapOvr>
+    <a:masterClrMapping/>
+  </p:clrMapOvr>
+</p:notes>
+</file>
+
+<file path=ppt/notesSlides/notesSlide24.xml><?xml version="1.0" encoding="utf-8"?>
+<p:notes xmlns:a="http://schemas.openxmlformats.org/drawingml/2006/main" xmlns:r="http://schemas.openxmlformats.org/officeDocument/2006/relationships" xmlns:p="http://schemas.openxmlformats.org/presentationml/2006/main">
+  <p:cSld>
+    <p:spTree>
+      <p:nvGrpSpPr>
+        <p:cNvPr id="1" name=""/>
+        <p:cNvGrpSpPr/>
+        <p:nvPr/>
+      </p:nvGrpSpPr>
+      <p:grpSpPr>
+        <a:xfrm>
+          <a:off x="0" y="0"/>
+          <a:ext cx="0" cy="0"/>
+          <a:chOff x="0" y="0"/>
+          <a:chExt cx="0" cy="0"/>
+        </a:xfrm>
+      </p:grpSpPr>
+      <p:sp>
+        <p:nvSpPr>
+          <p:cNvPr id="2" name="Espaço Reservado para Imagem de Slide 1"/>
+          <p:cNvSpPr>
+            <a:spLocks noGrp="1" noRot="1" noChangeAspect="1"/>
+          </p:cNvSpPr>
+          <p:nvPr>
+            <p:ph type="sldImg"/>
+          </p:nvPr>
+        </p:nvSpPr>
+        <p:spPr>
+          <a:xfrm>
+            <a:off x="381000" y="685800"/>
+            <a:ext cx="6096000" cy="3429000"/>
+          </a:xfrm>
+        </p:spPr>
+      </p:sp>
+      <p:sp>
+        <p:nvSpPr>
+          <p:cNvPr id="3" name="Espaço Reservado para Anotações 2"/>
+          <p:cNvSpPr>
+            <a:spLocks noGrp="1"/>
+          </p:cNvSpPr>
+          <p:nvPr>
+            <p:ph type="body" idx="1"/>
+          </p:nvPr>
+        </p:nvSpPr>
+        <p:spPr/>
+        <p:txBody>
+          <a:bodyPr/>
+          <a:lstStyle/>
+          <a:p>
+            <a:endParaRPr lang="pt-BR" dirty="0"/>
+          </a:p>
+        </p:txBody>
+      </p:sp>
+    </p:spTree>
+    <p:extLst>
+      <p:ext uri="{BB962C8B-B14F-4D97-AF65-F5344CB8AC3E}">
+        <p14:creationId xmlns:p14="http://schemas.microsoft.com/office/powerpoint/2010/main" val="2296249050"/>
+      </p:ext>
+    </p:extLst>
+  </p:cSld>
+  <p:clrMapOvr>
+    <a:masterClrMapping/>
+  </p:clrMapOvr>
+</p:notes>
+</file>
+
+<file path=ppt/notesSlides/notesSlide25.xml><?xml version="1.0" encoding="utf-8"?>
 <p:notes xmlns:a="http://schemas.openxmlformats.org/drawingml/2006/main" xmlns:r="http://schemas.openxmlformats.org/officeDocument/2006/relationships" xmlns:p="http://schemas.openxmlformats.org/presentationml/2006/main">
   <p:cSld>
     <p:spTree>
@@ -7428,34 +7763,13 @@
           <a:lstStyle/>
           <a:p>
             <a:r>
-              <a:rPr lang="en-US" b="1" dirty="0" err="1">
+              <a:rPr lang="en-US" b="1" dirty="0">
                 <a:solidFill>
                   <a:srgbClr val="0070C0"/>
                 </a:solidFill>
               </a:rPr>
-              <a:t>Leitura</a:t>
-            </a:r>
-            <a:r>
-              <a:rPr lang="en-US" b="1" dirty="0">
-                <a:solidFill>
-                  <a:srgbClr val="0070C0"/>
-                </a:solidFill>
-              </a:rPr>
-              <a:t> </a:t>
-            </a:r>
-            <a:r>
-              <a:rPr lang="en-US" b="1" dirty="0" err="1">
-                <a:solidFill>
-                  <a:srgbClr val="0070C0"/>
-                </a:solidFill>
-              </a:rPr>
-              <a:t>Específica</a:t>
-            </a:r>
-            <a:endParaRPr lang="en-US" b="1" dirty="0">
-              <a:solidFill>
-                <a:srgbClr val="0070C0"/>
-              </a:solidFill>
-            </a:endParaRPr>
+              <a:t>Raspberry Pi Pico ($4)</a:t>
+            </a:r>
           </a:p>
         </p:txBody>
       </p:sp>
@@ -7471,8 +7785,8 @@
         </p:nvSpPr>
         <p:spPr>
           <a:xfrm>
-            <a:off x="142865" y="1053846"/>
-            <a:ext cx="8865056" cy="3969258"/>
+            <a:off x="139472" y="1200150"/>
+            <a:ext cx="8865056" cy="3737370"/>
           </a:xfrm>
         </p:spPr>
         <p:txBody>
@@ -7481,193 +7795,214 @@
           </a:bodyPr>
           <a:lstStyle/>
           <a:p>
-            <a:pPr marL="0" indent="0" algn="just">
-              <a:buNone/>
+            <a:pPr algn="just">
+              <a:buFont typeface="Wingdings" panose="05000000000000000000" pitchFamily="2" charset="2"/>
+              <a:buChar char="§"/>
             </a:pPr>
             <a:r>
-              <a:rPr lang="pt-BR" sz="2000" dirty="0">
-                <a:latin typeface="Times New Roman" panose="02020603050405020304" pitchFamily="18" charset="0"/>
-                <a:cs typeface="Times New Roman" panose="02020603050405020304" pitchFamily="18" charset="0"/>
-              </a:rPr>
-              <a:t>[1] Introdução </a:t>
-            </a:r>
-            <a:r>
-              <a:rPr lang="pt-BR" sz="2000" dirty="0" err="1">
-                <a:latin typeface="Times New Roman" panose="02020603050405020304" pitchFamily="18" charset="0"/>
-                <a:cs typeface="Times New Roman" panose="02020603050405020304" pitchFamily="18" charset="0"/>
-              </a:rPr>
-              <a:t>Raspberry</a:t>
-            </a:r>
-            <a:r>
-              <a:rPr lang="pt-BR" sz="2000" dirty="0">
-                <a:latin typeface="Times New Roman" panose="02020603050405020304" pitchFamily="18" charset="0"/>
-                <a:cs typeface="Times New Roman" panose="02020603050405020304" pitchFamily="18" charset="0"/>
-              </a:rPr>
-              <a:t> Pi.</a:t>
-            </a:r>
-          </a:p>
-          <a:p>
-            <a:pPr marL="0" indent="0" algn="just">
-              <a:buNone/>
+              <a:rPr lang="pt-BR" sz="2400" b="1" dirty="0">
+                <a:latin typeface="Times New Roman" panose="02020603050405020304" pitchFamily="18" charset="0"/>
+                <a:cs typeface="Times New Roman" panose="02020603050405020304" pitchFamily="18" charset="0"/>
+              </a:rPr>
+              <a:t>Microcontrolador RP2040</a:t>
+            </a:r>
+            <a:r>
+              <a:rPr lang="pt-BR" sz="2400" dirty="0">
+                <a:latin typeface="Times New Roman" panose="02020603050405020304" pitchFamily="18" charset="0"/>
+                <a:cs typeface="Times New Roman" panose="02020603050405020304" pitchFamily="18" charset="0"/>
+              </a:rPr>
+              <a:t> (</a:t>
+            </a:r>
+            <a:r>
+              <a:rPr lang="pt-BR" sz="2400" b="1" dirty="0" err="1">
+                <a:solidFill>
+                  <a:srgbClr val="FF0000"/>
+                </a:solidFill>
+                <a:latin typeface="Times New Roman" panose="02020603050405020304" pitchFamily="18" charset="0"/>
+                <a:cs typeface="Times New Roman" panose="02020603050405020304" pitchFamily="18" charset="0"/>
+              </a:rPr>
+              <a:t>SoC</a:t>
+            </a:r>
+            <a:r>
+              <a:rPr lang="pt-BR" sz="2400" dirty="0">
+                <a:latin typeface="Times New Roman" panose="02020603050405020304" pitchFamily="18" charset="0"/>
+                <a:cs typeface="Times New Roman" panose="02020603050405020304" pitchFamily="18" charset="0"/>
+              </a:rPr>
+              <a:t>)</a:t>
+            </a:r>
+          </a:p>
+          <a:p>
+            <a:pPr algn="just">
+              <a:buFont typeface="Wingdings" panose="05000000000000000000" pitchFamily="2" charset="2"/>
+              <a:buChar char="§"/>
             </a:pPr>
             <a:r>
-              <a:rPr lang="pt-BR" sz="2000" b="1" dirty="0">
+              <a:rPr lang="pt-BR" sz="2400" dirty="0">
+                <a:latin typeface="Times New Roman" panose="02020603050405020304" pitchFamily="18" charset="0"/>
+                <a:cs typeface="Times New Roman" panose="02020603050405020304" pitchFamily="18" charset="0"/>
+              </a:rPr>
+              <a:t>Dual-core Cortex-M0+</a:t>
+            </a:r>
+          </a:p>
+          <a:p>
+            <a:pPr algn="just">
+              <a:buFont typeface="Wingdings" panose="05000000000000000000" pitchFamily="2" charset="2"/>
+              <a:buChar char="§"/>
+            </a:pPr>
+            <a:r>
+              <a:rPr lang="pt-BR" sz="2400" dirty="0">
+                <a:latin typeface="Times New Roman" panose="02020603050405020304" pitchFamily="18" charset="0"/>
+                <a:cs typeface="Times New Roman" panose="02020603050405020304" pitchFamily="18" charset="0"/>
+              </a:rPr>
+              <a:t>23 </a:t>
+            </a:r>
+            <a:r>
+              <a:rPr lang="pt-BR" sz="2400" dirty="0" err="1">
+                <a:latin typeface="Times New Roman" panose="02020603050405020304" pitchFamily="18" charset="0"/>
+                <a:cs typeface="Times New Roman" panose="02020603050405020304" pitchFamily="18" charset="0"/>
+              </a:rPr>
+              <a:t>GPIOs</a:t>
+            </a:r>
+            <a:r>
+              <a:rPr lang="pt-BR" sz="2400" dirty="0">
+                <a:latin typeface="Times New Roman" panose="02020603050405020304" pitchFamily="18" charset="0"/>
+                <a:cs typeface="Times New Roman" panose="02020603050405020304" pitchFamily="18" charset="0"/>
+              </a:rPr>
+              <a:t> (</a:t>
+            </a:r>
+            <a:r>
+              <a:rPr lang="pt-BR" sz="2400" b="1" dirty="0">
                 <a:solidFill>
                   <a:srgbClr val="FF0000"/>
                 </a:solidFill>
                 <a:latin typeface="Times New Roman" panose="02020603050405020304" pitchFamily="18" charset="0"/>
                 <a:cs typeface="Times New Roman" panose="02020603050405020304" pitchFamily="18" charset="0"/>
               </a:rPr>
-              <a:t>Disponível em: </a:t>
-            </a:r>
-            <a:r>
-              <a:rPr lang="pt-BR" sz="2000" dirty="0">
-                <a:latin typeface="Times New Roman" panose="02020603050405020304" pitchFamily="18" charset="0"/>
-                <a:cs typeface="Times New Roman" panose="02020603050405020304" pitchFamily="18" charset="0"/>
-                <a:hlinkClick r:id="rId3"/>
-              </a:rPr>
-              <a:t>https://www.tecnoveste.com.br/raspberry-pi-o-que-e-para-que-serve-e-como-funciona/</a:t>
-            </a:r>
-            <a:endParaRPr lang="pt-BR" sz="2000" dirty="0">
-              <a:latin typeface="Times New Roman" panose="02020603050405020304" pitchFamily="18" charset="0"/>
-              <a:cs typeface="Times New Roman" panose="02020603050405020304" pitchFamily="18" charset="0"/>
-            </a:endParaRPr>
-          </a:p>
-          <a:p>
-            <a:pPr marL="0" indent="0" algn="just">
-              <a:buNone/>
+              <a:t>sem os pinos</a:t>
+            </a:r>
+            <a:r>
+              <a:rPr lang="pt-BR" sz="2400" dirty="0">
+                <a:latin typeface="Times New Roman" panose="02020603050405020304" pitchFamily="18" charset="0"/>
+                <a:cs typeface="Times New Roman" panose="02020603050405020304" pitchFamily="18" charset="0"/>
+              </a:rPr>
+              <a:t>)</a:t>
+            </a:r>
+          </a:p>
+          <a:p>
+            <a:pPr algn="just">
+              <a:buFont typeface="Wingdings" panose="05000000000000000000" pitchFamily="2" charset="2"/>
+              <a:buChar char="§"/>
             </a:pPr>
-            <a:endParaRPr lang="pt-BR" sz="2000" dirty="0">
-              <a:latin typeface="Times New Roman" panose="02020603050405020304" pitchFamily="18" charset="0"/>
-              <a:cs typeface="Times New Roman" panose="02020603050405020304" pitchFamily="18" charset="0"/>
-            </a:endParaRPr>
-          </a:p>
-          <a:p>
-            <a:pPr marL="0" indent="0" algn="just">
-              <a:buNone/>
+            <a:r>
+              <a:rPr lang="pt-BR" sz="2400" dirty="0">
+                <a:latin typeface="Times New Roman" panose="02020603050405020304" pitchFamily="18" charset="0"/>
+                <a:cs typeface="Times New Roman" panose="02020603050405020304" pitchFamily="18" charset="0"/>
+              </a:rPr>
+              <a:t>2MB Flash</a:t>
+            </a:r>
+          </a:p>
+          <a:p>
+            <a:pPr algn="just">
+              <a:buFont typeface="Wingdings" panose="05000000000000000000" pitchFamily="2" charset="2"/>
+              <a:buChar char="§"/>
             </a:pPr>
             <a:r>
-              <a:rPr lang="pt-BR" sz="2000" dirty="0">
-                <a:latin typeface="Times New Roman" panose="02020603050405020304" pitchFamily="18" charset="0"/>
-                <a:cs typeface="Times New Roman" panose="02020603050405020304" pitchFamily="18" charset="0"/>
-              </a:rPr>
-              <a:t>[2] Site </a:t>
-            </a:r>
-            <a:r>
-              <a:rPr lang="pt-BR" sz="2000" dirty="0" err="1">
-                <a:latin typeface="Times New Roman" panose="02020603050405020304" pitchFamily="18" charset="0"/>
-                <a:cs typeface="Times New Roman" panose="02020603050405020304" pitchFamily="18" charset="0"/>
-              </a:rPr>
-              <a:t>Raspberry</a:t>
-            </a:r>
-            <a:r>
-              <a:rPr lang="pt-BR" sz="2000" dirty="0">
-                <a:latin typeface="Times New Roman" panose="02020603050405020304" pitchFamily="18" charset="0"/>
-                <a:cs typeface="Times New Roman" panose="02020603050405020304" pitchFamily="18" charset="0"/>
-              </a:rPr>
-              <a:t> Pi. </a:t>
-            </a:r>
-          </a:p>
-          <a:p>
-            <a:pPr marL="0" indent="0" algn="just">
-              <a:buNone/>
+              <a:rPr lang="pt-BR" sz="2400" dirty="0">
+                <a:latin typeface="Times New Roman" panose="02020603050405020304" pitchFamily="18" charset="0"/>
+                <a:cs typeface="Times New Roman" panose="02020603050405020304" pitchFamily="18" charset="0"/>
+              </a:rPr>
+              <a:t>264kB SRAM</a:t>
+            </a:r>
+          </a:p>
+          <a:p>
+            <a:pPr algn="just">
+              <a:buFont typeface="Wingdings" panose="05000000000000000000" pitchFamily="2" charset="2"/>
+              <a:buChar char="§"/>
             </a:pPr>
             <a:r>
-              <a:rPr lang="pt-BR" sz="2000" b="1" dirty="0">
-                <a:solidFill>
-                  <a:srgbClr val="FF0000"/>
-                </a:solidFill>
-                <a:latin typeface="Times New Roman" panose="02020603050405020304" pitchFamily="18" charset="0"/>
-                <a:cs typeface="Times New Roman" panose="02020603050405020304" pitchFamily="18" charset="0"/>
-              </a:rPr>
-              <a:t>Disponível em: </a:t>
-            </a:r>
-            <a:r>
-              <a:rPr lang="pt-BR" sz="2000" dirty="0">
-                <a:latin typeface="Times New Roman" panose="02020603050405020304" pitchFamily="18" charset="0"/>
-                <a:cs typeface="Times New Roman" panose="02020603050405020304" pitchFamily="18" charset="0"/>
-                <a:hlinkClick r:id="rId4"/>
-              </a:rPr>
-              <a:t>https://www.raspberrypi.org/</a:t>
-            </a:r>
-            <a:endParaRPr lang="pt-BR" sz="2000" dirty="0">
-              <a:latin typeface="Times New Roman" panose="02020603050405020304" pitchFamily="18" charset="0"/>
-              <a:cs typeface="Times New Roman" panose="02020603050405020304" pitchFamily="18" charset="0"/>
-            </a:endParaRPr>
-          </a:p>
-          <a:p>
-            <a:pPr marL="0" indent="0" algn="just">
-              <a:buNone/>
+              <a:rPr lang="pt-BR" sz="2400" dirty="0">
+                <a:latin typeface="Times New Roman" panose="02020603050405020304" pitchFamily="18" charset="0"/>
+                <a:cs typeface="Times New Roman" panose="02020603050405020304" pitchFamily="18" charset="0"/>
+              </a:rPr>
+              <a:t>3 </a:t>
+            </a:r>
+            <a:r>
+              <a:rPr lang="pt-BR" sz="2400" dirty="0" err="1">
+                <a:latin typeface="Times New Roman" panose="02020603050405020304" pitchFamily="18" charset="0"/>
+                <a:cs typeface="Times New Roman" panose="02020603050405020304" pitchFamily="18" charset="0"/>
+              </a:rPr>
+              <a:t>ADCs</a:t>
+            </a:r>
+            <a:r>
+              <a:rPr lang="pt-BR" sz="2400" dirty="0">
+                <a:latin typeface="Times New Roman" panose="02020603050405020304" pitchFamily="18" charset="0"/>
+                <a:cs typeface="Times New Roman" panose="02020603050405020304" pitchFamily="18" charset="0"/>
+              </a:rPr>
+              <a:t> de 12bits</a:t>
+            </a:r>
+          </a:p>
+          <a:p>
+            <a:pPr algn="just">
+              <a:buFont typeface="Wingdings" panose="05000000000000000000" pitchFamily="2" charset="2"/>
+              <a:buChar char="§"/>
             </a:pPr>
-            <a:endParaRPr lang="pt-BR" sz="2000" dirty="0">
-              <a:latin typeface="Times New Roman" panose="02020603050405020304" pitchFamily="18" charset="0"/>
-              <a:cs typeface="Times New Roman" panose="02020603050405020304" pitchFamily="18" charset="0"/>
-            </a:endParaRPr>
-          </a:p>
-          <a:p>
-            <a:pPr marL="0" indent="0" algn="just">
-              <a:buNone/>
+            <a:r>
+              <a:rPr lang="pt-BR" sz="2400" dirty="0">
+                <a:latin typeface="Times New Roman" panose="02020603050405020304" pitchFamily="18" charset="0"/>
+                <a:cs typeface="Times New Roman" panose="02020603050405020304" pitchFamily="18" charset="0"/>
+              </a:rPr>
+              <a:t>Montagem de superfície</a:t>
+            </a:r>
+          </a:p>
+          <a:p>
+            <a:pPr algn="just">
+              <a:buFont typeface="Wingdings" panose="05000000000000000000" pitchFamily="2" charset="2"/>
+              <a:buChar char="§"/>
             </a:pPr>
             <a:r>
-              <a:rPr lang="pt-BR" sz="2000" dirty="0">
-                <a:latin typeface="Times New Roman" panose="02020603050405020304" pitchFamily="18" charset="0"/>
-                <a:cs typeface="Times New Roman" panose="02020603050405020304" pitchFamily="18" charset="0"/>
-              </a:rPr>
-              <a:t>[3] Livro </a:t>
-            </a:r>
-            <a:r>
-              <a:rPr lang="pt-BR" sz="2000" dirty="0" err="1">
-                <a:latin typeface="Times New Roman" panose="02020603050405020304" pitchFamily="18" charset="0"/>
-                <a:cs typeface="Times New Roman" panose="02020603050405020304" pitchFamily="18" charset="0"/>
-              </a:rPr>
-              <a:t>Raspberry</a:t>
-            </a:r>
-            <a:r>
-              <a:rPr lang="pt-BR" sz="2000" dirty="0">
-                <a:latin typeface="Times New Roman" panose="02020603050405020304" pitchFamily="18" charset="0"/>
-                <a:cs typeface="Times New Roman" panose="02020603050405020304" pitchFamily="18" charset="0"/>
-              </a:rPr>
-              <a:t> Pi. </a:t>
-            </a:r>
-          </a:p>
-          <a:p>
-            <a:pPr marL="0" indent="0" algn="just">
-              <a:buNone/>
-            </a:pPr>
-            <a:r>
-              <a:rPr lang="pt-BR" sz="2000" b="1" dirty="0">
-                <a:solidFill>
-                  <a:srgbClr val="FF0000"/>
-                </a:solidFill>
-                <a:latin typeface="Times New Roman" panose="02020603050405020304" pitchFamily="18" charset="0"/>
-                <a:cs typeface="Times New Roman" panose="02020603050405020304" pitchFamily="18" charset="0"/>
-              </a:rPr>
-              <a:t>Disponível em: </a:t>
-            </a:r>
-          </a:p>
-          <a:p>
-            <a:pPr marL="0" indent="0" algn="just">
-              <a:buNone/>
-            </a:pPr>
-            <a:r>
-              <a:rPr lang="pt-BR" sz="2000" dirty="0">
-                <a:latin typeface="Times New Roman" panose="02020603050405020304" pitchFamily="18" charset="0"/>
-                <a:cs typeface="Times New Roman" panose="02020603050405020304" pitchFamily="18" charset="0"/>
-                <a:hlinkClick r:id="rId5"/>
-              </a:rPr>
-              <a:t>https://books.google.com.br/books?id=pEQpw3-A4wwC&amp;dq=Raspberry+PI&amp;hl=pt-BR&amp;lr=</a:t>
-            </a:r>
-            <a:endParaRPr lang="pt-BR" sz="2000" dirty="0">
-              <a:latin typeface="Times New Roman" panose="02020603050405020304" pitchFamily="18" charset="0"/>
-              <a:cs typeface="Times New Roman" panose="02020603050405020304" pitchFamily="18" charset="0"/>
-            </a:endParaRPr>
+              <a:rPr lang="pt-BR" sz="2400" dirty="0">
+                <a:latin typeface="Times New Roman" panose="02020603050405020304" pitchFamily="18" charset="0"/>
+                <a:cs typeface="Times New Roman" panose="02020603050405020304" pitchFamily="18" charset="0"/>
+              </a:rPr>
+              <a:t>USB 1.1</a:t>
+            </a:r>
           </a:p>
         </p:txBody>
       </p:sp>
+      <p:pic>
+        <p:nvPicPr>
+          <p:cNvPr id="3" name="Imagem 2">
+            <a:extLst>
+              <a:ext uri="{FF2B5EF4-FFF2-40B4-BE49-F238E27FC236}">
+                <a16:creationId xmlns:a16="http://schemas.microsoft.com/office/drawing/2014/main" id="{038A4A93-07EA-2D66-B227-FE3A2649CADD}"/>
+              </a:ext>
+            </a:extLst>
+          </p:cNvPr>
+          <p:cNvPicPr>
+            <a:picLocks noChangeAspect="1"/>
+          </p:cNvPicPr>
+          <p:nvPr/>
+        </p:nvPicPr>
+        <p:blipFill>
+          <a:blip r:embed="rId3"/>
+          <a:stretch>
+            <a:fillRect/>
+          </a:stretch>
+        </p:blipFill>
+        <p:spPr>
+          <a:xfrm>
+            <a:off x="4826067" y="1225908"/>
+            <a:ext cx="4062550" cy="3093078"/>
+          </a:xfrm>
+          <a:prstGeom prst="rect">
+            <a:avLst/>
+          </a:prstGeom>
+        </p:spPr>
+      </p:pic>
     </p:spTree>
     <p:extLst>
       <p:ext uri="{BB962C8B-B14F-4D97-AF65-F5344CB8AC3E}">
-        <p14:creationId xmlns:p14="http://schemas.microsoft.com/office/powerpoint/2010/main" val="3680270425"/>
+        <p14:creationId xmlns:p14="http://schemas.microsoft.com/office/powerpoint/2010/main" val="1774495085"/>
       </p:ext>
     </p:extLst>
   </p:cSld>
@@ -7718,20 +8053,12 @@
           <a:lstStyle/>
           <a:p>
             <a:r>
-              <a:rPr lang="en-US" b="1" dirty="0" err="1">
+              <a:rPr lang="en-US" b="1" dirty="0">
                 <a:solidFill>
                   <a:srgbClr val="0070C0"/>
                 </a:solidFill>
               </a:rPr>
-              <a:t>Aprenda</a:t>
-            </a:r>
-            <a:r>
-              <a:rPr lang="en-US" b="1" dirty="0">
-                <a:solidFill>
-                  <a:srgbClr val="0070C0"/>
-                </a:solidFill>
-              </a:rPr>
-              <a:t>+</a:t>
+              <a:t>Raspberry Pi 4 (SBC)</a:t>
             </a:r>
           </a:p>
         </p:txBody>
@@ -7748,8 +8075,8 @@
         </p:nvSpPr>
         <p:spPr>
           <a:xfrm>
-            <a:off x="142865" y="1200150"/>
-            <a:ext cx="8865056" cy="3737370"/>
+            <a:off x="139472" y="890089"/>
+            <a:ext cx="8865056" cy="4171308"/>
           </a:xfrm>
         </p:spPr>
         <p:txBody>
@@ -7762,79 +8089,14 @@
               <a:buNone/>
             </a:pPr>
             <a:r>
-              <a:rPr lang="pt-BR" sz="2200" dirty="0">
-                <a:latin typeface="Times New Roman" panose="02020603050405020304" pitchFamily="18" charset="0"/>
-                <a:cs typeface="Times New Roman" panose="02020603050405020304" pitchFamily="18" charset="0"/>
-              </a:rPr>
-              <a:t>[1] Plataforma </a:t>
-            </a:r>
-            <a:r>
-              <a:rPr lang="pt-BR" sz="2200" dirty="0" err="1">
-                <a:latin typeface="Times New Roman" panose="02020603050405020304" pitchFamily="18" charset="0"/>
-                <a:cs typeface="Times New Roman" panose="02020603050405020304" pitchFamily="18" charset="0"/>
-              </a:rPr>
-              <a:t>Raspberry</a:t>
-            </a:r>
-            <a:r>
-              <a:rPr lang="pt-BR" sz="2200" dirty="0">
-                <a:latin typeface="Times New Roman" panose="02020603050405020304" pitchFamily="18" charset="0"/>
-                <a:cs typeface="Times New Roman" panose="02020603050405020304" pitchFamily="18" charset="0"/>
-              </a:rPr>
-              <a:t> Pi – Ambiente </a:t>
-            </a:r>
-            <a:r>
-              <a:rPr lang="pt-BR" sz="2200" dirty="0" err="1">
-                <a:latin typeface="Times New Roman" panose="02020603050405020304" pitchFamily="18" charset="0"/>
-                <a:cs typeface="Times New Roman" panose="02020603050405020304" pitchFamily="18" charset="0"/>
-              </a:rPr>
-              <a:t>Dev</a:t>
-            </a:r>
-            <a:r>
-              <a:rPr lang="pt-BR" sz="2200" dirty="0">
-                <a:latin typeface="Times New Roman" panose="02020603050405020304" pitchFamily="18" charset="0"/>
-                <a:cs typeface="Times New Roman" panose="02020603050405020304" pitchFamily="18" charset="0"/>
-              </a:rPr>
-              <a:t> Python (</a:t>
-            </a:r>
-            <a:r>
-              <a:rPr lang="pt-BR" sz="2200" dirty="0">
+              <a:rPr lang="pt-BR" sz="2000" dirty="0">
                 <a:latin typeface="Times New Roman" panose="02020603050405020304" pitchFamily="18" charset="0"/>
                 <a:cs typeface="Times New Roman" panose="02020603050405020304" pitchFamily="18" charset="0"/>
                 <a:hlinkClick r:id="rId3"/>
               </a:rPr>
-              <a:t>https://thonny.org/</a:t>
-            </a:r>
-            <a:r>
-              <a:rPr lang="pt-BR" sz="2200" dirty="0">
-                <a:latin typeface="Times New Roman" panose="02020603050405020304" pitchFamily="18" charset="0"/>
-                <a:cs typeface="Times New Roman" panose="02020603050405020304" pitchFamily="18" charset="0"/>
-              </a:rPr>
-              <a:t>)</a:t>
-            </a:r>
-          </a:p>
-          <a:p>
-            <a:pPr marL="0" indent="0" algn="just">
-              <a:buNone/>
-            </a:pPr>
-            <a:r>
-              <a:rPr lang="pt-BR" sz="2200" b="1" dirty="0">
-                <a:solidFill>
-                  <a:srgbClr val="FF0000"/>
-                </a:solidFill>
-                <a:latin typeface="Times New Roman" panose="02020603050405020304" pitchFamily="18" charset="0"/>
-                <a:cs typeface="Times New Roman" panose="02020603050405020304" pitchFamily="18" charset="0"/>
-              </a:rPr>
-              <a:t>Disponível em: </a:t>
-            </a:r>
-            <a:r>
-              <a:rPr lang="pt-BR" sz="2200" dirty="0">
-                <a:latin typeface="Times New Roman" panose="02020603050405020304" pitchFamily="18" charset="0"/>
-                <a:cs typeface="Times New Roman" panose="02020603050405020304" pitchFamily="18" charset="0"/>
-                <a:hlinkClick r:id="rId4"/>
-              </a:rPr>
-              <a:t>https://www.youtube.com/watch?v=VrZ1APrN6uc</a:t>
-            </a:r>
-            <a:endParaRPr lang="pt-BR" sz="2200" dirty="0">
+              <a:t>https://www.youtube.com/watch?v=BpJCAafw2qE</a:t>
+            </a:r>
+            <a:endParaRPr lang="pt-BR" sz="2000" dirty="0">
               <a:latin typeface="Times New Roman" panose="02020603050405020304" pitchFamily="18" charset="0"/>
               <a:cs typeface="Times New Roman" panose="02020603050405020304" pitchFamily="18" charset="0"/>
             </a:endParaRPr>
@@ -7843,88 +8105,47 @@
             <a:pPr marL="0" indent="0" algn="just">
               <a:buNone/>
             </a:pPr>
-            <a:endParaRPr lang="pt-BR" sz="2200" dirty="0">
+            <a:endParaRPr lang="pt-BR" sz="1600" dirty="0">
               <a:latin typeface="Times New Roman" panose="02020603050405020304" pitchFamily="18" charset="0"/>
               <a:cs typeface="Times New Roman" panose="02020603050405020304" pitchFamily="18" charset="0"/>
             </a:endParaRPr>
           </a:p>
-          <a:p>
-            <a:pPr marL="0" indent="0" algn="just">
-              <a:buNone/>
-            </a:pPr>
-            <a:endParaRPr lang="pt-BR" sz="2200" dirty="0">
-              <a:latin typeface="Times New Roman" panose="02020603050405020304" pitchFamily="18" charset="0"/>
-              <a:cs typeface="Times New Roman" panose="02020603050405020304" pitchFamily="18" charset="0"/>
-            </a:endParaRPr>
-          </a:p>
-          <a:p>
-            <a:pPr marL="0" indent="0" algn="just">
-              <a:buNone/>
-            </a:pPr>
-            <a:r>
-              <a:rPr lang="pt-BR" sz="2200" dirty="0">
-                <a:latin typeface="Times New Roman" panose="02020603050405020304" pitchFamily="18" charset="0"/>
-                <a:cs typeface="Times New Roman" panose="02020603050405020304" pitchFamily="18" charset="0"/>
-              </a:rPr>
-              <a:t>[2] Transformando </a:t>
-            </a:r>
-            <a:r>
-              <a:rPr lang="pt-BR" sz="2200" dirty="0" err="1">
-                <a:latin typeface="Times New Roman" panose="02020603050405020304" pitchFamily="18" charset="0"/>
-                <a:cs typeface="Times New Roman" panose="02020603050405020304" pitchFamily="18" charset="0"/>
-              </a:rPr>
-              <a:t>Raspberry</a:t>
-            </a:r>
-            <a:r>
-              <a:rPr lang="pt-BR" sz="2200" dirty="0">
-                <a:latin typeface="Times New Roman" panose="02020603050405020304" pitchFamily="18" charset="0"/>
-                <a:cs typeface="Times New Roman" panose="02020603050405020304" pitchFamily="18" charset="0"/>
-              </a:rPr>
-              <a:t> Pi em plataforma de ataque USB - P4wnP1</a:t>
-            </a:r>
-          </a:p>
-          <a:p>
-            <a:pPr marL="0" indent="0" algn="just">
-              <a:buNone/>
-            </a:pPr>
-            <a:r>
-              <a:rPr lang="pt-BR" sz="2200" b="1" dirty="0">
-                <a:solidFill>
-                  <a:srgbClr val="FF0000"/>
-                </a:solidFill>
-                <a:latin typeface="Times New Roman" panose="02020603050405020304" pitchFamily="18" charset="0"/>
-                <a:cs typeface="Times New Roman" panose="02020603050405020304" pitchFamily="18" charset="0"/>
-              </a:rPr>
-              <a:t>Disponível em: </a:t>
-            </a:r>
-            <a:r>
-              <a:rPr lang="pt-BR" sz="2200" dirty="0">
-                <a:latin typeface="Times New Roman" panose="02020603050405020304" pitchFamily="18" charset="0"/>
-                <a:cs typeface="Times New Roman" panose="02020603050405020304" pitchFamily="18" charset="0"/>
-                <a:hlinkClick r:id="rId5"/>
-              </a:rPr>
-              <a:t>https://www.youtube.com/watch?v=DKg0EXyTaMA</a:t>
-            </a:r>
-            <a:endParaRPr lang="pt-BR" sz="2200" dirty="0">
-              <a:latin typeface="Times New Roman" panose="02020603050405020304" pitchFamily="18" charset="0"/>
-              <a:cs typeface="Times New Roman" panose="02020603050405020304" pitchFamily="18" charset="0"/>
-            </a:endParaRPr>
-          </a:p>
-          <a:p>
-            <a:pPr marL="0" indent="0" algn="just">
-              <a:buNone/>
-            </a:pPr>
-            <a:endParaRPr lang="pt-BR" sz="2200" dirty="0">
-              <a:latin typeface="Times New Roman" panose="02020603050405020304" pitchFamily="18" charset="0"/>
-              <a:cs typeface="Times New Roman" panose="02020603050405020304" pitchFamily="18" charset="0"/>
-            </a:endParaRPr>
-          </a:p>
         </p:txBody>
       </p:sp>
+      <p:pic>
+        <p:nvPicPr>
+          <p:cNvPr id="3" name="Imagem 2">
+            <a:extLst>
+              <a:ext uri="{FF2B5EF4-FFF2-40B4-BE49-F238E27FC236}">
+                <a16:creationId xmlns:a16="http://schemas.microsoft.com/office/drawing/2014/main" id="{9996DD03-E3DF-E8B3-DEEE-E7F3E53DBCB2}"/>
+              </a:ext>
+            </a:extLst>
+          </p:cNvPr>
+          <p:cNvPicPr>
+            <a:picLocks noChangeAspect="1"/>
+          </p:cNvPicPr>
+          <p:nvPr/>
+        </p:nvPicPr>
+        <p:blipFill>
+          <a:blip r:embed="rId4"/>
+          <a:stretch>
+            <a:fillRect/>
+          </a:stretch>
+        </p:blipFill>
+        <p:spPr>
+          <a:xfrm>
+            <a:off x="881331" y="1332332"/>
+            <a:ext cx="5815683" cy="3721015"/>
+          </a:xfrm>
+          <a:prstGeom prst="rect">
+            <a:avLst/>
+          </a:prstGeom>
+        </p:spPr>
+      </p:pic>
     </p:spTree>
     <p:extLst>
       <p:ext uri="{BB962C8B-B14F-4D97-AF65-F5344CB8AC3E}">
-        <p14:creationId xmlns:p14="http://schemas.microsoft.com/office/powerpoint/2010/main" val="2747596967"/>
+        <p14:creationId xmlns:p14="http://schemas.microsoft.com/office/powerpoint/2010/main" val="2428742957"/>
       </p:ext>
     </p:extLst>
   </p:cSld>
@@ -8482,7 +8703,7 @@
         </p:nvSpPr>
         <p:spPr>
           <a:xfrm>
-            <a:off x="457200" y="205980"/>
+            <a:off x="457200" y="145020"/>
             <a:ext cx="8229600" cy="857251"/>
           </a:xfrm>
         </p:spPr>
@@ -8493,44 +8714,20 @@
           <a:lstStyle/>
           <a:p>
             <a:r>
+              <a:rPr lang="en-US" b="1" dirty="0">
+                <a:solidFill>
+                  <a:srgbClr val="0070C0"/>
+                </a:solidFill>
+              </a:rPr>
+              <a:t>Raspberry Pi 4 - </a:t>
+            </a:r>
+            <a:r>
               <a:rPr lang="en-US" b="1" dirty="0" err="1">
                 <a:solidFill>
                   <a:srgbClr val="0070C0"/>
                 </a:solidFill>
               </a:rPr>
-              <a:t>Dinâmica</a:t>
-            </a:r>
-            <a:r>
-              <a:rPr lang="en-US" b="1" dirty="0">
-                <a:solidFill>
-                  <a:srgbClr val="0070C0"/>
-                </a:solidFill>
-              </a:rPr>
-              <a:t>/</a:t>
-            </a:r>
-            <a:r>
-              <a:rPr lang="en-US" b="1" dirty="0" err="1">
-                <a:solidFill>
-                  <a:srgbClr val="0070C0"/>
-                </a:solidFill>
-              </a:rPr>
-              <a:t>Atividades</a:t>
-            </a:r>
-            <a:r>
-              <a:rPr lang="en-US" b="1" dirty="0">
-                <a:solidFill>
-                  <a:srgbClr val="0070C0"/>
-                </a:solidFill>
-              </a:rPr>
-              <a:t> - </a:t>
-            </a:r>
-            <a:r>
-              <a:rPr lang="en-US" b="1" dirty="0" err="1">
-                <a:solidFill>
-                  <a:srgbClr val="0070C0"/>
-                </a:solidFill>
-              </a:rPr>
-              <a:t>Exercícios</a:t>
+              <a:t>MicroPython</a:t>
             </a:r>
             <a:endParaRPr lang="en-US" b="1" dirty="0">
               <a:solidFill>
@@ -8552,8 +8749,8 @@
         </p:nvSpPr>
         <p:spPr>
           <a:xfrm>
-            <a:off x="139472" y="1063230"/>
-            <a:ext cx="8865056" cy="3996450"/>
+            <a:off x="142865" y="1200150"/>
+            <a:ext cx="8865056" cy="3737370"/>
           </a:xfrm>
         </p:spPr>
         <p:txBody>
@@ -8566,132 +8763,81 @@
               <a:buNone/>
             </a:pPr>
             <a:r>
-              <a:rPr lang="pt-BR" sz="2400" b="1" dirty="0">
-                <a:latin typeface="Times New Roman" panose="02020603050405020304" pitchFamily="18" charset="0"/>
-                <a:cs typeface="Times New Roman" panose="02020603050405020304" pitchFamily="18" charset="0"/>
-              </a:rPr>
-              <a:t>Ambiente </a:t>
-            </a:r>
-            <a:r>
-              <a:rPr lang="pt-BR" sz="2400" b="1" dirty="0" err="1">
-                <a:latin typeface="Times New Roman" panose="02020603050405020304" pitchFamily="18" charset="0"/>
-                <a:cs typeface="Times New Roman" panose="02020603050405020304" pitchFamily="18" charset="0"/>
-              </a:rPr>
-              <a:t>Dev</a:t>
-            </a:r>
-            <a:r>
-              <a:rPr lang="pt-BR" sz="2400" b="1" dirty="0">
-                <a:latin typeface="Times New Roman" panose="02020603050405020304" pitchFamily="18" charset="0"/>
-                <a:cs typeface="Times New Roman" panose="02020603050405020304" pitchFamily="18" charset="0"/>
-              </a:rPr>
-              <a:t> Python ou </a:t>
-            </a:r>
-            <a:r>
-              <a:rPr lang="pt-BR" sz="2400" b="1" dirty="0">
+              <a:rPr lang="pt-BR" sz="2000" b="1" dirty="0">
                 <a:solidFill>
                   <a:srgbClr val="FF0000"/>
                 </a:solidFill>
                 <a:latin typeface="Times New Roman" panose="02020603050405020304" pitchFamily="18" charset="0"/>
                 <a:cs typeface="Times New Roman" panose="02020603050405020304" pitchFamily="18" charset="0"/>
               </a:rPr>
-              <a:t>VM com um simulador </a:t>
-            </a:r>
-            <a:r>
-              <a:rPr lang="pt-BR" sz="2400" b="1" dirty="0" err="1">
-                <a:solidFill>
-                  <a:srgbClr val="FF0000"/>
-                </a:solidFill>
-                <a:latin typeface="Times New Roman" panose="02020603050405020304" pitchFamily="18" charset="0"/>
-                <a:cs typeface="Times New Roman" panose="02020603050405020304" pitchFamily="18" charset="0"/>
-              </a:rPr>
-              <a:t>Raspberry</a:t>
-            </a:r>
-            <a:r>
-              <a:rPr lang="pt-BR" sz="2400" b="1" dirty="0">
-                <a:solidFill>
-                  <a:srgbClr val="FF0000"/>
-                </a:solidFill>
-                <a:latin typeface="Times New Roman" panose="02020603050405020304" pitchFamily="18" charset="0"/>
-                <a:cs typeface="Times New Roman" panose="02020603050405020304" pitchFamily="18" charset="0"/>
-              </a:rPr>
-              <a:t> OS Pi</a:t>
-            </a:r>
-          </a:p>
-          <a:p>
-            <a:pPr marL="514350" indent="-514350" algn="just">
-              <a:buAutoNum type="arabicPeriod"/>
+              <a:t># Exemplo 1</a:t>
+            </a:r>
+          </a:p>
+          <a:p>
+            <a:pPr marL="0" indent="0" algn="just">
+              <a:buNone/>
             </a:pPr>
             <a:r>
-              <a:rPr lang="pt-BR" sz="2400" dirty="0">
-                <a:latin typeface="Times New Roman" panose="02020603050405020304" pitchFamily="18" charset="0"/>
-                <a:cs typeface="Times New Roman" panose="02020603050405020304" pitchFamily="18" charset="0"/>
-                <a:hlinkClick r:id="rId3"/>
-              </a:rPr>
-              <a:t>https://thonny.org/</a:t>
-            </a:r>
-            <a:endParaRPr lang="pt-BR" sz="2400" dirty="0">
+              <a:rPr lang="pt-BR" sz="2000" dirty="0" err="1">
+                <a:latin typeface="Times New Roman" panose="02020603050405020304" pitchFamily="18" charset="0"/>
+                <a:cs typeface="Times New Roman" panose="02020603050405020304" pitchFamily="18" charset="0"/>
+              </a:rPr>
+              <a:t>import</a:t>
+            </a:r>
+            <a:r>
+              <a:rPr lang="pt-BR" sz="2000" dirty="0">
+                <a:latin typeface="Times New Roman" panose="02020603050405020304" pitchFamily="18" charset="0"/>
+                <a:cs typeface="Times New Roman" panose="02020603050405020304" pitchFamily="18" charset="0"/>
+              </a:rPr>
+              <a:t> </a:t>
+            </a:r>
+            <a:r>
+              <a:rPr lang="pt-BR" sz="2000" b="1" dirty="0" err="1">
+                <a:latin typeface="Times New Roman" panose="02020603050405020304" pitchFamily="18" charset="0"/>
+                <a:cs typeface="Times New Roman" panose="02020603050405020304" pitchFamily="18" charset="0"/>
+              </a:rPr>
+              <a:t>machine</a:t>
+            </a:r>
+            <a:endParaRPr lang="pt-BR" sz="2000" b="1" dirty="0">
               <a:latin typeface="Times New Roman" panose="02020603050405020304" pitchFamily="18" charset="0"/>
               <a:cs typeface="Times New Roman" panose="02020603050405020304" pitchFamily="18" charset="0"/>
             </a:endParaRPr>
           </a:p>
           <a:p>
-            <a:pPr marL="514350" indent="-514350" algn="just">
-              <a:buAutoNum type="arabicPeriod"/>
+            <a:pPr marL="0" indent="0" algn="just">
+              <a:buNone/>
             </a:pPr>
             <a:r>
-              <a:rPr lang="pt-BR" sz="2400" dirty="0">
-                <a:latin typeface="Times New Roman" panose="02020603050405020304" pitchFamily="18" charset="0"/>
-                <a:cs typeface="Times New Roman" panose="02020603050405020304" pitchFamily="18" charset="0"/>
-                <a:hlinkClick r:id="rId4"/>
-              </a:rPr>
-              <a:t>https://www.raspberrypi.com/software/</a:t>
-            </a:r>
-            <a:endParaRPr lang="pt-BR" sz="2400" dirty="0">
+              <a:rPr lang="pt-BR" sz="2000" dirty="0" err="1">
+                <a:latin typeface="Times New Roman" panose="02020603050405020304" pitchFamily="18" charset="0"/>
+                <a:cs typeface="Times New Roman" panose="02020603050405020304" pitchFamily="18" charset="0"/>
+              </a:rPr>
+              <a:t>import</a:t>
+            </a:r>
+            <a:r>
+              <a:rPr lang="pt-BR" sz="2000" dirty="0">
+                <a:latin typeface="Times New Roman" panose="02020603050405020304" pitchFamily="18" charset="0"/>
+                <a:cs typeface="Times New Roman" panose="02020603050405020304" pitchFamily="18" charset="0"/>
+              </a:rPr>
+              <a:t> </a:t>
+            </a:r>
+            <a:r>
+              <a:rPr lang="pt-BR" sz="2000" b="1" dirty="0" err="1">
+                <a:latin typeface="Times New Roman" panose="02020603050405020304" pitchFamily="18" charset="0"/>
+                <a:cs typeface="Times New Roman" panose="02020603050405020304" pitchFamily="18" charset="0"/>
+              </a:rPr>
+              <a:t>utime</a:t>
+            </a:r>
+            <a:endParaRPr lang="pt-BR" sz="2000" b="1" dirty="0">
               <a:latin typeface="Times New Roman" panose="02020603050405020304" pitchFamily="18" charset="0"/>
               <a:cs typeface="Times New Roman" panose="02020603050405020304" pitchFamily="18" charset="0"/>
             </a:endParaRPr>
           </a:p>
           <a:p>
-            <a:pPr marL="514350" indent="-514350" algn="just">
-              <a:buAutoNum type="arabicPeriod"/>
+            <a:pPr marL="0" indent="0" algn="just">
+              <a:buNone/>
             </a:pPr>
-            <a:r>
-              <a:rPr lang="pt-BR" sz="2400" dirty="0">
-                <a:latin typeface="Times New Roman" panose="02020603050405020304" pitchFamily="18" charset="0"/>
-                <a:cs typeface="Times New Roman" panose="02020603050405020304" pitchFamily="18" charset="0"/>
-                <a:hlinkClick r:id="rId5"/>
-              </a:rPr>
-              <a:t>https://sourceforge.net/projects/simus/</a:t>
-            </a:r>
-            <a:r>
-              <a:rPr lang="pt-BR" sz="2400" dirty="0">
-                <a:latin typeface="Times New Roman" panose="02020603050405020304" pitchFamily="18" charset="0"/>
-                <a:cs typeface="Times New Roman" panose="02020603050405020304" pitchFamily="18" charset="0"/>
-              </a:rPr>
-              <a:t> </a:t>
-            </a:r>
-            <a:r>
-              <a:rPr lang="pt-BR" sz="2400" b="1" dirty="0">
-                <a:latin typeface="Times New Roman" panose="02020603050405020304" pitchFamily="18" charset="0"/>
-                <a:cs typeface="Times New Roman" panose="02020603050405020304" pitchFamily="18" charset="0"/>
-              </a:rPr>
-              <a:t>(</a:t>
-            </a:r>
-            <a:r>
-              <a:rPr lang="pt-BR" sz="2400" b="1" dirty="0" err="1">
-                <a:latin typeface="Times New Roman" panose="02020603050405020304" pitchFamily="18" charset="0"/>
-                <a:cs typeface="Times New Roman" panose="02020603050405020304" pitchFamily="18" charset="0"/>
-              </a:rPr>
-              <a:t>ObjectPascal</a:t>
-            </a:r>
-            <a:r>
-              <a:rPr lang="pt-BR" sz="2400" b="1" dirty="0">
-                <a:latin typeface="Times New Roman" panose="02020603050405020304" pitchFamily="18" charset="0"/>
-                <a:cs typeface="Times New Roman" panose="02020603050405020304" pitchFamily="18" charset="0"/>
-              </a:rPr>
-              <a:t>)</a:t>
-            </a:r>
-            <a:endParaRPr lang="pt-BR" sz="2400" dirty="0">
+            <a:endParaRPr lang="pt-BR" sz="2000" dirty="0">
               <a:latin typeface="Times New Roman" panose="02020603050405020304" pitchFamily="18" charset="0"/>
               <a:cs typeface="Times New Roman" panose="02020603050405020304" pitchFamily="18" charset="0"/>
             </a:endParaRPr>
@@ -8701,11 +8847,60 @@
               <a:buNone/>
             </a:pPr>
             <a:r>
-              <a:rPr lang="pt-BR" sz="2400" dirty="0">
-                <a:latin typeface="Times New Roman" panose="02020603050405020304" pitchFamily="18" charset="0"/>
-                <a:cs typeface="Times New Roman" panose="02020603050405020304" pitchFamily="18" charset="0"/>
-              </a:rPr>
-              <a:t>Criar um mapa conceitual:</a:t>
+              <a:rPr lang="pt-BR" sz="2000" dirty="0" err="1">
+                <a:latin typeface="Times New Roman" panose="02020603050405020304" pitchFamily="18" charset="0"/>
+                <a:cs typeface="Times New Roman" panose="02020603050405020304" pitchFamily="18" charset="0"/>
+              </a:rPr>
+              <a:t>led_onboard_pino</a:t>
+            </a:r>
+            <a:r>
+              <a:rPr lang="pt-BR" sz="2000" dirty="0">
+                <a:latin typeface="Times New Roman" panose="02020603050405020304" pitchFamily="18" charset="0"/>
+                <a:cs typeface="Times New Roman" panose="02020603050405020304" pitchFamily="18" charset="0"/>
+              </a:rPr>
+              <a:t> = </a:t>
+            </a:r>
+            <a:r>
+              <a:rPr lang="pt-BR" sz="2000" b="1" dirty="0" err="1">
+                <a:latin typeface="Times New Roman" panose="02020603050405020304" pitchFamily="18" charset="0"/>
+                <a:cs typeface="Times New Roman" panose="02020603050405020304" pitchFamily="18" charset="0"/>
+              </a:rPr>
+              <a:t>machine</a:t>
+            </a:r>
+            <a:r>
+              <a:rPr lang="pt-BR" sz="2000" dirty="0" err="1">
+                <a:latin typeface="Times New Roman" panose="02020603050405020304" pitchFamily="18" charset="0"/>
+                <a:cs typeface="Times New Roman" panose="02020603050405020304" pitchFamily="18" charset="0"/>
+              </a:rPr>
+              <a:t>.Pin</a:t>
+            </a:r>
+            <a:r>
+              <a:rPr lang="pt-BR" sz="2000" dirty="0">
+                <a:latin typeface="Times New Roman" panose="02020603050405020304" pitchFamily="18" charset="0"/>
+                <a:cs typeface="Times New Roman" panose="02020603050405020304" pitchFamily="18" charset="0"/>
+              </a:rPr>
+              <a:t>(25, </a:t>
+            </a:r>
+            <a:r>
+              <a:rPr lang="pt-BR" sz="2000" b="1" dirty="0" err="1">
+                <a:latin typeface="Times New Roman" panose="02020603050405020304" pitchFamily="18" charset="0"/>
+                <a:cs typeface="Times New Roman" panose="02020603050405020304" pitchFamily="18" charset="0"/>
+              </a:rPr>
+              <a:t>machine</a:t>
+            </a:r>
+            <a:r>
+              <a:rPr lang="pt-BR" sz="2000" dirty="0" err="1">
+                <a:latin typeface="Times New Roman" panose="02020603050405020304" pitchFamily="18" charset="0"/>
+                <a:cs typeface="Times New Roman" panose="02020603050405020304" pitchFamily="18" charset="0"/>
+              </a:rPr>
+              <a:t>.Pin.OUT</a:t>
+            </a:r>
+            <a:r>
+              <a:rPr lang="pt-BR" sz="2000" dirty="0">
+                <a:latin typeface="Times New Roman" panose="02020603050405020304" pitchFamily="18" charset="0"/>
+                <a:cs typeface="Times New Roman" panose="02020603050405020304" pitchFamily="18" charset="0"/>
+              </a:rPr>
+              <a:t>)</a:t>
             </a:r>
           </a:p>
           <a:p>
@@ -8713,156 +8908,91 @@
               <a:buNone/>
             </a:pPr>
             <a:r>
-              <a:rPr lang="pt-BR" sz="2400" dirty="0">
+              <a:rPr lang="pt-BR" sz="2000" b="1" dirty="0" err="1">
+                <a:latin typeface="Times New Roman" panose="02020603050405020304" pitchFamily="18" charset="0"/>
+                <a:cs typeface="Times New Roman" panose="02020603050405020304" pitchFamily="18" charset="0"/>
+              </a:rPr>
+              <a:t>while</a:t>
+            </a:r>
+            <a:r>
+              <a:rPr lang="pt-BR" sz="2000" dirty="0">
                 <a:latin typeface="Times New Roman" panose="02020603050405020304" pitchFamily="18" charset="0"/>
                 <a:cs typeface="Times New Roman" panose="02020603050405020304" pitchFamily="18" charset="0"/>
               </a:rPr>
               <a:t> </a:t>
             </a:r>
             <a:r>
-              <a:rPr lang="pt-BR" sz="2400" b="1" dirty="0">
-                <a:solidFill>
-                  <a:srgbClr val="FF0000"/>
-                </a:solidFill>
-                <a:latin typeface="Times New Roman" panose="02020603050405020304" pitchFamily="18" charset="0"/>
-                <a:cs typeface="Times New Roman" panose="02020603050405020304" pitchFamily="18" charset="0"/>
-              </a:rPr>
-              <a:t>Arduino Uno R3 </a:t>
-            </a:r>
-            <a:r>
-              <a:rPr lang="pt-BR" sz="2400" b="1" dirty="0" err="1">
-                <a:solidFill>
-                  <a:srgbClr val="FF0000"/>
-                </a:solidFill>
-                <a:latin typeface="Times New Roman" panose="02020603050405020304" pitchFamily="18" charset="0"/>
-                <a:cs typeface="Times New Roman" panose="02020603050405020304" pitchFamily="18" charset="0"/>
-              </a:rPr>
-              <a:t>vs</a:t>
-            </a:r>
-            <a:r>
-              <a:rPr lang="pt-BR" sz="2400" b="1" dirty="0">
-                <a:solidFill>
-                  <a:srgbClr val="FF0000"/>
-                </a:solidFill>
-                <a:latin typeface="Times New Roman" panose="02020603050405020304" pitchFamily="18" charset="0"/>
-                <a:cs typeface="Times New Roman" panose="02020603050405020304" pitchFamily="18" charset="0"/>
-              </a:rPr>
-              <a:t> </a:t>
-            </a:r>
-            <a:r>
-              <a:rPr lang="pt-BR" sz="2400" b="1" dirty="0" err="1">
-                <a:solidFill>
-                  <a:schemeClr val="tx1"/>
-                </a:solidFill>
-                <a:latin typeface="Times New Roman" panose="02020603050405020304" pitchFamily="18" charset="0"/>
-                <a:cs typeface="Times New Roman" panose="02020603050405020304" pitchFamily="18" charset="0"/>
-              </a:rPr>
-              <a:t>NodeMCU</a:t>
-            </a:r>
-            <a:r>
-              <a:rPr lang="pt-BR" sz="2400" b="1" dirty="0">
-                <a:solidFill>
-                  <a:srgbClr val="FF0000"/>
-                </a:solidFill>
-                <a:latin typeface="Times New Roman" panose="02020603050405020304" pitchFamily="18" charset="0"/>
-                <a:cs typeface="Times New Roman" panose="02020603050405020304" pitchFamily="18" charset="0"/>
-              </a:rPr>
-              <a:t> </a:t>
-            </a:r>
-            <a:r>
-              <a:rPr lang="pt-BR" sz="2400" b="1" dirty="0" err="1">
-                <a:solidFill>
-                  <a:srgbClr val="FF0000"/>
-                </a:solidFill>
-                <a:latin typeface="Times New Roman" panose="02020603050405020304" pitchFamily="18" charset="0"/>
-                <a:cs typeface="Times New Roman" panose="02020603050405020304" pitchFamily="18" charset="0"/>
-              </a:rPr>
-              <a:t>vs</a:t>
-            </a:r>
-            <a:r>
-              <a:rPr lang="pt-BR" sz="2400" b="1" dirty="0">
-                <a:solidFill>
-                  <a:srgbClr val="FF0000"/>
-                </a:solidFill>
-                <a:latin typeface="Times New Roman" panose="02020603050405020304" pitchFamily="18" charset="0"/>
-                <a:cs typeface="Times New Roman" panose="02020603050405020304" pitchFamily="18" charset="0"/>
-              </a:rPr>
-              <a:t> </a:t>
-            </a:r>
-            <a:r>
-              <a:rPr lang="pt-BR" sz="2400" b="1" dirty="0" err="1">
-                <a:solidFill>
-                  <a:srgbClr val="FF0000"/>
-                </a:solidFill>
-                <a:latin typeface="Times New Roman" panose="02020603050405020304" pitchFamily="18" charset="0"/>
-                <a:cs typeface="Times New Roman" panose="02020603050405020304" pitchFamily="18" charset="0"/>
-              </a:rPr>
-              <a:t>Raspberry</a:t>
-            </a:r>
-            <a:r>
-              <a:rPr lang="pt-BR" sz="2400" b="1" dirty="0">
-                <a:solidFill>
-                  <a:srgbClr val="FF0000"/>
-                </a:solidFill>
-                <a:latin typeface="Times New Roman" panose="02020603050405020304" pitchFamily="18" charset="0"/>
-                <a:cs typeface="Times New Roman" panose="02020603050405020304" pitchFamily="18" charset="0"/>
-              </a:rPr>
-              <a:t> </a:t>
-            </a:r>
-            <a:r>
-              <a:rPr lang="pt-BR" sz="2400" b="1">
-                <a:solidFill>
-                  <a:srgbClr val="FF0000"/>
-                </a:solidFill>
-                <a:latin typeface="Times New Roman" panose="02020603050405020304" pitchFamily="18" charset="0"/>
-                <a:cs typeface="Times New Roman" panose="02020603050405020304" pitchFamily="18" charset="0"/>
-              </a:rPr>
-              <a:t>Pi 4</a:t>
-            </a:r>
-            <a:r>
-              <a:rPr lang="pt-BR" sz="2400">
-                <a:solidFill>
-                  <a:schemeClr val="tx1"/>
-                </a:solidFill>
-                <a:latin typeface="Times New Roman" panose="02020603050405020304" pitchFamily="18" charset="0"/>
-                <a:cs typeface="Times New Roman" panose="02020603050405020304" pitchFamily="18" charset="0"/>
-              </a:rPr>
-              <a:t>.</a:t>
-            </a:r>
-            <a:endParaRPr lang="pt-BR" sz="2400" dirty="0">
-              <a:solidFill>
-                <a:schemeClr val="tx1"/>
-              </a:solidFill>
-              <a:latin typeface="Times New Roman" panose="02020603050405020304" pitchFamily="18" charset="0"/>
-              <a:cs typeface="Times New Roman" panose="02020603050405020304" pitchFamily="18" charset="0"/>
-            </a:endParaRPr>
+              <a:rPr lang="pt-BR" sz="2000" dirty="0" err="1">
+                <a:latin typeface="Times New Roman" panose="02020603050405020304" pitchFamily="18" charset="0"/>
+                <a:cs typeface="Times New Roman" panose="02020603050405020304" pitchFamily="18" charset="0"/>
+              </a:rPr>
+              <a:t>True</a:t>
+            </a:r>
+            <a:r>
+              <a:rPr lang="pt-BR" sz="2000" dirty="0">
+                <a:latin typeface="Times New Roman" panose="02020603050405020304" pitchFamily="18" charset="0"/>
+                <a:cs typeface="Times New Roman" panose="02020603050405020304" pitchFamily="18" charset="0"/>
+              </a:rPr>
+              <a:t>:</a:t>
+            </a:r>
           </a:p>
           <a:p>
             <a:pPr marL="0" indent="0" algn="just">
               <a:buNone/>
             </a:pPr>
-            <a:endParaRPr lang="pt-BR" sz="2400" dirty="0">
-              <a:latin typeface="Times New Roman" panose="02020603050405020304" pitchFamily="18" charset="0"/>
-              <a:cs typeface="Times New Roman" panose="02020603050405020304" pitchFamily="18" charset="0"/>
-            </a:endParaRPr>
+            <a:r>
+              <a:rPr lang="pt-BR" sz="2000" dirty="0">
+                <a:latin typeface="Times New Roman" panose="02020603050405020304" pitchFamily="18" charset="0"/>
+                <a:cs typeface="Times New Roman" panose="02020603050405020304" pitchFamily="18" charset="0"/>
+              </a:rPr>
+              <a:t>	 </a:t>
+            </a:r>
+            <a:r>
+              <a:rPr lang="pt-BR" sz="2000" dirty="0" err="1">
+                <a:latin typeface="Times New Roman" panose="02020603050405020304" pitchFamily="18" charset="0"/>
+                <a:cs typeface="Times New Roman" panose="02020603050405020304" pitchFamily="18" charset="0"/>
+              </a:rPr>
+              <a:t>led_onboard_pino.value</a:t>
+            </a:r>
+            <a:r>
+              <a:rPr lang="pt-BR" sz="2000" dirty="0">
+                <a:latin typeface="Times New Roman" panose="02020603050405020304" pitchFamily="18" charset="0"/>
+                <a:cs typeface="Times New Roman" panose="02020603050405020304" pitchFamily="18" charset="0"/>
+              </a:rPr>
+              <a:t>(1)</a:t>
+            </a:r>
           </a:p>
           <a:p>
             <a:pPr marL="0" indent="0" algn="just">
               <a:buNone/>
             </a:pPr>
             <a:r>
-              <a:rPr lang="pt-BR" sz="2400" dirty="0">
-                <a:latin typeface="Times New Roman" panose="02020603050405020304" pitchFamily="18" charset="0"/>
-                <a:cs typeface="Times New Roman" panose="02020603050405020304" pitchFamily="18" charset="0"/>
-              </a:rPr>
-              <a:t>-- </a:t>
-            </a:r>
-            <a:r>
-              <a:rPr lang="pt-BR" sz="2400" b="1" dirty="0">
-                <a:latin typeface="Times New Roman" panose="02020603050405020304" pitchFamily="18" charset="0"/>
-                <a:cs typeface="Times New Roman" panose="02020603050405020304" pitchFamily="18" charset="0"/>
-              </a:rPr>
-              <a:t>Comunidade</a:t>
+              <a:rPr lang="pt-BR" sz="2000" dirty="0">
+                <a:latin typeface="Times New Roman" panose="02020603050405020304" pitchFamily="18" charset="0"/>
+                <a:cs typeface="Times New Roman" panose="02020603050405020304" pitchFamily="18" charset="0"/>
+              </a:rPr>
+              <a:t>	 </a:t>
+            </a:r>
+            <a:r>
+              <a:rPr lang="pt-BR" sz="2000" b="1" dirty="0" err="1">
+                <a:latin typeface="Times New Roman" panose="02020603050405020304" pitchFamily="18" charset="0"/>
+                <a:cs typeface="Times New Roman" panose="02020603050405020304" pitchFamily="18" charset="0"/>
+              </a:rPr>
+              <a:t>utime</a:t>
+            </a:r>
+            <a:r>
+              <a:rPr lang="pt-BR" sz="2000" dirty="0" err="1">
+                <a:latin typeface="Times New Roman" panose="02020603050405020304" pitchFamily="18" charset="0"/>
+                <a:cs typeface="Times New Roman" panose="02020603050405020304" pitchFamily="18" charset="0"/>
+              </a:rPr>
+              <a:t>.sleep</a:t>
+            </a:r>
+            <a:r>
+              <a:rPr lang="pt-BR" sz="2000" dirty="0">
+                <a:latin typeface="Times New Roman" panose="02020603050405020304" pitchFamily="18" charset="0"/>
+                <a:cs typeface="Times New Roman" panose="02020603050405020304" pitchFamily="18" charset="0"/>
+              </a:rPr>
+              <a:t>(0.8)</a:t>
             </a:r>
           </a:p>
           <a:p>
@@ -8870,24 +9000,66 @@
               <a:buNone/>
             </a:pPr>
             <a:r>
-              <a:rPr lang="pt-BR" sz="2400" dirty="0">
-                <a:latin typeface="Times New Roman" panose="02020603050405020304" pitchFamily="18" charset="0"/>
-                <a:cs typeface="Times New Roman" panose="02020603050405020304" pitchFamily="18" charset="0"/>
-                <a:hlinkClick r:id="rId6"/>
-              </a:rPr>
-              <a:t>https://www.banana-pi.org/</a:t>
-            </a:r>
-            <a:endParaRPr lang="pt-BR" sz="2400" dirty="0">
-              <a:latin typeface="Times New Roman" panose="02020603050405020304" pitchFamily="18" charset="0"/>
-              <a:cs typeface="Times New Roman" panose="02020603050405020304" pitchFamily="18" charset="0"/>
-            </a:endParaRPr>
+              <a:rPr lang="pt-BR" sz="2000" dirty="0">
+                <a:latin typeface="Times New Roman" panose="02020603050405020304" pitchFamily="18" charset="0"/>
+                <a:cs typeface="Times New Roman" panose="02020603050405020304" pitchFamily="18" charset="0"/>
+              </a:rPr>
+              <a:t>	 </a:t>
+            </a:r>
+            <a:r>
+              <a:rPr lang="pt-BR" sz="2000" dirty="0" err="1">
+                <a:latin typeface="Times New Roman" panose="02020603050405020304" pitchFamily="18" charset="0"/>
+                <a:cs typeface="Times New Roman" panose="02020603050405020304" pitchFamily="18" charset="0"/>
+              </a:rPr>
+              <a:t>led_onboard_pino.value</a:t>
+            </a:r>
+            <a:r>
+              <a:rPr lang="pt-BR" sz="2000" dirty="0">
+                <a:latin typeface="Times New Roman" panose="02020603050405020304" pitchFamily="18" charset="0"/>
+                <a:cs typeface="Times New Roman" panose="02020603050405020304" pitchFamily="18" charset="0"/>
+              </a:rPr>
+              <a:t>(0)</a:t>
+            </a:r>
+          </a:p>
+          <a:p>
+            <a:pPr marL="0" indent="0" algn="just">
+              <a:buNone/>
+            </a:pPr>
+            <a:r>
+              <a:rPr lang="pt-BR" sz="2000" dirty="0">
+                <a:latin typeface="Times New Roman" panose="02020603050405020304" pitchFamily="18" charset="0"/>
+                <a:cs typeface="Times New Roman" panose="02020603050405020304" pitchFamily="18" charset="0"/>
+              </a:rPr>
+              <a:t>	 </a:t>
+            </a:r>
+            <a:r>
+              <a:rPr lang="pt-BR" sz="2000" b="1" dirty="0" err="1">
+                <a:latin typeface="Times New Roman" panose="02020603050405020304" pitchFamily="18" charset="0"/>
+                <a:cs typeface="Times New Roman" panose="02020603050405020304" pitchFamily="18" charset="0"/>
+              </a:rPr>
+              <a:t>utime</a:t>
+            </a:r>
+            <a:r>
+              <a:rPr lang="pt-BR" sz="2000" dirty="0" err="1">
+                <a:latin typeface="Times New Roman" panose="02020603050405020304" pitchFamily="18" charset="0"/>
+                <a:cs typeface="Times New Roman" panose="02020603050405020304" pitchFamily="18" charset="0"/>
+              </a:rPr>
+              <a:t>.sleep</a:t>
+            </a:r>
+            <a:r>
+              <a:rPr lang="pt-BR" sz="2000" dirty="0">
+                <a:latin typeface="Times New Roman" panose="02020603050405020304" pitchFamily="18" charset="0"/>
+                <a:cs typeface="Times New Roman" panose="02020603050405020304" pitchFamily="18" charset="0"/>
+              </a:rPr>
+              <a:t>(0.5)</a:t>
+            </a:r>
           </a:p>
         </p:txBody>
       </p:sp>
     </p:spTree>
     <p:extLst>
       <p:ext uri="{BB962C8B-B14F-4D97-AF65-F5344CB8AC3E}">
-        <p14:creationId xmlns:p14="http://schemas.microsoft.com/office/powerpoint/2010/main" val="2470652989"/>
+        <p14:creationId xmlns:p14="http://schemas.microsoft.com/office/powerpoint/2010/main" val="4161419489"/>
       </p:ext>
     </p:extLst>
   </p:cSld>
@@ -8938,6 +9110,1888 @@
           <a:lstStyle/>
           <a:p>
             <a:r>
+              <a:rPr lang="en-US" b="1" dirty="0">
+                <a:solidFill>
+                  <a:srgbClr val="0070C0"/>
+                </a:solidFill>
+              </a:rPr>
+              <a:t>Raspberry Pi 4 - </a:t>
+            </a:r>
+            <a:r>
+              <a:rPr lang="en-US" b="1" dirty="0" err="1">
+                <a:solidFill>
+                  <a:srgbClr val="0070C0"/>
+                </a:solidFill>
+              </a:rPr>
+              <a:t>MicroPython</a:t>
+            </a:r>
+            <a:endParaRPr lang="en-US" b="1" dirty="0">
+              <a:solidFill>
+                <a:srgbClr val="0070C0"/>
+              </a:solidFill>
+            </a:endParaRPr>
+          </a:p>
+        </p:txBody>
+      </p:sp>
+      <p:sp>
+        <p:nvSpPr>
+          <p:cNvPr id="8" name="Text Placeholder 2"/>
+          <p:cNvSpPr>
+            <a:spLocks noGrp="1"/>
+          </p:cNvSpPr>
+          <p:nvPr>
+            <p:ph type="body" sz="half" idx="1"/>
+          </p:nvPr>
+        </p:nvSpPr>
+        <p:spPr>
+          <a:xfrm>
+            <a:off x="142865" y="944118"/>
+            <a:ext cx="8865056" cy="4078986"/>
+          </a:xfrm>
+        </p:spPr>
+        <p:txBody>
+          <a:bodyPr>
+            <a:noAutofit/>
+          </a:bodyPr>
+          <a:lstStyle/>
+          <a:p>
+            <a:pPr marL="0" indent="0" algn="just">
+              <a:buNone/>
+            </a:pPr>
+            <a:r>
+              <a:rPr lang="pt-BR" sz="2000" b="1" dirty="0">
+                <a:solidFill>
+                  <a:srgbClr val="FF0000"/>
+                </a:solidFill>
+                <a:latin typeface="Times New Roman" panose="02020603050405020304" pitchFamily="18" charset="0"/>
+                <a:cs typeface="Times New Roman" panose="02020603050405020304" pitchFamily="18" charset="0"/>
+              </a:rPr>
+              <a:t># Exemplo 2</a:t>
+            </a:r>
+            <a:endParaRPr lang="pt-BR" sz="2000" dirty="0">
+              <a:latin typeface="Times New Roman" panose="02020603050405020304" pitchFamily="18" charset="0"/>
+              <a:cs typeface="Times New Roman" panose="02020603050405020304" pitchFamily="18" charset="0"/>
+            </a:endParaRPr>
+          </a:p>
+          <a:p>
+            <a:pPr marL="0" indent="0" algn="just">
+              <a:buNone/>
+            </a:pPr>
+            <a:r>
+              <a:rPr lang="pt-BR" sz="2000" dirty="0" err="1">
+                <a:latin typeface="Times New Roman" panose="02020603050405020304" pitchFamily="18" charset="0"/>
+                <a:cs typeface="Times New Roman" panose="02020603050405020304" pitchFamily="18" charset="0"/>
+              </a:rPr>
+              <a:t>import</a:t>
+            </a:r>
+            <a:r>
+              <a:rPr lang="pt-BR" sz="2000" dirty="0">
+                <a:latin typeface="Times New Roman" panose="02020603050405020304" pitchFamily="18" charset="0"/>
+                <a:cs typeface="Times New Roman" panose="02020603050405020304" pitchFamily="18" charset="0"/>
+              </a:rPr>
+              <a:t> </a:t>
+            </a:r>
+            <a:r>
+              <a:rPr lang="pt-BR" sz="2000" b="1" dirty="0" err="1">
+                <a:latin typeface="Times New Roman" panose="02020603050405020304" pitchFamily="18" charset="0"/>
+                <a:cs typeface="Times New Roman" panose="02020603050405020304" pitchFamily="18" charset="0"/>
+              </a:rPr>
+              <a:t>machine</a:t>
+            </a:r>
+            <a:endParaRPr lang="pt-BR" sz="2000" b="1" dirty="0">
+              <a:latin typeface="Times New Roman" panose="02020603050405020304" pitchFamily="18" charset="0"/>
+              <a:cs typeface="Times New Roman" panose="02020603050405020304" pitchFamily="18" charset="0"/>
+            </a:endParaRPr>
+          </a:p>
+          <a:p>
+            <a:pPr marL="0" indent="0" algn="just">
+              <a:buNone/>
+            </a:pPr>
+            <a:r>
+              <a:rPr lang="pt-BR" sz="2000" dirty="0" err="1">
+                <a:latin typeface="Times New Roman" panose="02020603050405020304" pitchFamily="18" charset="0"/>
+                <a:cs typeface="Times New Roman" panose="02020603050405020304" pitchFamily="18" charset="0"/>
+              </a:rPr>
+              <a:t>import</a:t>
+            </a:r>
+            <a:r>
+              <a:rPr lang="pt-BR" sz="2000" dirty="0">
+                <a:latin typeface="Times New Roman" panose="02020603050405020304" pitchFamily="18" charset="0"/>
+                <a:cs typeface="Times New Roman" panose="02020603050405020304" pitchFamily="18" charset="0"/>
+              </a:rPr>
+              <a:t> </a:t>
+            </a:r>
+            <a:r>
+              <a:rPr lang="pt-BR" sz="2000" b="1" dirty="0" err="1">
+                <a:latin typeface="Times New Roman" panose="02020603050405020304" pitchFamily="18" charset="0"/>
+                <a:cs typeface="Times New Roman" panose="02020603050405020304" pitchFamily="18" charset="0"/>
+              </a:rPr>
+              <a:t>utime</a:t>
+            </a:r>
+            <a:endParaRPr lang="pt-BR" sz="2000" b="1" dirty="0">
+              <a:latin typeface="Times New Roman" panose="02020603050405020304" pitchFamily="18" charset="0"/>
+              <a:cs typeface="Times New Roman" panose="02020603050405020304" pitchFamily="18" charset="0"/>
+            </a:endParaRPr>
+          </a:p>
+          <a:p>
+            <a:pPr marL="0" indent="0" algn="just">
+              <a:buNone/>
+            </a:pPr>
+            <a:endParaRPr lang="pt-BR" sz="2000" dirty="0">
+              <a:latin typeface="Times New Roman" panose="02020603050405020304" pitchFamily="18" charset="0"/>
+              <a:cs typeface="Times New Roman" panose="02020603050405020304" pitchFamily="18" charset="0"/>
+            </a:endParaRPr>
+          </a:p>
+          <a:p>
+            <a:pPr marL="0" indent="0" algn="just">
+              <a:buNone/>
+            </a:pPr>
+            <a:r>
+              <a:rPr lang="pt-BR" sz="2000" dirty="0" err="1">
+                <a:latin typeface="Times New Roman" panose="02020603050405020304" pitchFamily="18" charset="0"/>
+                <a:cs typeface="Times New Roman" panose="02020603050405020304" pitchFamily="18" charset="0"/>
+              </a:rPr>
+              <a:t>sda</a:t>
+            </a:r>
+            <a:r>
+              <a:rPr lang="pt-BR" sz="2000" dirty="0">
+                <a:latin typeface="Times New Roman" panose="02020603050405020304" pitchFamily="18" charset="0"/>
+                <a:cs typeface="Times New Roman" panose="02020603050405020304" pitchFamily="18" charset="0"/>
+              </a:rPr>
+              <a:t> = </a:t>
+            </a:r>
+            <a:r>
+              <a:rPr lang="pt-BR" sz="2000" b="1" dirty="0" err="1">
+                <a:latin typeface="Times New Roman" panose="02020603050405020304" pitchFamily="18" charset="0"/>
+                <a:cs typeface="Times New Roman" panose="02020603050405020304" pitchFamily="18" charset="0"/>
+              </a:rPr>
+              <a:t>machine</a:t>
+            </a:r>
+            <a:r>
+              <a:rPr lang="pt-BR" sz="2000" dirty="0" err="1">
+                <a:latin typeface="Times New Roman" panose="02020603050405020304" pitchFamily="18" charset="0"/>
+                <a:cs typeface="Times New Roman" panose="02020603050405020304" pitchFamily="18" charset="0"/>
+              </a:rPr>
+              <a:t>.Pin</a:t>
+            </a:r>
+            <a:r>
+              <a:rPr lang="pt-BR" sz="2000" dirty="0">
+                <a:latin typeface="Times New Roman" panose="02020603050405020304" pitchFamily="18" charset="0"/>
+                <a:cs typeface="Times New Roman" panose="02020603050405020304" pitchFamily="18" charset="0"/>
+              </a:rPr>
+              <a:t>(0)</a:t>
+            </a:r>
+          </a:p>
+          <a:p>
+            <a:pPr marL="0" indent="0" algn="just">
+              <a:buNone/>
+            </a:pPr>
+            <a:r>
+              <a:rPr lang="pt-BR" sz="2000" dirty="0" err="1">
+                <a:latin typeface="Times New Roman" panose="02020603050405020304" pitchFamily="18" charset="0"/>
+                <a:cs typeface="Times New Roman" panose="02020603050405020304" pitchFamily="18" charset="0"/>
+              </a:rPr>
+              <a:t>scl</a:t>
+            </a:r>
+            <a:r>
+              <a:rPr lang="pt-BR" sz="2000" dirty="0">
+                <a:latin typeface="Times New Roman" panose="02020603050405020304" pitchFamily="18" charset="0"/>
+                <a:cs typeface="Times New Roman" panose="02020603050405020304" pitchFamily="18" charset="0"/>
+              </a:rPr>
+              <a:t> = </a:t>
+            </a:r>
+            <a:r>
+              <a:rPr lang="pt-BR" sz="2000" b="1" dirty="0" err="1">
+                <a:latin typeface="Times New Roman" panose="02020603050405020304" pitchFamily="18" charset="0"/>
+                <a:cs typeface="Times New Roman" panose="02020603050405020304" pitchFamily="18" charset="0"/>
+              </a:rPr>
+              <a:t>machine</a:t>
+            </a:r>
+            <a:r>
+              <a:rPr lang="pt-BR" sz="2000" dirty="0" err="1">
+                <a:latin typeface="Times New Roman" panose="02020603050405020304" pitchFamily="18" charset="0"/>
+                <a:cs typeface="Times New Roman" panose="02020603050405020304" pitchFamily="18" charset="0"/>
+              </a:rPr>
+              <a:t>.Pin</a:t>
+            </a:r>
+            <a:r>
+              <a:rPr lang="pt-BR" sz="2000" dirty="0">
+                <a:latin typeface="Times New Roman" panose="02020603050405020304" pitchFamily="18" charset="0"/>
+                <a:cs typeface="Times New Roman" panose="02020603050405020304" pitchFamily="18" charset="0"/>
+              </a:rPr>
+              <a:t>(1)</a:t>
+            </a:r>
+          </a:p>
+          <a:p>
+            <a:pPr marL="0" indent="0" algn="just">
+              <a:buNone/>
+            </a:pPr>
+            <a:r>
+              <a:rPr lang="pt-BR" sz="2000" dirty="0">
+                <a:latin typeface="Times New Roman" panose="02020603050405020304" pitchFamily="18" charset="0"/>
+                <a:cs typeface="Times New Roman" panose="02020603050405020304" pitchFamily="18" charset="0"/>
+              </a:rPr>
+              <a:t>i2c = </a:t>
+            </a:r>
+            <a:r>
+              <a:rPr lang="pt-BR" sz="2000" b="1" dirty="0">
+                <a:latin typeface="Times New Roman" panose="02020603050405020304" pitchFamily="18" charset="0"/>
+                <a:cs typeface="Times New Roman" panose="02020603050405020304" pitchFamily="18" charset="0"/>
+              </a:rPr>
+              <a:t>machine</a:t>
+            </a:r>
+            <a:r>
+              <a:rPr lang="pt-BR" sz="2000" dirty="0">
+                <a:latin typeface="Times New Roman" panose="02020603050405020304" pitchFamily="18" charset="0"/>
+                <a:cs typeface="Times New Roman" panose="02020603050405020304" pitchFamily="18" charset="0"/>
+              </a:rPr>
+              <a:t>.I2C(0, </a:t>
+            </a:r>
+            <a:r>
+              <a:rPr lang="pt-BR" sz="2000" dirty="0" err="1">
+                <a:latin typeface="Times New Roman" panose="02020603050405020304" pitchFamily="18" charset="0"/>
+                <a:cs typeface="Times New Roman" panose="02020603050405020304" pitchFamily="18" charset="0"/>
+              </a:rPr>
+              <a:t>sda</a:t>
+            </a:r>
+            <a:r>
+              <a:rPr lang="pt-BR" sz="2000" dirty="0">
+                <a:latin typeface="Times New Roman" panose="02020603050405020304" pitchFamily="18" charset="0"/>
+                <a:cs typeface="Times New Roman" panose="02020603050405020304" pitchFamily="18" charset="0"/>
+              </a:rPr>
+              <a:t>=</a:t>
+            </a:r>
+            <a:r>
+              <a:rPr lang="pt-BR" sz="2000" dirty="0" err="1">
+                <a:latin typeface="Times New Roman" panose="02020603050405020304" pitchFamily="18" charset="0"/>
+                <a:cs typeface="Times New Roman" panose="02020603050405020304" pitchFamily="18" charset="0"/>
+              </a:rPr>
+              <a:t>sda</a:t>
+            </a:r>
+            <a:r>
+              <a:rPr lang="pt-BR" sz="2000" dirty="0">
+                <a:latin typeface="Times New Roman" panose="02020603050405020304" pitchFamily="18" charset="0"/>
+                <a:cs typeface="Times New Roman" panose="02020603050405020304" pitchFamily="18" charset="0"/>
+              </a:rPr>
+              <a:t>, </a:t>
+            </a:r>
+            <a:r>
+              <a:rPr lang="pt-BR" sz="2000" dirty="0" err="1">
+                <a:latin typeface="Times New Roman" panose="02020603050405020304" pitchFamily="18" charset="0"/>
+                <a:cs typeface="Times New Roman" panose="02020603050405020304" pitchFamily="18" charset="0"/>
+              </a:rPr>
+              <a:t>scl</a:t>
+            </a:r>
+            <a:r>
+              <a:rPr lang="pt-BR" sz="2000" dirty="0">
+                <a:latin typeface="Times New Roman" panose="02020603050405020304" pitchFamily="18" charset="0"/>
+                <a:cs typeface="Times New Roman" panose="02020603050405020304" pitchFamily="18" charset="0"/>
+              </a:rPr>
+              <a:t>=</a:t>
+            </a:r>
+            <a:r>
+              <a:rPr lang="pt-BR" sz="2000" dirty="0" err="1">
+                <a:latin typeface="Times New Roman" panose="02020603050405020304" pitchFamily="18" charset="0"/>
+                <a:cs typeface="Times New Roman" panose="02020603050405020304" pitchFamily="18" charset="0"/>
+              </a:rPr>
+              <a:t>scl</a:t>
+            </a:r>
+            <a:r>
+              <a:rPr lang="pt-BR" sz="2000" dirty="0">
+                <a:latin typeface="Times New Roman" panose="02020603050405020304" pitchFamily="18" charset="0"/>
+                <a:cs typeface="Times New Roman" panose="02020603050405020304" pitchFamily="18" charset="0"/>
+              </a:rPr>
+              <a:t>, freq.= 400000)</a:t>
+            </a:r>
+          </a:p>
+          <a:p>
+            <a:pPr marL="0" indent="0" algn="just">
+              <a:buNone/>
+            </a:pPr>
+            <a:r>
+              <a:rPr lang="pt-BR" sz="2000" dirty="0" err="1">
+                <a:latin typeface="Times New Roman" panose="02020603050405020304" pitchFamily="18" charset="0"/>
+                <a:cs typeface="Times New Roman" panose="02020603050405020304" pitchFamily="18" charset="0"/>
+              </a:rPr>
+              <a:t>adc</a:t>
+            </a:r>
+            <a:r>
+              <a:rPr lang="pt-BR" sz="2000" dirty="0">
+                <a:latin typeface="Times New Roman" panose="02020603050405020304" pitchFamily="18" charset="0"/>
+                <a:cs typeface="Times New Roman" panose="02020603050405020304" pitchFamily="18" charset="0"/>
+              </a:rPr>
+              <a:t> = </a:t>
+            </a:r>
+            <a:r>
+              <a:rPr lang="pt-BR" sz="2000" b="1" dirty="0" err="1">
+                <a:latin typeface="Times New Roman" panose="02020603050405020304" pitchFamily="18" charset="0"/>
+                <a:cs typeface="Times New Roman" panose="02020603050405020304" pitchFamily="18" charset="0"/>
+              </a:rPr>
+              <a:t>machine</a:t>
+            </a:r>
+            <a:r>
+              <a:rPr lang="pt-BR" sz="2000" dirty="0" err="1">
+                <a:latin typeface="Times New Roman" panose="02020603050405020304" pitchFamily="18" charset="0"/>
+                <a:cs typeface="Times New Roman" panose="02020603050405020304" pitchFamily="18" charset="0"/>
+              </a:rPr>
+              <a:t>.ADC</a:t>
+            </a:r>
+            <a:r>
+              <a:rPr lang="pt-BR" sz="2000" dirty="0">
+                <a:latin typeface="Times New Roman" panose="02020603050405020304" pitchFamily="18" charset="0"/>
+                <a:cs typeface="Times New Roman" panose="02020603050405020304" pitchFamily="18" charset="0"/>
+              </a:rPr>
+              <a:t>(4)</a:t>
+            </a:r>
+          </a:p>
+          <a:p>
+            <a:pPr marL="0" indent="0" algn="just">
+              <a:buNone/>
+            </a:pPr>
+            <a:r>
+              <a:rPr lang="pt-BR" sz="2000" dirty="0" err="1">
+                <a:latin typeface="Times New Roman" panose="02020603050405020304" pitchFamily="18" charset="0"/>
+                <a:cs typeface="Times New Roman" panose="02020603050405020304" pitchFamily="18" charset="0"/>
+              </a:rPr>
+              <a:t>conversion_factor</a:t>
+            </a:r>
+            <a:r>
+              <a:rPr lang="pt-BR" sz="2000" dirty="0">
+                <a:latin typeface="Times New Roman" panose="02020603050405020304" pitchFamily="18" charset="0"/>
+                <a:cs typeface="Times New Roman" panose="02020603050405020304" pitchFamily="18" charset="0"/>
+              </a:rPr>
+              <a:t> = 3.3 / (65535)</a:t>
+            </a:r>
+          </a:p>
+          <a:p>
+            <a:pPr marL="0" indent="0" algn="just">
+              <a:buNone/>
+            </a:pPr>
+            <a:endParaRPr lang="pt-BR" sz="2000" dirty="0">
+              <a:latin typeface="Times New Roman" panose="02020603050405020304" pitchFamily="18" charset="0"/>
+              <a:cs typeface="Times New Roman" panose="02020603050405020304" pitchFamily="18" charset="0"/>
+            </a:endParaRPr>
+          </a:p>
+          <a:p>
+            <a:pPr marL="0" indent="0" algn="just">
+              <a:buNone/>
+            </a:pPr>
+            <a:r>
+              <a:rPr lang="pt-BR" sz="2000" dirty="0">
+                <a:latin typeface="Times New Roman" panose="02020603050405020304" pitchFamily="18" charset="0"/>
+                <a:cs typeface="Times New Roman" panose="02020603050405020304" pitchFamily="18" charset="0"/>
+              </a:rPr>
+              <a:t>...</a:t>
+            </a:r>
+          </a:p>
+        </p:txBody>
+      </p:sp>
+    </p:spTree>
+    <p:extLst>
+      <p:ext uri="{BB962C8B-B14F-4D97-AF65-F5344CB8AC3E}">
+        <p14:creationId xmlns:p14="http://schemas.microsoft.com/office/powerpoint/2010/main" val="1037266154"/>
+      </p:ext>
+    </p:extLst>
+  </p:cSld>
+  <p:clrMapOvr>
+    <a:masterClrMapping/>
+  </p:clrMapOvr>
+  <p:transition spd="med"/>
+</p:sld>
+</file>
+
+<file path=ppt/slides/slide22.xml><?xml version="1.0" encoding="utf-8"?>
+<p:sld xmlns:a="http://schemas.openxmlformats.org/drawingml/2006/main" xmlns:r="http://schemas.openxmlformats.org/officeDocument/2006/relationships" xmlns:p="http://schemas.openxmlformats.org/presentationml/2006/main">
+  <p:cSld>
+    <p:spTree>
+      <p:nvGrpSpPr>
+        <p:cNvPr id="1" name=""/>
+        <p:cNvGrpSpPr/>
+        <p:nvPr/>
+      </p:nvGrpSpPr>
+      <p:grpSpPr>
+        <a:xfrm>
+          <a:off x="0" y="0"/>
+          <a:ext cx="0" cy="0"/>
+          <a:chOff x="0" y="0"/>
+          <a:chExt cx="0" cy="0"/>
+        </a:xfrm>
+      </p:grpSpPr>
+      <p:sp>
+        <p:nvSpPr>
+          <p:cNvPr id="6" name="Title 1"/>
+          <p:cNvSpPr>
+            <a:spLocks noGrp="1"/>
+          </p:cNvSpPr>
+          <p:nvPr>
+            <p:ph type="title"/>
+          </p:nvPr>
+        </p:nvSpPr>
+        <p:spPr>
+          <a:xfrm>
+            <a:off x="457200" y="205980"/>
+            <a:ext cx="8229600" cy="857251"/>
+          </a:xfrm>
+        </p:spPr>
+        <p:txBody>
+          <a:bodyPr>
+            <a:normAutofit/>
+          </a:bodyPr>
+          <a:lstStyle/>
+          <a:p>
+            <a:r>
+              <a:rPr lang="en-US" b="1" dirty="0">
+                <a:solidFill>
+                  <a:srgbClr val="0070C0"/>
+                </a:solidFill>
+              </a:rPr>
+              <a:t>Raspberry Pi 4 - </a:t>
+            </a:r>
+            <a:r>
+              <a:rPr lang="en-US" b="1" dirty="0" err="1">
+                <a:solidFill>
+                  <a:srgbClr val="0070C0"/>
+                </a:solidFill>
+              </a:rPr>
+              <a:t>MicroPython</a:t>
+            </a:r>
+            <a:endParaRPr lang="en-US" b="1" dirty="0">
+              <a:solidFill>
+                <a:srgbClr val="0070C0"/>
+              </a:solidFill>
+            </a:endParaRPr>
+          </a:p>
+        </p:txBody>
+      </p:sp>
+      <p:sp>
+        <p:nvSpPr>
+          <p:cNvPr id="8" name="Text Placeholder 2"/>
+          <p:cNvSpPr>
+            <a:spLocks noGrp="1"/>
+          </p:cNvSpPr>
+          <p:nvPr>
+            <p:ph type="body" sz="half" idx="1"/>
+          </p:nvPr>
+        </p:nvSpPr>
+        <p:spPr>
+          <a:xfrm>
+            <a:off x="142865" y="944118"/>
+            <a:ext cx="8865056" cy="4078986"/>
+          </a:xfrm>
+        </p:spPr>
+        <p:txBody>
+          <a:bodyPr>
+            <a:noAutofit/>
+          </a:bodyPr>
+          <a:lstStyle/>
+          <a:p>
+            <a:pPr marL="0" indent="0" algn="just">
+              <a:buNone/>
+            </a:pPr>
+            <a:r>
+              <a:rPr lang="pt-BR" sz="2000" b="1" dirty="0">
+                <a:latin typeface="Times New Roman" panose="02020603050405020304" pitchFamily="18" charset="0"/>
+                <a:cs typeface="Times New Roman" panose="02020603050405020304" pitchFamily="18" charset="0"/>
+              </a:rPr>
+              <a:t>...</a:t>
+            </a:r>
+          </a:p>
+          <a:p>
+            <a:pPr marL="0" indent="0" algn="just">
+              <a:buNone/>
+            </a:pPr>
+            <a:endParaRPr lang="pt-BR" sz="2000" b="1" dirty="0">
+              <a:latin typeface="Times New Roman" panose="02020603050405020304" pitchFamily="18" charset="0"/>
+              <a:cs typeface="Times New Roman" panose="02020603050405020304" pitchFamily="18" charset="0"/>
+            </a:endParaRPr>
+          </a:p>
+          <a:p>
+            <a:pPr marL="0" indent="0" algn="just">
+              <a:buNone/>
+            </a:pPr>
+            <a:r>
+              <a:rPr lang="pt-BR" sz="2000" b="1" dirty="0" err="1">
+                <a:latin typeface="Times New Roman" panose="02020603050405020304" pitchFamily="18" charset="0"/>
+                <a:cs typeface="Times New Roman" panose="02020603050405020304" pitchFamily="18" charset="0"/>
+              </a:rPr>
+              <a:t>while</a:t>
+            </a:r>
+            <a:r>
+              <a:rPr lang="pt-BR" sz="2000" dirty="0">
+                <a:latin typeface="Times New Roman" panose="02020603050405020304" pitchFamily="18" charset="0"/>
+                <a:cs typeface="Times New Roman" panose="02020603050405020304" pitchFamily="18" charset="0"/>
+              </a:rPr>
+              <a:t> </a:t>
+            </a:r>
+            <a:r>
+              <a:rPr lang="pt-BR" sz="2000" dirty="0" err="1">
+                <a:latin typeface="Times New Roman" panose="02020603050405020304" pitchFamily="18" charset="0"/>
+                <a:cs typeface="Times New Roman" panose="02020603050405020304" pitchFamily="18" charset="0"/>
+              </a:rPr>
+              <a:t>True</a:t>
+            </a:r>
+            <a:r>
+              <a:rPr lang="pt-BR" sz="2000" dirty="0">
+                <a:latin typeface="Times New Roman" panose="02020603050405020304" pitchFamily="18" charset="0"/>
+                <a:cs typeface="Times New Roman" panose="02020603050405020304" pitchFamily="18" charset="0"/>
+              </a:rPr>
+              <a:t>:</a:t>
+            </a:r>
+          </a:p>
+          <a:p>
+            <a:pPr marL="0" indent="0" algn="just">
+              <a:buNone/>
+            </a:pPr>
+            <a:r>
+              <a:rPr lang="pt-BR" sz="2000" dirty="0">
+                <a:latin typeface="Times New Roman" panose="02020603050405020304" pitchFamily="18" charset="0"/>
+                <a:cs typeface="Times New Roman" panose="02020603050405020304" pitchFamily="18" charset="0"/>
+              </a:rPr>
+              <a:t>	 </a:t>
+            </a:r>
+            <a:r>
+              <a:rPr lang="pt-BR" sz="2000" dirty="0" err="1">
+                <a:latin typeface="Times New Roman" panose="02020603050405020304" pitchFamily="18" charset="0"/>
+                <a:cs typeface="Times New Roman" panose="02020603050405020304" pitchFamily="18" charset="0"/>
+              </a:rPr>
+              <a:t>reading</a:t>
+            </a:r>
+            <a:r>
+              <a:rPr lang="pt-BR" sz="2000" dirty="0">
+                <a:latin typeface="Times New Roman" panose="02020603050405020304" pitchFamily="18" charset="0"/>
+                <a:cs typeface="Times New Roman" panose="02020603050405020304" pitchFamily="18" charset="0"/>
+              </a:rPr>
+              <a:t> = adc.</a:t>
+            </a:r>
+            <a:r>
+              <a:rPr lang="pt-BR" sz="2000" b="1" dirty="0">
+                <a:latin typeface="Times New Roman" panose="02020603050405020304" pitchFamily="18" charset="0"/>
+                <a:cs typeface="Times New Roman" panose="02020603050405020304" pitchFamily="18" charset="0"/>
+              </a:rPr>
+              <a:t>read_u16()</a:t>
+            </a:r>
+            <a:r>
+              <a:rPr lang="pt-BR" sz="2000" dirty="0">
+                <a:latin typeface="Times New Roman" panose="02020603050405020304" pitchFamily="18" charset="0"/>
+                <a:cs typeface="Times New Roman" panose="02020603050405020304" pitchFamily="18" charset="0"/>
+              </a:rPr>
+              <a:t> * </a:t>
+            </a:r>
+            <a:r>
+              <a:rPr lang="pt-BR" sz="2000" dirty="0" err="1">
+                <a:latin typeface="Times New Roman" panose="02020603050405020304" pitchFamily="18" charset="0"/>
+                <a:cs typeface="Times New Roman" panose="02020603050405020304" pitchFamily="18" charset="0"/>
+              </a:rPr>
+              <a:t>conversion_fator</a:t>
+            </a:r>
+            <a:endParaRPr lang="pt-BR" sz="2000" dirty="0">
+              <a:latin typeface="Times New Roman" panose="02020603050405020304" pitchFamily="18" charset="0"/>
+              <a:cs typeface="Times New Roman" panose="02020603050405020304" pitchFamily="18" charset="0"/>
+            </a:endParaRPr>
+          </a:p>
+          <a:p>
+            <a:pPr marL="0" indent="0" algn="just">
+              <a:buNone/>
+            </a:pPr>
+            <a:r>
+              <a:rPr lang="pt-BR" sz="2000" dirty="0">
+                <a:latin typeface="Times New Roman" panose="02020603050405020304" pitchFamily="18" charset="0"/>
+                <a:cs typeface="Times New Roman" panose="02020603050405020304" pitchFamily="18" charset="0"/>
+              </a:rPr>
+              <a:t>	 </a:t>
+            </a:r>
+            <a:r>
+              <a:rPr lang="pt-BR" sz="2000" dirty="0" err="1">
+                <a:latin typeface="Times New Roman" panose="02020603050405020304" pitchFamily="18" charset="0"/>
+                <a:cs typeface="Times New Roman" panose="02020603050405020304" pitchFamily="18" charset="0"/>
+              </a:rPr>
+              <a:t>temperatute</a:t>
+            </a:r>
+            <a:r>
+              <a:rPr lang="pt-BR" sz="2000" dirty="0">
+                <a:latin typeface="Times New Roman" panose="02020603050405020304" pitchFamily="18" charset="0"/>
+                <a:cs typeface="Times New Roman" panose="02020603050405020304" pitchFamily="18" charset="0"/>
+              </a:rPr>
+              <a:t> = 25 – (</a:t>
+            </a:r>
+            <a:r>
+              <a:rPr lang="pt-BR" sz="2000" dirty="0" err="1">
+                <a:latin typeface="Times New Roman" panose="02020603050405020304" pitchFamily="18" charset="0"/>
+                <a:cs typeface="Times New Roman" panose="02020603050405020304" pitchFamily="18" charset="0"/>
+              </a:rPr>
+              <a:t>reading</a:t>
+            </a:r>
+            <a:r>
+              <a:rPr lang="pt-BR" sz="2000" dirty="0">
+                <a:latin typeface="Times New Roman" panose="02020603050405020304" pitchFamily="18" charset="0"/>
+                <a:cs typeface="Times New Roman" panose="02020603050405020304" pitchFamily="18" charset="0"/>
+              </a:rPr>
+              <a:t> – 0.706) / 0.001721</a:t>
+            </a:r>
+          </a:p>
+          <a:p>
+            <a:pPr marL="0" indent="0" algn="just">
+              <a:buNone/>
+            </a:pPr>
+            <a:r>
+              <a:rPr lang="pt-BR" sz="2000" dirty="0">
+                <a:latin typeface="Times New Roman" panose="02020603050405020304" pitchFamily="18" charset="0"/>
+                <a:cs typeface="Times New Roman" panose="02020603050405020304" pitchFamily="18" charset="0"/>
+              </a:rPr>
+              <a:t>	 i2c.</a:t>
+            </a:r>
+            <a:r>
+              <a:rPr lang="pt-BR" sz="2000" b="1" dirty="0">
+                <a:latin typeface="Times New Roman" panose="02020603050405020304" pitchFamily="18" charset="0"/>
+                <a:cs typeface="Times New Roman" panose="02020603050405020304" pitchFamily="18" charset="0"/>
+              </a:rPr>
+              <a:t>writeto</a:t>
+            </a:r>
+            <a:r>
+              <a:rPr lang="pt-BR" sz="2000" dirty="0">
+                <a:latin typeface="Times New Roman" panose="02020603050405020304" pitchFamily="18" charset="0"/>
+                <a:cs typeface="Times New Roman" panose="02020603050405020304" pitchFamily="18" charset="0"/>
+              </a:rPr>
+              <a:t>(114, ‘\x7C’)</a:t>
+            </a:r>
+          </a:p>
+          <a:p>
+            <a:pPr marL="0" indent="0" algn="just">
+              <a:buNone/>
+            </a:pPr>
+            <a:r>
+              <a:rPr lang="pt-BR" sz="2000" dirty="0">
+                <a:latin typeface="Times New Roman" panose="02020603050405020304" pitchFamily="18" charset="0"/>
+                <a:cs typeface="Times New Roman" panose="02020603050405020304" pitchFamily="18" charset="0"/>
+              </a:rPr>
+              <a:t>	 i2c.</a:t>
+            </a:r>
+            <a:r>
+              <a:rPr lang="pt-BR" sz="2000" b="1" dirty="0">
+                <a:latin typeface="Times New Roman" panose="02020603050405020304" pitchFamily="18" charset="0"/>
+                <a:cs typeface="Times New Roman" panose="02020603050405020304" pitchFamily="18" charset="0"/>
+              </a:rPr>
+              <a:t>writeto</a:t>
+            </a:r>
+            <a:r>
+              <a:rPr lang="pt-BR" sz="2000" dirty="0">
+                <a:latin typeface="Times New Roman" panose="02020603050405020304" pitchFamily="18" charset="0"/>
+                <a:cs typeface="Times New Roman" panose="02020603050405020304" pitchFamily="18" charset="0"/>
+              </a:rPr>
+              <a:t>(114, ‘\x2D’)</a:t>
+            </a:r>
+          </a:p>
+          <a:p>
+            <a:pPr marL="0" indent="0" algn="just">
+              <a:buNone/>
+            </a:pPr>
+            <a:r>
+              <a:rPr lang="pt-BR" sz="2000" dirty="0">
+                <a:latin typeface="Times New Roman" panose="02020603050405020304" pitchFamily="18" charset="0"/>
+                <a:cs typeface="Times New Roman" panose="02020603050405020304" pitchFamily="18" charset="0"/>
+              </a:rPr>
+              <a:t>        </a:t>
+            </a:r>
+            <a:r>
+              <a:rPr lang="pt-BR" sz="2000" dirty="0" err="1">
+                <a:latin typeface="Times New Roman" panose="02020603050405020304" pitchFamily="18" charset="0"/>
+                <a:cs typeface="Times New Roman" panose="02020603050405020304" pitchFamily="18" charset="0"/>
+              </a:rPr>
+              <a:t>out_string</a:t>
+            </a:r>
+            <a:r>
+              <a:rPr lang="pt-BR" sz="2000" dirty="0">
+                <a:latin typeface="Times New Roman" panose="02020603050405020304" pitchFamily="18" charset="0"/>
+                <a:cs typeface="Times New Roman" panose="02020603050405020304" pitchFamily="18" charset="0"/>
+              </a:rPr>
+              <a:t> = “</a:t>
+            </a:r>
+            <a:r>
+              <a:rPr lang="pt-BR" sz="2000" dirty="0" err="1">
+                <a:latin typeface="Times New Roman" panose="02020603050405020304" pitchFamily="18" charset="0"/>
+                <a:cs typeface="Times New Roman" panose="02020603050405020304" pitchFamily="18" charset="0"/>
+              </a:rPr>
+              <a:t>Temp</a:t>
+            </a:r>
+            <a:r>
+              <a:rPr lang="pt-BR" sz="2000" dirty="0">
+                <a:latin typeface="Times New Roman" panose="02020603050405020304" pitchFamily="18" charset="0"/>
+                <a:cs typeface="Times New Roman" panose="02020603050405020304" pitchFamily="18" charset="0"/>
+              </a:rPr>
+              <a:t>: “ + </a:t>
+            </a:r>
+            <a:r>
+              <a:rPr lang="pt-BR" sz="2000" b="1" dirty="0" err="1">
+                <a:latin typeface="Times New Roman" panose="02020603050405020304" pitchFamily="18" charset="0"/>
+                <a:cs typeface="Times New Roman" panose="02020603050405020304" pitchFamily="18" charset="0"/>
+              </a:rPr>
+              <a:t>str</a:t>
+            </a:r>
+            <a:r>
+              <a:rPr lang="pt-BR" sz="2000" dirty="0">
+                <a:latin typeface="Times New Roman" panose="02020603050405020304" pitchFamily="18" charset="0"/>
+                <a:cs typeface="Times New Roman" panose="02020603050405020304" pitchFamily="18" charset="0"/>
+              </a:rPr>
+              <a:t>(</a:t>
+            </a:r>
+            <a:r>
+              <a:rPr lang="pt-BR" sz="2000" dirty="0" err="1">
+                <a:latin typeface="Times New Roman" panose="02020603050405020304" pitchFamily="18" charset="0"/>
+                <a:cs typeface="Times New Roman" panose="02020603050405020304" pitchFamily="18" charset="0"/>
+              </a:rPr>
+              <a:t>temperature</a:t>
+            </a:r>
+            <a:r>
+              <a:rPr lang="pt-BR" sz="2000" dirty="0">
+                <a:latin typeface="Times New Roman" panose="02020603050405020304" pitchFamily="18" charset="0"/>
+                <a:cs typeface="Times New Roman" panose="02020603050405020304" pitchFamily="18" charset="0"/>
+              </a:rPr>
+              <a:t>)</a:t>
+            </a:r>
+          </a:p>
+          <a:p>
+            <a:pPr marL="0" indent="0" algn="just">
+              <a:buNone/>
+            </a:pPr>
+            <a:r>
+              <a:rPr lang="pt-BR" sz="2000" dirty="0">
+                <a:latin typeface="Times New Roman" panose="02020603050405020304" pitchFamily="18" charset="0"/>
+                <a:cs typeface="Times New Roman" panose="02020603050405020304" pitchFamily="18" charset="0"/>
+              </a:rPr>
+              <a:t>	 i2c.</a:t>
+            </a:r>
+            <a:r>
+              <a:rPr lang="pt-BR" sz="2000" b="1" dirty="0">
+                <a:latin typeface="Times New Roman" panose="02020603050405020304" pitchFamily="18" charset="0"/>
+                <a:cs typeface="Times New Roman" panose="02020603050405020304" pitchFamily="18" charset="0"/>
+              </a:rPr>
+              <a:t>writeto</a:t>
+            </a:r>
+            <a:r>
+              <a:rPr lang="pt-BR" sz="2000" dirty="0">
+                <a:latin typeface="Times New Roman" panose="02020603050405020304" pitchFamily="18" charset="0"/>
+                <a:cs typeface="Times New Roman" panose="02020603050405020304" pitchFamily="18" charset="0"/>
+              </a:rPr>
+              <a:t>(114, </a:t>
+            </a:r>
+            <a:r>
+              <a:rPr lang="pt-BR" sz="2000" dirty="0" err="1">
+                <a:latin typeface="Times New Roman" panose="02020603050405020304" pitchFamily="18" charset="0"/>
+                <a:cs typeface="Times New Roman" panose="02020603050405020304" pitchFamily="18" charset="0"/>
+              </a:rPr>
+              <a:t>out_string</a:t>
+            </a:r>
+            <a:r>
+              <a:rPr lang="pt-BR" sz="2000" dirty="0">
+                <a:latin typeface="Times New Roman" panose="02020603050405020304" pitchFamily="18" charset="0"/>
+                <a:cs typeface="Times New Roman" panose="02020603050405020304" pitchFamily="18" charset="0"/>
+              </a:rPr>
+              <a:t>)</a:t>
+            </a:r>
+          </a:p>
+          <a:p>
+            <a:pPr marL="0" indent="0" algn="just">
+              <a:buNone/>
+            </a:pPr>
+            <a:r>
+              <a:rPr lang="pt-BR" sz="2000" dirty="0">
+                <a:latin typeface="Times New Roman" panose="02020603050405020304" pitchFamily="18" charset="0"/>
+                <a:cs typeface="Times New Roman" panose="02020603050405020304" pitchFamily="18" charset="0"/>
+              </a:rPr>
+              <a:t>         </a:t>
+            </a:r>
+            <a:r>
+              <a:rPr lang="pt-BR" sz="2000" b="1" dirty="0" err="1">
+                <a:latin typeface="Times New Roman" panose="02020603050405020304" pitchFamily="18" charset="0"/>
+                <a:cs typeface="Times New Roman" panose="02020603050405020304" pitchFamily="18" charset="0"/>
+              </a:rPr>
+              <a:t>utime</a:t>
+            </a:r>
+            <a:r>
+              <a:rPr lang="pt-BR" sz="2000" dirty="0" err="1">
+                <a:latin typeface="Times New Roman" panose="02020603050405020304" pitchFamily="18" charset="0"/>
+                <a:cs typeface="Times New Roman" panose="02020603050405020304" pitchFamily="18" charset="0"/>
+              </a:rPr>
+              <a:t>.sleep</a:t>
+            </a:r>
+            <a:r>
+              <a:rPr lang="pt-BR" sz="2000" dirty="0">
+                <a:latin typeface="Times New Roman" panose="02020603050405020304" pitchFamily="18" charset="0"/>
+                <a:cs typeface="Times New Roman" panose="02020603050405020304" pitchFamily="18" charset="0"/>
+              </a:rPr>
+              <a:t>(2)</a:t>
+            </a:r>
+          </a:p>
+        </p:txBody>
+      </p:sp>
+    </p:spTree>
+    <p:extLst>
+      <p:ext uri="{BB962C8B-B14F-4D97-AF65-F5344CB8AC3E}">
+        <p14:creationId xmlns:p14="http://schemas.microsoft.com/office/powerpoint/2010/main" val="2350750309"/>
+      </p:ext>
+    </p:extLst>
+  </p:cSld>
+  <p:clrMapOvr>
+    <a:masterClrMapping/>
+  </p:clrMapOvr>
+  <p:transition spd="med"/>
+</p:sld>
+</file>
+
+<file path=ppt/slides/slide23.xml><?xml version="1.0" encoding="utf-8"?>
+<p:sld xmlns:a="http://schemas.openxmlformats.org/drawingml/2006/main" xmlns:r="http://schemas.openxmlformats.org/officeDocument/2006/relationships" xmlns:p="http://schemas.openxmlformats.org/presentationml/2006/main">
+  <p:cSld>
+    <p:spTree>
+      <p:nvGrpSpPr>
+        <p:cNvPr id="1" name=""/>
+        <p:cNvGrpSpPr/>
+        <p:nvPr/>
+      </p:nvGrpSpPr>
+      <p:grpSpPr>
+        <a:xfrm>
+          <a:off x="0" y="0"/>
+          <a:ext cx="0" cy="0"/>
+          <a:chOff x="0" y="0"/>
+          <a:chExt cx="0" cy="0"/>
+        </a:xfrm>
+      </p:grpSpPr>
+      <p:sp>
+        <p:nvSpPr>
+          <p:cNvPr id="6" name="Title 1"/>
+          <p:cNvSpPr>
+            <a:spLocks noGrp="1"/>
+          </p:cNvSpPr>
+          <p:nvPr>
+            <p:ph type="title"/>
+          </p:nvPr>
+        </p:nvSpPr>
+        <p:spPr>
+          <a:xfrm>
+            <a:off x="457200" y="205980"/>
+            <a:ext cx="8229600" cy="857251"/>
+          </a:xfrm>
+        </p:spPr>
+        <p:txBody>
+          <a:bodyPr>
+            <a:normAutofit/>
+          </a:bodyPr>
+          <a:lstStyle/>
+          <a:p>
+            <a:r>
+              <a:rPr lang="en-US" b="1" dirty="0" err="1">
+                <a:solidFill>
+                  <a:srgbClr val="0070C0"/>
+                </a:solidFill>
+              </a:rPr>
+              <a:t>Leitura</a:t>
+            </a:r>
+            <a:r>
+              <a:rPr lang="en-US" b="1" dirty="0">
+                <a:solidFill>
+                  <a:srgbClr val="0070C0"/>
+                </a:solidFill>
+              </a:rPr>
+              <a:t> </a:t>
+            </a:r>
+            <a:r>
+              <a:rPr lang="en-US" b="1" dirty="0" err="1">
+                <a:solidFill>
+                  <a:srgbClr val="0070C0"/>
+                </a:solidFill>
+              </a:rPr>
+              <a:t>Específica</a:t>
+            </a:r>
+            <a:endParaRPr lang="en-US" b="1" dirty="0">
+              <a:solidFill>
+                <a:srgbClr val="0070C0"/>
+              </a:solidFill>
+            </a:endParaRPr>
+          </a:p>
+        </p:txBody>
+      </p:sp>
+      <p:sp>
+        <p:nvSpPr>
+          <p:cNvPr id="8" name="Text Placeholder 2"/>
+          <p:cNvSpPr>
+            <a:spLocks noGrp="1"/>
+          </p:cNvSpPr>
+          <p:nvPr>
+            <p:ph type="body" sz="half" idx="1"/>
+          </p:nvPr>
+        </p:nvSpPr>
+        <p:spPr>
+          <a:xfrm>
+            <a:off x="142865" y="1053846"/>
+            <a:ext cx="8865056" cy="3969258"/>
+          </a:xfrm>
+        </p:spPr>
+        <p:txBody>
+          <a:bodyPr>
+            <a:noAutofit/>
+          </a:bodyPr>
+          <a:lstStyle/>
+          <a:p>
+            <a:pPr marL="0" indent="0" algn="just">
+              <a:buNone/>
+            </a:pPr>
+            <a:r>
+              <a:rPr lang="pt-BR" sz="2000" dirty="0">
+                <a:latin typeface="Times New Roman" panose="02020603050405020304" pitchFamily="18" charset="0"/>
+                <a:cs typeface="Times New Roman" panose="02020603050405020304" pitchFamily="18" charset="0"/>
+              </a:rPr>
+              <a:t>[1] Introdução </a:t>
+            </a:r>
+            <a:r>
+              <a:rPr lang="pt-BR" sz="2000" dirty="0" err="1">
+                <a:latin typeface="Times New Roman" panose="02020603050405020304" pitchFamily="18" charset="0"/>
+                <a:cs typeface="Times New Roman" panose="02020603050405020304" pitchFamily="18" charset="0"/>
+              </a:rPr>
+              <a:t>Raspberry</a:t>
+            </a:r>
+            <a:r>
+              <a:rPr lang="pt-BR" sz="2000" dirty="0">
+                <a:latin typeface="Times New Roman" panose="02020603050405020304" pitchFamily="18" charset="0"/>
+                <a:cs typeface="Times New Roman" panose="02020603050405020304" pitchFamily="18" charset="0"/>
+              </a:rPr>
+              <a:t> Pi.</a:t>
+            </a:r>
+          </a:p>
+          <a:p>
+            <a:pPr marL="0" indent="0" algn="just">
+              <a:buNone/>
+            </a:pPr>
+            <a:r>
+              <a:rPr lang="pt-BR" sz="2000" b="1" dirty="0">
+                <a:solidFill>
+                  <a:srgbClr val="FF0000"/>
+                </a:solidFill>
+                <a:latin typeface="Times New Roman" panose="02020603050405020304" pitchFamily="18" charset="0"/>
+                <a:cs typeface="Times New Roman" panose="02020603050405020304" pitchFamily="18" charset="0"/>
+              </a:rPr>
+              <a:t>Disponível em: </a:t>
+            </a:r>
+            <a:r>
+              <a:rPr lang="pt-BR" sz="2000" dirty="0">
+                <a:latin typeface="Times New Roman" panose="02020603050405020304" pitchFamily="18" charset="0"/>
+                <a:cs typeface="Times New Roman" panose="02020603050405020304" pitchFamily="18" charset="0"/>
+                <a:hlinkClick r:id="rId3"/>
+              </a:rPr>
+              <a:t>https://www.tecnoveste.com.br/raspberry-pi-o-que-e-para-que-serve-e-como-funciona/</a:t>
+            </a:r>
+            <a:endParaRPr lang="pt-BR" sz="2000" dirty="0">
+              <a:latin typeface="Times New Roman" panose="02020603050405020304" pitchFamily="18" charset="0"/>
+              <a:cs typeface="Times New Roman" panose="02020603050405020304" pitchFamily="18" charset="0"/>
+            </a:endParaRPr>
+          </a:p>
+          <a:p>
+            <a:pPr marL="0" indent="0" algn="just">
+              <a:buNone/>
+            </a:pPr>
+            <a:endParaRPr lang="pt-BR" sz="2000" dirty="0">
+              <a:latin typeface="Times New Roman" panose="02020603050405020304" pitchFamily="18" charset="0"/>
+              <a:cs typeface="Times New Roman" panose="02020603050405020304" pitchFamily="18" charset="0"/>
+            </a:endParaRPr>
+          </a:p>
+          <a:p>
+            <a:pPr marL="0" indent="0" algn="just">
+              <a:buNone/>
+            </a:pPr>
+            <a:r>
+              <a:rPr lang="pt-BR" sz="2000" dirty="0">
+                <a:latin typeface="Times New Roman" panose="02020603050405020304" pitchFamily="18" charset="0"/>
+                <a:cs typeface="Times New Roman" panose="02020603050405020304" pitchFamily="18" charset="0"/>
+              </a:rPr>
+              <a:t>[2] Site </a:t>
+            </a:r>
+            <a:r>
+              <a:rPr lang="pt-BR" sz="2000" dirty="0" err="1">
+                <a:latin typeface="Times New Roman" panose="02020603050405020304" pitchFamily="18" charset="0"/>
+                <a:cs typeface="Times New Roman" panose="02020603050405020304" pitchFamily="18" charset="0"/>
+              </a:rPr>
+              <a:t>Raspberry</a:t>
+            </a:r>
+            <a:r>
+              <a:rPr lang="pt-BR" sz="2000" dirty="0">
+                <a:latin typeface="Times New Roman" panose="02020603050405020304" pitchFamily="18" charset="0"/>
+                <a:cs typeface="Times New Roman" panose="02020603050405020304" pitchFamily="18" charset="0"/>
+              </a:rPr>
+              <a:t> Pi. </a:t>
+            </a:r>
+          </a:p>
+          <a:p>
+            <a:pPr marL="0" indent="0" algn="just">
+              <a:buNone/>
+            </a:pPr>
+            <a:r>
+              <a:rPr lang="pt-BR" sz="2000" b="1" dirty="0">
+                <a:solidFill>
+                  <a:srgbClr val="FF0000"/>
+                </a:solidFill>
+                <a:latin typeface="Times New Roman" panose="02020603050405020304" pitchFamily="18" charset="0"/>
+                <a:cs typeface="Times New Roman" panose="02020603050405020304" pitchFamily="18" charset="0"/>
+              </a:rPr>
+              <a:t>Disponível em: </a:t>
+            </a:r>
+            <a:r>
+              <a:rPr lang="pt-BR" sz="2000" dirty="0">
+                <a:latin typeface="Times New Roman" panose="02020603050405020304" pitchFamily="18" charset="0"/>
+                <a:cs typeface="Times New Roman" panose="02020603050405020304" pitchFamily="18" charset="0"/>
+                <a:hlinkClick r:id="rId4"/>
+              </a:rPr>
+              <a:t>https://www.raspberrypi.org/</a:t>
+            </a:r>
+            <a:endParaRPr lang="pt-BR" sz="2000" dirty="0">
+              <a:latin typeface="Times New Roman" panose="02020603050405020304" pitchFamily="18" charset="0"/>
+              <a:cs typeface="Times New Roman" panose="02020603050405020304" pitchFamily="18" charset="0"/>
+            </a:endParaRPr>
+          </a:p>
+          <a:p>
+            <a:pPr marL="0" indent="0" algn="just">
+              <a:buNone/>
+            </a:pPr>
+            <a:endParaRPr lang="pt-BR" sz="2000" dirty="0">
+              <a:latin typeface="Times New Roman" panose="02020603050405020304" pitchFamily="18" charset="0"/>
+              <a:cs typeface="Times New Roman" panose="02020603050405020304" pitchFamily="18" charset="0"/>
+            </a:endParaRPr>
+          </a:p>
+          <a:p>
+            <a:pPr marL="0" indent="0" algn="just">
+              <a:buNone/>
+            </a:pPr>
+            <a:r>
+              <a:rPr lang="pt-BR" sz="2000" dirty="0">
+                <a:latin typeface="Times New Roman" panose="02020603050405020304" pitchFamily="18" charset="0"/>
+                <a:cs typeface="Times New Roman" panose="02020603050405020304" pitchFamily="18" charset="0"/>
+              </a:rPr>
+              <a:t>[3] Livro </a:t>
+            </a:r>
+            <a:r>
+              <a:rPr lang="pt-BR" sz="2000" dirty="0" err="1">
+                <a:latin typeface="Times New Roman" panose="02020603050405020304" pitchFamily="18" charset="0"/>
+                <a:cs typeface="Times New Roman" panose="02020603050405020304" pitchFamily="18" charset="0"/>
+              </a:rPr>
+              <a:t>Raspberry</a:t>
+            </a:r>
+            <a:r>
+              <a:rPr lang="pt-BR" sz="2000" dirty="0">
+                <a:latin typeface="Times New Roman" panose="02020603050405020304" pitchFamily="18" charset="0"/>
+                <a:cs typeface="Times New Roman" panose="02020603050405020304" pitchFamily="18" charset="0"/>
+              </a:rPr>
+              <a:t> Pi. </a:t>
+            </a:r>
+          </a:p>
+          <a:p>
+            <a:pPr marL="0" indent="0" algn="just">
+              <a:buNone/>
+            </a:pPr>
+            <a:r>
+              <a:rPr lang="pt-BR" sz="2000" b="1" dirty="0">
+                <a:solidFill>
+                  <a:srgbClr val="FF0000"/>
+                </a:solidFill>
+                <a:latin typeface="Times New Roman" panose="02020603050405020304" pitchFamily="18" charset="0"/>
+                <a:cs typeface="Times New Roman" panose="02020603050405020304" pitchFamily="18" charset="0"/>
+              </a:rPr>
+              <a:t>Disponível em: </a:t>
+            </a:r>
+          </a:p>
+          <a:p>
+            <a:pPr marL="0" indent="0" algn="just">
+              <a:buNone/>
+            </a:pPr>
+            <a:r>
+              <a:rPr lang="pt-BR" sz="2000" dirty="0">
+                <a:latin typeface="Times New Roman" panose="02020603050405020304" pitchFamily="18" charset="0"/>
+                <a:cs typeface="Times New Roman" panose="02020603050405020304" pitchFamily="18" charset="0"/>
+                <a:hlinkClick r:id="rId5"/>
+              </a:rPr>
+              <a:t>https://books.google.com.br/books?id=pEQpw3-A4wwC&amp;dq=Raspberry+PI&amp;hl=pt-BR&amp;lr=</a:t>
+            </a:r>
+            <a:endParaRPr lang="pt-BR" sz="2000" dirty="0">
+              <a:latin typeface="Times New Roman" panose="02020603050405020304" pitchFamily="18" charset="0"/>
+              <a:cs typeface="Times New Roman" panose="02020603050405020304" pitchFamily="18" charset="0"/>
+            </a:endParaRPr>
+          </a:p>
+        </p:txBody>
+      </p:sp>
+    </p:spTree>
+    <p:extLst>
+      <p:ext uri="{BB962C8B-B14F-4D97-AF65-F5344CB8AC3E}">
+        <p14:creationId xmlns:p14="http://schemas.microsoft.com/office/powerpoint/2010/main" val="3680270425"/>
+      </p:ext>
+    </p:extLst>
+  </p:cSld>
+  <p:clrMapOvr>
+    <a:masterClrMapping/>
+  </p:clrMapOvr>
+  <p:transition spd="med"/>
+</p:sld>
+</file>
+
+<file path=ppt/slides/slide24.xml><?xml version="1.0" encoding="utf-8"?>
+<p:sld xmlns:a="http://schemas.openxmlformats.org/drawingml/2006/main" xmlns:r="http://schemas.openxmlformats.org/officeDocument/2006/relationships" xmlns:p="http://schemas.openxmlformats.org/presentationml/2006/main">
+  <p:cSld>
+    <p:spTree>
+      <p:nvGrpSpPr>
+        <p:cNvPr id="1" name=""/>
+        <p:cNvGrpSpPr/>
+        <p:nvPr/>
+      </p:nvGrpSpPr>
+      <p:grpSpPr>
+        <a:xfrm>
+          <a:off x="0" y="0"/>
+          <a:ext cx="0" cy="0"/>
+          <a:chOff x="0" y="0"/>
+          <a:chExt cx="0" cy="0"/>
+        </a:xfrm>
+      </p:grpSpPr>
+      <p:sp>
+        <p:nvSpPr>
+          <p:cNvPr id="6" name="Title 1"/>
+          <p:cNvSpPr>
+            <a:spLocks noGrp="1"/>
+          </p:cNvSpPr>
+          <p:nvPr>
+            <p:ph type="title"/>
+          </p:nvPr>
+        </p:nvSpPr>
+        <p:spPr>
+          <a:xfrm>
+            <a:off x="457200" y="205980"/>
+            <a:ext cx="8229600" cy="857251"/>
+          </a:xfrm>
+        </p:spPr>
+        <p:txBody>
+          <a:bodyPr>
+            <a:normAutofit/>
+          </a:bodyPr>
+          <a:lstStyle/>
+          <a:p>
+            <a:r>
+              <a:rPr lang="en-US" b="1" dirty="0" err="1">
+                <a:solidFill>
+                  <a:srgbClr val="0070C0"/>
+                </a:solidFill>
+              </a:rPr>
+              <a:t>Aprenda</a:t>
+            </a:r>
+            <a:r>
+              <a:rPr lang="en-US" b="1" dirty="0">
+                <a:solidFill>
+                  <a:srgbClr val="0070C0"/>
+                </a:solidFill>
+              </a:rPr>
+              <a:t>+</a:t>
+            </a:r>
+          </a:p>
+        </p:txBody>
+      </p:sp>
+      <p:sp>
+        <p:nvSpPr>
+          <p:cNvPr id="8" name="Text Placeholder 2"/>
+          <p:cNvSpPr>
+            <a:spLocks noGrp="1"/>
+          </p:cNvSpPr>
+          <p:nvPr>
+            <p:ph type="body" sz="half" idx="1"/>
+          </p:nvPr>
+        </p:nvSpPr>
+        <p:spPr>
+          <a:xfrm>
+            <a:off x="142865" y="1200150"/>
+            <a:ext cx="8865056" cy="3737370"/>
+          </a:xfrm>
+        </p:spPr>
+        <p:txBody>
+          <a:bodyPr>
+            <a:noAutofit/>
+          </a:bodyPr>
+          <a:lstStyle/>
+          <a:p>
+            <a:pPr marL="0" indent="0" algn="just">
+              <a:buNone/>
+            </a:pPr>
+            <a:r>
+              <a:rPr lang="pt-BR" sz="2200" dirty="0">
+                <a:latin typeface="Times New Roman" panose="02020603050405020304" pitchFamily="18" charset="0"/>
+                <a:cs typeface="Times New Roman" panose="02020603050405020304" pitchFamily="18" charset="0"/>
+              </a:rPr>
+              <a:t>[1] Plataforma </a:t>
+            </a:r>
+            <a:r>
+              <a:rPr lang="pt-BR" sz="2200" dirty="0" err="1">
+                <a:latin typeface="Times New Roman" panose="02020603050405020304" pitchFamily="18" charset="0"/>
+                <a:cs typeface="Times New Roman" panose="02020603050405020304" pitchFamily="18" charset="0"/>
+              </a:rPr>
+              <a:t>Raspberry</a:t>
+            </a:r>
+            <a:r>
+              <a:rPr lang="pt-BR" sz="2200" dirty="0">
+                <a:latin typeface="Times New Roman" panose="02020603050405020304" pitchFamily="18" charset="0"/>
+                <a:cs typeface="Times New Roman" panose="02020603050405020304" pitchFamily="18" charset="0"/>
+              </a:rPr>
+              <a:t> Pi – Ambiente </a:t>
+            </a:r>
+            <a:r>
+              <a:rPr lang="pt-BR" sz="2200" dirty="0" err="1">
+                <a:latin typeface="Times New Roman" panose="02020603050405020304" pitchFamily="18" charset="0"/>
+                <a:cs typeface="Times New Roman" panose="02020603050405020304" pitchFamily="18" charset="0"/>
+              </a:rPr>
+              <a:t>Dev</a:t>
+            </a:r>
+            <a:r>
+              <a:rPr lang="pt-BR" sz="2200" dirty="0">
+                <a:latin typeface="Times New Roman" panose="02020603050405020304" pitchFamily="18" charset="0"/>
+                <a:cs typeface="Times New Roman" panose="02020603050405020304" pitchFamily="18" charset="0"/>
+              </a:rPr>
+              <a:t> Python (</a:t>
+            </a:r>
+            <a:r>
+              <a:rPr lang="pt-BR" sz="2200" dirty="0">
+                <a:latin typeface="Times New Roman" panose="02020603050405020304" pitchFamily="18" charset="0"/>
+                <a:cs typeface="Times New Roman" panose="02020603050405020304" pitchFamily="18" charset="0"/>
+                <a:hlinkClick r:id="rId3"/>
+              </a:rPr>
+              <a:t>https://thonny.org/</a:t>
+            </a:r>
+            <a:r>
+              <a:rPr lang="pt-BR" sz="2200" dirty="0">
+                <a:latin typeface="Times New Roman" panose="02020603050405020304" pitchFamily="18" charset="0"/>
+                <a:cs typeface="Times New Roman" panose="02020603050405020304" pitchFamily="18" charset="0"/>
+              </a:rPr>
+              <a:t>)</a:t>
+            </a:r>
+          </a:p>
+          <a:p>
+            <a:pPr marL="0" indent="0" algn="just">
+              <a:buNone/>
+            </a:pPr>
+            <a:r>
+              <a:rPr lang="pt-BR" sz="2200" b="1" dirty="0">
+                <a:solidFill>
+                  <a:srgbClr val="FF0000"/>
+                </a:solidFill>
+                <a:latin typeface="Times New Roman" panose="02020603050405020304" pitchFamily="18" charset="0"/>
+                <a:cs typeface="Times New Roman" panose="02020603050405020304" pitchFamily="18" charset="0"/>
+              </a:rPr>
+              <a:t>Disponível em: </a:t>
+            </a:r>
+            <a:r>
+              <a:rPr lang="pt-BR" sz="2200" dirty="0">
+                <a:latin typeface="Times New Roman" panose="02020603050405020304" pitchFamily="18" charset="0"/>
+                <a:cs typeface="Times New Roman" panose="02020603050405020304" pitchFamily="18" charset="0"/>
+                <a:hlinkClick r:id="rId4"/>
+              </a:rPr>
+              <a:t>https://www.youtube.com/watch?v=VrZ1APrN6uc</a:t>
+            </a:r>
+            <a:endParaRPr lang="pt-BR" sz="2200" dirty="0">
+              <a:latin typeface="Times New Roman" panose="02020603050405020304" pitchFamily="18" charset="0"/>
+              <a:cs typeface="Times New Roman" panose="02020603050405020304" pitchFamily="18" charset="0"/>
+            </a:endParaRPr>
+          </a:p>
+          <a:p>
+            <a:pPr marL="0" indent="0" algn="just">
+              <a:buNone/>
+            </a:pPr>
+            <a:endParaRPr lang="pt-BR" sz="2200" dirty="0">
+              <a:latin typeface="Times New Roman" panose="02020603050405020304" pitchFamily="18" charset="0"/>
+              <a:cs typeface="Times New Roman" panose="02020603050405020304" pitchFamily="18" charset="0"/>
+            </a:endParaRPr>
+          </a:p>
+          <a:p>
+            <a:pPr marL="0" indent="0" algn="just">
+              <a:buNone/>
+            </a:pPr>
+            <a:endParaRPr lang="pt-BR" sz="2200" dirty="0">
+              <a:latin typeface="Times New Roman" panose="02020603050405020304" pitchFamily="18" charset="0"/>
+              <a:cs typeface="Times New Roman" panose="02020603050405020304" pitchFamily="18" charset="0"/>
+            </a:endParaRPr>
+          </a:p>
+          <a:p>
+            <a:pPr marL="0" indent="0" algn="just">
+              <a:buNone/>
+            </a:pPr>
+            <a:r>
+              <a:rPr lang="pt-BR" sz="2200" dirty="0">
+                <a:latin typeface="Times New Roman" panose="02020603050405020304" pitchFamily="18" charset="0"/>
+                <a:cs typeface="Times New Roman" panose="02020603050405020304" pitchFamily="18" charset="0"/>
+              </a:rPr>
+              <a:t>[2] Transformando </a:t>
+            </a:r>
+            <a:r>
+              <a:rPr lang="pt-BR" sz="2200" dirty="0" err="1">
+                <a:latin typeface="Times New Roman" panose="02020603050405020304" pitchFamily="18" charset="0"/>
+                <a:cs typeface="Times New Roman" panose="02020603050405020304" pitchFamily="18" charset="0"/>
+              </a:rPr>
+              <a:t>Raspberry</a:t>
+            </a:r>
+            <a:r>
+              <a:rPr lang="pt-BR" sz="2200" dirty="0">
+                <a:latin typeface="Times New Roman" panose="02020603050405020304" pitchFamily="18" charset="0"/>
+                <a:cs typeface="Times New Roman" panose="02020603050405020304" pitchFamily="18" charset="0"/>
+              </a:rPr>
+              <a:t> Pi em </a:t>
+            </a:r>
+            <a:r>
+              <a:rPr lang="pt-BR" sz="2200" b="1" dirty="0">
+                <a:latin typeface="Times New Roman" panose="02020603050405020304" pitchFamily="18" charset="0"/>
+                <a:cs typeface="Times New Roman" panose="02020603050405020304" pitchFamily="18" charset="0"/>
+              </a:rPr>
+              <a:t>plataforma de </a:t>
+            </a:r>
+            <a:r>
+              <a:rPr lang="pt-BR" sz="2200" b="1" dirty="0">
+                <a:solidFill>
+                  <a:srgbClr val="FF0000"/>
+                </a:solidFill>
+                <a:latin typeface="Times New Roman" panose="02020603050405020304" pitchFamily="18" charset="0"/>
+                <a:cs typeface="Times New Roman" panose="02020603050405020304" pitchFamily="18" charset="0"/>
+              </a:rPr>
+              <a:t>ataque USB </a:t>
+            </a:r>
+            <a:r>
+              <a:rPr lang="pt-BR" sz="2200" dirty="0">
+                <a:latin typeface="Times New Roman" panose="02020603050405020304" pitchFamily="18" charset="0"/>
+                <a:cs typeface="Times New Roman" panose="02020603050405020304" pitchFamily="18" charset="0"/>
+              </a:rPr>
+              <a:t>- </a:t>
+            </a:r>
+            <a:r>
+              <a:rPr lang="pt-BR" sz="2200" b="1" dirty="0">
+                <a:latin typeface="Times New Roman" panose="02020603050405020304" pitchFamily="18" charset="0"/>
+                <a:cs typeface="Times New Roman" panose="02020603050405020304" pitchFamily="18" charset="0"/>
+              </a:rPr>
+              <a:t>P4wnP1</a:t>
+            </a:r>
+          </a:p>
+          <a:p>
+            <a:pPr marL="0" indent="0" algn="just">
+              <a:buNone/>
+            </a:pPr>
+            <a:r>
+              <a:rPr lang="pt-BR" sz="2200" b="1" dirty="0">
+                <a:solidFill>
+                  <a:srgbClr val="FF0000"/>
+                </a:solidFill>
+                <a:latin typeface="Times New Roman" panose="02020603050405020304" pitchFamily="18" charset="0"/>
+                <a:cs typeface="Times New Roman" panose="02020603050405020304" pitchFamily="18" charset="0"/>
+              </a:rPr>
+              <a:t>Disponível em: </a:t>
+            </a:r>
+            <a:r>
+              <a:rPr lang="pt-BR" sz="2200" dirty="0">
+                <a:latin typeface="Times New Roman" panose="02020603050405020304" pitchFamily="18" charset="0"/>
+                <a:cs typeface="Times New Roman" panose="02020603050405020304" pitchFamily="18" charset="0"/>
+                <a:hlinkClick r:id="rId5"/>
+              </a:rPr>
+              <a:t>https://www.youtube.com/watch?v=DKg0EXyTaMA</a:t>
+            </a:r>
+            <a:endParaRPr lang="pt-BR" sz="2200" dirty="0">
+              <a:latin typeface="Times New Roman" panose="02020603050405020304" pitchFamily="18" charset="0"/>
+              <a:cs typeface="Times New Roman" panose="02020603050405020304" pitchFamily="18" charset="0"/>
+            </a:endParaRPr>
+          </a:p>
+          <a:p>
+            <a:pPr marL="0" indent="0" algn="just">
+              <a:buNone/>
+            </a:pPr>
+            <a:endParaRPr lang="pt-BR" sz="2200" dirty="0">
+              <a:latin typeface="Times New Roman" panose="02020603050405020304" pitchFamily="18" charset="0"/>
+              <a:cs typeface="Times New Roman" panose="02020603050405020304" pitchFamily="18" charset="0"/>
+            </a:endParaRPr>
+          </a:p>
+        </p:txBody>
+      </p:sp>
+    </p:spTree>
+    <p:extLst>
+      <p:ext uri="{BB962C8B-B14F-4D97-AF65-F5344CB8AC3E}">
+        <p14:creationId xmlns:p14="http://schemas.microsoft.com/office/powerpoint/2010/main" val="2747596967"/>
+      </p:ext>
+    </p:extLst>
+  </p:cSld>
+  <p:clrMapOvr>
+    <a:masterClrMapping/>
+  </p:clrMapOvr>
+  <p:transition spd="med"/>
+</p:sld>
+</file>
+
+<file path=ppt/slides/slide25.xml><?xml version="1.0" encoding="utf-8"?>
+<p:sld xmlns:a="http://schemas.openxmlformats.org/drawingml/2006/main" xmlns:r="http://schemas.openxmlformats.org/officeDocument/2006/relationships" xmlns:p="http://schemas.openxmlformats.org/presentationml/2006/main">
+  <p:cSld>
+    <p:spTree>
+      <p:nvGrpSpPr>
+        <p:cNvPr id="1" name=""/>
+        <p:cNvGrpSpPr/>
+        <p:nvPr/>
+      </p:nvGrpSpPr>
+      <p:grpSpPr>
+        <a:xfrm>
+          <a:off x="0" y="0"/>
+          <a:ext cx="0" cy="0"/>
+          <a:chOff x="0" y="0"/>
+          <a:chExt cx="0" cy="0"/>
+        </a:xfrm>
+      </p:grpSpPr>
+      <p:sp>
+        <p:nvSpPr>
+          <p:cNvPr id="6" name="Title 1"/>
+          <p:cNvSpPr>
+            <a:spLocks noGrp="1"/>
+          </p:cNvSpPr>
+          <p:nvPr>
+            <p:ph type="title"/>
+          </p:nvPr>
+        </p:nvSpPr>
+        <p:spPr>
+          <a:xfrm>
+            <a:off x="457200" y="205980"/>
+            <a:ext cx="8229600" cy="857251"/>
+          </a:xfrm>
+        </p:spPr>
+        <p:txBody>
+          <a:bodyPr>
+            <a:normAutofit/>
+          </a:bodyPr>
+          <a:lstStyle/>
+          <a:p>
+            <a:r>
+              <a:rPr lang="en-US" b="1" dirty="0" err="1">
+                <a:solidFill>
+                  <a:srgbClr val="0070C0"/>
+                </a:solidFill>
+              </a:rPr>
+              <a:t>Dinâmica</a:t>
+            </a:r>
+            <a:r>
+              <a:rPr lang="en-US" b="1" dirty="0">
+                <a:solidFill>
+                  <a:srgbClr val="0070C0"/>
+                </a:solidFill>
+              </a:rPr>
+              <a:t>/</a:t>
+            </a:r>
+            <a:r>
+              <a:rPr lang="en-US" b="1" dirty="0" err="1">
+                <a:solidFill>
+                  <a:srgbClr val="0070C0"/>
+                </a:solidFill>
+              </a:rPr>
+              <a:t>Atividades</a:t>
+            </a:r>
+            <a:r>
+              <a:rPr lang="en-US" b="1" dirty="0">
+                <a:solidFill>
+                  <a:srgbClr val="0070C0"/>
+                </a:solidFill>
+              </a:rPr>
+              <a:t> - </a:t>
+            </a:r>
+            <a:r>
+              <a:rPr lang="en-US" b="1" dirty="0" err="1">
+                <a:solidFill>
+                  <a:srgbClr val="0070C0"/>
+                </a:solidFill>
+              </a:rPr>
+              <a:t>Exercícios</a:t>
+            </a:r>
+            <a:endParaRPr lang="en-US" b="1" dirty="0">
+              <a:solidFill>
+                <a:srgbClr val="0070C0"/>
+              </a:solidFill>
+            </a:endParaRPr>
+          </a:p>
+        </p:txBody>
+      </p:sp>
+      <p:sp>
+        <p:nvSpPr>
+          <p:cNvPr id="8" name="Text Placeholder 2"/>
+          <p:cNvSpPr>
+            <a:spLocks noGrp="1"/>
+          </p:cNvSpPr>
+          <p:nvPr>
+            <p:ph type="body" sz="half" idx="1"/>
+          </p:nvPr>
+        </p:nvSpPr>
+        <p:spPr>
+          <a:xfrm>
+            <a:off x="139472" y="1063230"/>
+            <a:ext cx="8865056" cy="3996450"/>
+          </a:xfrm>
+        </p:spPr>
+        <p:txBody>
+          <a:bodyPr>
+            <a:noAutofit/>
+          </a:bodyPr>
+          <a:lstStyle/>
+          <a:p>
+            <a:pPr marL="0" indent="0" algn="just">
+              <a:buNone/>
+            </a:pPr>
+            <a:r>
+              <a:rPr lang="pt-BR" sz="2400" b="1" dirty="0">
+                <a:latin typeface="Times New Roman" panose="02020603050405020304" pitchFamily="18" charset="0"/>
+                <a:cs typeface="Times New Roman" panose="02020603050405020304" pitchFamily="18" charset="0"/>
+              </a:rPr>
+              <a:t>-- Ambiente </a:t>
+            </a:r>
+            <a:r>
+              <a:rPr lang="pt-BR" sz="2400" b="1" dirty="0" err="1">
+                <a:latin typeface="Times New Roman" panose="02020603050405020304" pitchFamily="18" charset="0"/>
+                <a:cs typeface="Times New Roman" panose="02020603050405020304" pitchFamily="18" charset="0"/>
+              </a:rPr>
+              <a:t>Dev</a:t>
+            </a:r>
+            <a:r>
+              <a:rPr lang="pt-BR" sz="2400" b="1" dirty="0">
+                <a:latin typeface="Times New Roman" panose="02020603050405020304" pitchFamily="18" charset="0"/>
+                <a:cs typeface="Times New Roman" panose="02020603050405020304" pitchFamily="18" charset="0"/>
+              </a:rPr>
+              <a:t> Python; </a:t>
+            </a:r>
+            <a:r>
+              <a:rPr lang="pt-BR" sz="2400" b="1" dirty="0">
+                <a:solidFill>
+                  <a:srgbClr val="FF0000"/>
+                </a:solidFill>
+                <a:latin typeface="Times New Roman" panose="02020603050405020304" pitchFamily="18" charset="0"/>
+                <a:cs typeface="Times New Roman" panose="02020603050405020304" pitchFamily="18" charset="0"/>
+              </a:rPr>
+              <a:t>VM com um simulador </a:t>
+            </a:r>
+            <a:r>
+              <a:rPr lang="pt-BR" sz="2400" b="1" dirty="0" err="1">
+                <a:solidFill>
+                  <a:srgbClr val="FF0000"/>
+                </a:solidFill>
+                <a:latin typeface="Times New Roman" panose="02020603050405020304" pitchFamily="18" charset="0"/>
+                <a:cs typeface="Times New Roman" panose="02020603050405020304" pitchFamily="18" charset="0"/>
+              </a:rPr>
+              <a:t>Raspberry</a:t>
+            </a:r>
+            <a:r>
+              <a:rPr lang="pt-BR" sz="2400" b="1" dirty="0">
+                <a:solidFill>
+                  <a:srgbClr val="FF0000"/>
+                </a:solidFill>
+                <a:latin typeface="Times New Roman" panose="02020603050405020304" pitchFamily="18" charset="0"/>
+                <a:cs typeface="Times New Roman" panose="02020603050405020304" pitchFamily="18" charset="0"/>
+              </a:rPr>
+              <a:t> OS Pi</a:t>
+            </a:r>
+          </a:p>
+          <a:p>
+            <a:pPr marL="514350" indent="-514350" algn="just">
+              <a:buAutoNum type="arabicPeriod"/>
+            </a:pPr>
+            <a:r>
+              <a:rPr lang="pt-BR" sz="2400" dirty="0">
+                <a:latin typeface="Times New Roman" panose="02020603050405020304" pitchFamily="18" charset="0"/>
+                <a:cs typeface="Times New Roman" panose="02020603050405020304" pitchFamily="18" charset="0"/>
+                <a:hlinkClick r:id="rId3"/>
+              </a:rPr>
+              <a:t>https://thonny.org/</a:t>
+            </a:r>
+            <a:endParaRPr lang="pt-BR" sz="2400" dirty="0">
+              <a:latin typeface="Times New Roman" panose="02020603050405020304" pitchFamily="18" charset="0"/>
+              <a:cs typeface="Times New Roman" panose="02020603050405020304" pitchFamily="18" charset="0"/>
+            </a:endParaRPr>
+          </a:p>
+          <a:p>
+            <a:pPr marL="514350" indent="-514350" algn="just">
+              <a:buAutoNum type="arabicPeriod"/>
+            </a:pPr>
+            <a:r>
+              <a:rPr lang="pt-BR" sz="2400" dirty="0">
+                <a:latin typeface="Times New Roman" panose="02020603050405020304" pitchFamily="18" charset="0"/>
+                <a:cs typeface="Times New Roman" panose="02020603050405020304" pitchFamily="18" charset="0"/>
+                <a:hlinkClick r:id="rId4"/>
+              </a:rPr>
+              <a:t>https://www.raspberrypi.com/software/</a:t>
+            </a:r>
+            <a:endParaRPr lang="pt-BR" sz="2400" dirty="0">
+              <a:latin typeface="Times New Roman" panose="02020603050405020304" pitchFamily="18" charset="0"/>
+              <a:cs typeface="Times New Roman" panose="02020603050405020304" pitchFamily="18" charset="0"/>
+            </a:endParaRPr>
+          </a:p>
+          <a:p>
+            <a:pPr marL="514350" indent="-514350" algn="just">
+              <a:buAutoNum type="arabicPeriod"/>
+            </a:pPr>
+            <a:r>
+              <a:rPr lang="pt-BR" sz="2400" dirty="0">
+                <a:latin typeface="Times New Roman" panose="02020603050405020304" pitchFamily="18" charset="0"/>
+                <a:cs typeface="Times New Roman" panose="02020603050405020304" pitchFamily="18" charset="0"/>
+                <a:hlinkClick r:id="rId5"/>
+              </a:rPr>
+              <a:t>https://sourceforge.net/projects/simus/</a:t>
+            </a:r>
+            <a:r>
+              <a:rPr lang="pt-BR" sz="2400" dirty="0">
+                <a:latin typeface="Times New Roman" panose="02020603050405020304" pitchFamily="18" charset="0"/>
+                <a:cs typeface="Times New Roman" panose="02020603050405020304" pitchFamily="18" charset="0"/>
+              </a:rPr>
+              <a:t> </a:t>
+            </a:r>
+            <a:r>
+              <a:rPr lang="pt-BR" sz="2400" b="1" dirty="0">
+                <a:latin typeface="Times New Roman" panose="02020603050405020304" pitchFamily="18" charset="0"/>
+                <a:cs typeface="Times New Roman" panose="02020603050405020304" pitchFamily="18" charset="0"/>
+              </a:rPr>
+              <a:t>(</a:t>
+            </a:r>
+            <a:r>
+              <a:rPr lang="pt-BR" sz="2400" b="1" dirty="0" err="1">
+                <a:latin typeface="Times New Roman" panose="02020603050405020304" pitchFamily="18" charset="0"/>
+                <a:cs typeface="Times New Roman" panose="02020603050405020304" pitchFamily="18" charset="0"/>
+              </a:rPr>
+              <a:t>ObjectPascal</a:t>
+            </a:r>
+            <a:r>
+              <a:rPr lang="pt-BR" sz="2400" b="1" dirty="0">
+                <a:latin typeface="Times New Roman" panose="02020603050405020304" pitchFamily="18" charset="0"/>
+                <a:cs typeface="Times New Roman" panose="02020603050405020304" pitchFamily="18" charset="0"/>
+              </a:rPr>
+              <a:t>)</a:t>
+            </a:r>
+            <a:endParaRPr lang="pt-BR" sz="2400" dirty="0">
+              <a:latin typeface="Times New Roman" panose="02020603050405020304" pitchFamily="18" charset="0"/>
+              <a:cs typeface="Times New Roman" panose="02020603050405020304" pitchFamily="18" charset="0"/>
+            </a:endParaRPr>
+          </a:p>
+          <a:p>
+            <a:pPr marL="0" indent="0" algn="just">
+              <a:buNone/>
+            </a:pPr>
+            <a:endParaRPr lang="pt-BR" sz="2400" dirty="0">
+              <a:latin typeface="Times New Roman" panose="02020603050405020304" pitchFamily="18" charset="0"/>
+              <a:cs typeface="Times New Roman" panose="02020603050405020304" pitchFamily="18" charset="0"/>
+            </a:endParaRPr>
+          </a:p>
+          <a:p>
+            <a:pPr marL="0" indent="0" algn="just">
+              <a:buNone/>
+            </a:pPr>
+            <a:r>
+              <a:rPr lang="pt-BR" sz="2400" b="1" dirty="0">
+                <a:latin typeface="Times New Roman" panose="02020603050405020304" pitchFamily="18" charset="0"/>
+                <a:cs typeface="Times New Roman" panose="02020603050405020304" pitchFamily="18" charset="0"/>
+              </a:rPr>
+              <a:t>-- Criar um mapa conceitual</a:t>
+            </a:r>
+            <a:endParaRPr lang="pt-BR" sz="2400" dirty="0">
+              <a:latin typeface="Times New Roman" panose="02020603050405020304" pitchFamily="18" charset="0"/>
+              <a:cs typeface="Times New Roman" panose="02020603050405020304" pitchFamily="18" charset="0"/>
+            </a:endParaRPr>
+          </a:p>
+          <a:p>
+            <a:pPr marL="0" indent="0" algn="just">
+              <a:buNone/>
+            </a:pPr>
+            <a:r>
+              <a:rPr lang="pt-BR" sz="2400" dirty="0">
+                <a:latin typeface="Times New Roman" panose="02020603050405020304" pitchFamily="18" charset="0"/>
+                <a:cs typeface="Times New Roman" panose="02020603050405020304" pitchFamily="18" charset="0"/>
+              </a:rPr>
+              <a:t> </a:t>
+            </a:r>
+            <a:r>
+              <a:rPr lang="pt-BR" sz="2400" b="1" dirty="0">
+                <a:solidFill>
+                  <a:srgbClr val="FF0000"/>
+                </a:solidFill>
+                <a:latin typeface="Times New Roman" panose="02020603050405020304" pitchFamily="18" charset="0"/>
+                <a:cs typeface="Times New Roman" panose="02020603050405020304" pitchFamily="18" charset="0"/>
+              </a:rPr>
+              <a:t>Arduino Uno R3 </a:t>
+            </a:r>
+            <a:r>
+              <a:rPr lang="pt-BR" sz="2400" b="1" dirty="0" err="1">
+                <a:solidFill>
+                  <a:srgbClr val="FF0000"/>
+                </a:solidFill>
+                <a:latin typeface="Times New Roman" panose="02020603050405020304" pitchFamily="18" charset="0"/>
+                <a:cs typeface="Times New Roman" panose="02020603050405020304" pitchFamily="18" charset="0"/>
+              </a:rPr>
+              <a:t>vs</a:t>
+            </a:r>
+            <a:r>
+              <a:rPr lang="pt-BR" sz="2400" b="1" dirty="0">
+                <a:solidFill>
+                  <a:srgbClr val="FF0000"/>
+                </a:solidFill>
+                <a:latin typeface="Times New Roman" panose="02020603050405020304" pitchFamily="18" charset="0"/>
+                <a:cs typeface="Times New Roman" panose="02020603050405020304" pitchFamily="18" charset="0"/>
+              </a:rPr>
+              <a:t> </a:t>
+            </a:r>
+            <a:r>
+              <a:rPr lang="pt-BR" sz="2400" b="1" dirty="0" err="1">
+                <a:solidFill>
+                  <a:schemeClr val="tx1"/>
+                </a:solidFill>
+                <a:latin typeface="Times New Roman" panose="02020603050405020304" pitchFamily="18" charset="0"/>
+                <a:cs typeface="Times New Roman" panose="02020603050405020304" pitchFamily="18" charset="0"/>
+              </a:rPr>
+              <a:t>NodeMCU</a:t>
+            </a:r>
+            <a:r>
+              <a:rPr lang="pt-BR" sz="2400" b="1" dirty="0">
+                <a:solidFill>
+                  <a:srgbClr val="FF0000"/>
+                </a:solidFill>
+                <a:latin typeface="Times New Roman" panose="02020603050405020304" pitchFamily="18" charset="0"/>
+                <a:cs typeface="Times New Roman" panose="02020603050405020304" pitchFamily="18" charset="0"/>
+              </a:rPr>
+              <a:t> </a:t>
+            </a:r>
+            <a:r>
+              <a:rPr lang="pt-BR" sz="2400" b="1" dirty="0" err="1">
+                <a:solidFill>
+                  <a:srgbClr val="FF0000"/>
+                </a:solidFill>
+                <a:latin typeface="Times New Roman" panose="02020603050405020304" pitchFamily="18" charset="0"/>
+                <a:cs typeface="Times New Roman" panose="02020603050405020304" pitchFamily="18" charset="0"/>
+              </a:rPr>
+              <a:t>vs</a:t>
+            </a:r>
+            <a:r>
+              <a:rPr lang="pt-BR" sz="2400" b="1" dirty="0">
+                <a:solidFill>
+                  <a:srgbClr val="FF0000"/>
+                </a:solidFill>
+                <a:latin typeface="Times New Roman" panose="02020603050405020304" pitchFamily="18" charset="0"/>
+                <a:cs typeface="Times New Roman" panose="02020603050405020304" pitchFamily="18" charset="0"/>
+              </a:rPr>
+              <a:t> </a:t>
+            </a:r>
+            <a:r>
+              <a:rPr lang="pt-BR" sz="2400" b="1" dirty="0" err="1">
+                <a:solidFill>
+                  <a:srgbClr val="FF0000"/>
+                </a:solidFill>
+                <a:latin typeface="Times New Roman" panose="02020603050405020304" pitchFamily="18" charset="0"/>
+                <a:cs typeface="Times New Roman" panose="02020603050405020304" pitchFamily="18" charset="0"/>
+              </a:rPr>
+              <a:t>Raspberry</a:t>
+            </a:r>
+            <a:r>
+              <a:rPr lang="pt-BR" sz="2400" b="1" dirty="0">
+                <a:solidFill>
+                  <a:srgbClr val="FF0000"/>
+                </a:solidFill>
+                <a:latin typeface="Times New Roman" panose="02020603050405020304" pitchFamily="18" charset="0"/>
+                <a:cs typeface="Times New Roman" panose="02020603050405020304" pitchFamily="18" charset="0"/>
+              </a:rPr>
+              <a:t> Pi 4</a:t>
+            </a:r>
+            <a:r>
+              <a:rPr lang="pt-BR" sz="2400" dirty="0">
+                <a:solidFill>
+                  <a:schemeClr val="tx1"/>
+                </a:solidFill>
+                <a:latin typeface="Times New Roman" panose="02020603050405020304" pitchFamily="18" charset="0"/>
+                <a:cs typeface="Times New Roman" panose="02020603050405020304" pitchFamily="18" charset="0"/>
+              </a:rPr>
+              <a:t>.</a:t>
+            </a:r>
+          </a:p>
+          <a:p>
+            <a:pPr marL="0" indent="0" algn="just">
+              <a:buNone/>
+            </a:pPr>
+            <a:endParaRPr lang="pt-BR" sz="2400" dirty="0">
+              <a:latin typeface="Times New Roman" panose="02020603050405020304" pitchFamily="18" charset="0"/>
+              <a:cs typeface="Times New Roman" panose="02020603050405020304" pitchFamily="18" charset="0"/>
+            </a:endParaRPr>
+          </a:p>
+          <a:p>
+            <a:pPr marL="0" indent="0" algn="just">
+              <a:buNone/>
+            </a:pPr>
+            <a:r>
+              <a:rPr lang="pt-BR" sz="2400" dirty="0">
+                <a:latin typeface="Times New Roman" panose="02020603050405020304" pitchFamily="18" charset="0"/>
+                <a:cs typeface="Times New Roman" panose="02020603050405020304" pitchFamily="18" charset="0"/>
+              </a:rPr>
+              <a:t>-- </a:t>
+            </a:r>
+            <a:r>
+              <a:rPr lang="pt-BR" sz="2400" b="1" dirty="0">
+                <a:latin typeface="Times New Roman" panose="02020603050405020304" pitchFamily="18" charset="0"/>
+                <a:cs typeface="Times New Roman" panose="02020603050405020304" pitchFamily="18" charset="0"/>
+              </a:rPr>
+              <a:t>Comunidade: </a:t>
+            </a:r>
+            <a:r>
+              <a:rPr lang="pt-BR" sz="2400" dirty="0">
+                <a:latin typeface="Times New Roman" panose="02020603050405020304" pitchFamily="18" charset="0"/>
+                <a:cs typeface="Times New Roman" panose="02020603050405020304" pitchFamily="18" charset="0"/>
+                <a:hlinkClick r:id="rId6"/>
+              </a:rPr>
+              <a:t>https://www.banana-pi.org/</a:t>
+            </a:r>
+            <a:endParaRPr lang="pt-BR" sz="2400" dirty="0">
+              <a:latin typeface="Times New Roman" panose="02020603050405020304" pitchFamily="18" charset="0"/>
+              <a:cs typeface="Times New Roman" panose="02020603050405020304" pitchFamily="18" charset="0"/>
+            </a:endParaRPr>
+          </a:p>
+        </p:txBody>
+      </p:sp>
+    </p:spTree>
+    <p:extLst>
+      <p:ext uri="{BB962C8B-B14F-4D97-AF65-F5344CB8AC3E}">
+        <p14:creationId xmlns:p14="http://schemas.microsoft.com/office/powerpoint/2010/main" val="2470652989"/>
+      </p:ext>
+    </p:extLst>
+  </p:cSld>
+  <p:clrMapOvr>
+    <a:masterClrMapping/>
+  </p:clrMapOvr>
+  <p:transition spd="med"/>
+</p:sld>
+</file>
+
+<file path=ppt/slides/slide26.xml><?xml version="1.0" encoding="utf-8"?>
+<p:sld xmlns:a="http://schemas.openxmlformats.org/drawingml/2006/main" xmlns:r="http://schemas.openxmlformats.org/officeDocument/2006/relationships" xmlns:p="http://schemas.openxmlformats.org/presentationml/2006/main">
+  <p:cSld>
+    <p:spTree>
+      <p:nvGrpSpPr>
+        <p:cNvPr id="1" name=""/>
+        <p:cNvGrpSpPr/>
+        <p:nvPr/>
+      </p:nvGrpSpPr>
+      <p:grpSpPr>
+        <a:xfrm>
+          <a:off x="0" y="0"/>
+          <a:ext cx="0" cy="0"/>
+          <a:chOff x="0" y="0"/>
+          <a:chExt cx="0" cy="0"/>
+        </a:xfrm>
+      </p:grpSpPr>
+      <p:sp>
+        <p:nvSpPr>
+          <p:cNvPr id="6" name="Title 1"/>
+          <p:cNvSpPr>
+            <a:spLocks noGrp="1"/>
+          </p:cNvSpPr>
+          <p:nvPr>
+            <p:ph type="title"/>
+          </p:nvPr>
+        </p:nvSpPr>
+        <p:spPr>
+          <a:xfrm>
+            <a:off x="457200" y="205980"/>
+            <a:ext cx="8229600" cy="857251"/>
+          </a:xfrm>
+        </p:spPr>
+        <p:txBody>
+          <a:bodyPr>
+            <a:normAutofit/>
+          </a:bodyPr>
+          <a:lstStyle/>
+          <a:p>
+            <a:r>
               <a:rPr lang="en-US" b="1" dirty="0" err="1">
                 <a:solidFill>
                   <a:srgbClr val="0070C0"/>
@@ -9268,7 +11322,7 @@
 </p:sld>
 </file>
 
-<file path=ppt/slides/slide22.xml><?xml version="1.0" encoding="utf-8"?>
+<file path=ppt/slides/slide27.xml><?xml version="1.0" encoding="utf-8"?>
 <p:sld xmlns:a="http://schemas.openxmlformats.org/drawingml/2006/main" xmlns:r="http://schemas.openxmlformats.org/officeDocument/2006/relationships" xmlns:p="http://schemas.openxmlformats.org/presentationml/2006/main">
   <p:cSld>
     <p:spTree>
@@ -10969,8 +13023,8 @@
         </p:nvSpPr>
         <p:spPr>
           <a:xfrm>
-            <a:off x="142865" y="1200150"/>
-            <a:ext cx="8865056" cy="3653296"/>
+            <a:off x="142865" y="1029462"/>
+            <a:ext cx="8865056" cy="3956826"/>
           </a:xfrm>
         </p:spPr>
         <p:txBody>
@@ -11050,6 +13104,270 @@
             <a:pPr marL="0" indent="0" algn="just">
               <a:buNone/>
             </a:pPr>
+            <a:r>
+              <a:rPr lang="pt-BR" sz="2000" b="1" dirty="0">
+                <a:solidFill>
+                  <a:schemeClr val="tx1"/>
+                </a:solidFill>
+                <a:latin typeface="Times New Roman" panose="02020603050405020304" pitchFamily="18" charset="0"/>
+                <a:cs typeface="Times New Roman" panose="02020603050405020304" pitchFamily="18" charset="0"/>
+              </a:rPr>
+              <a:t>Site: </a:t>
+            </a:r>
+            <a:r>
+              <a:rPr lang="pt-BR" sz="2000" b="1" dirty="0" err="1">
+                <a:solidFill>
+                  <a:schemeClr val="tx1"/>
+                </a:solidFill>
+                <a:latin typeface="Times New Roman" panose="02020603050405020304" pitchFamily="18" charset="0"/>
+                <a:cs typeface="Times New Roman" panose="02020603050405020304" pitchFamily="18" charset="0"/>
+              </a:rPr>
+              <a:t>Aliexpress</a:t>
+            </a:r>
+            <a:r>
+              <a:rPr lang="pt-BR" sz="2000" b="1" dirty="0">
+                <a:solidFill>
+                  <a:schemeClr val="tx1"/>
+                </a:solidFill>
+                <a:latin typeface="Times New Roman" panose="02020603050405020304" pitchFamily="18" charset="0"/>
+                <a:cs typeface="Times New Roman" panose="02020603050405020304" pitchFamily="18" charset="0"/>
+              </a:rPr>
+              <a:t> </a:t>
+            </a:r>
+            <a:r>
+              <a:rPr lang="pt-BR" sz="2000" b="1" dirty="0" err="1">
+                <a:solidFill>
+                  <a:schemeClr val="tx1"/>
+                </a:solidFill>
+                <a:latin typeface="Times New Roman" panose="02020603050405020304" pitchFamily="18" charset="0"/>
+                <a:cs typeface="Times New Roman" panose="02020603050405020304" pitchFamily="18" charset="0"/>
+              </a:rPr>
+              <a:t>raspberry</a:t>
+            </a:r>
+            <a:r>
+              <a:rPr lang="pt-BR" sz="2000" b="1" dirty="0">
+                <a:solidFill>
+                  <a:schemeClr val="tx1"/>
+                </a:solidFill>
+                <a:latin typeface="Times New Roman" panose="02020603050405020304" pitchFamily="18" charset="0"/>
+                <a:cs typeface="Times New Roman" panose="02020603050405020304" pitchFamily="18" charset="0"/>
+              </a:rPr>
+              <a:t> pi 4</a:t>
+            </a:r>
+          </a:p>
+          <a:p>
+            <a:pPr marL="0" indent="0" algn="just">
+              <a:buNone/>
+            </a:pPr>
+            <a:r>
+              <a:rPr lang="pt-BR" sz="2000" dirty="0">
+                <a:solidFill>
+                  <a:schemeClr val="tx1"/>
+                </a:solidFill>
+                <a:latin typeface="Times New Roman" panose="02020603050405020304" pitchFamily="18" charset="0"/>
+                <a:cs typeface="Times New Roman" panose="02020603050405020304" pitchFamily="18" charset="0"/>
+              </a:rPr>
+              <a:t>		</a:t>
+            </a:r>
+            <a:r>
+              <a:rPr lang="pt-BR" sz="2000" b="1" dirty="0">
+                <a:solidFill>
+                  <a:schemeClr val="tx1"/>
+                </a:solidFill>
+                <a:latin typeface="Times New Roman" panose="02020603050405020304" pitchFamily="18" charset="0"/>
+                <a:cs typeface="Times New Roman" panose="02020603050405020304" pitchFamily="18" charset="0"/>
+              </a:rPr>
+              <a:t>Loja</a:t>
+            </a:r>
+            <a:r>
+              <a:rPr lang="pt-BR" sz="2000" dirty="0">
+                <a:solidFill>
+                  <a:schemeClr val="tx1"/>
+                </a:solidFill>
+                <a:latin typeface="Times New Roman" panose="02020603050405020304" pitchFamily="18" charset="0"/>
+                <a:cs typeface="Times New Roman" panose="02020603050405020304" pitchFamily="18" charset="0"/>
+              </a:rPr>
+              <a:t>: </a:t>
+            </a:r>
+            <a:r>
+              <a:rPr lang="pt-BR" sz="2000" dirty="0" err="1">
+                <a:solidFill>
+                  <a:schemeClr val="tx1"/>
+                </a:solidFill>
+                <a:latin typeface="Times New Roman" panose="02020603050405020304" pitchFamily="18" charset="0"/>
+                <a:cs typeface="Times New Roman" panose="02020603050405020304" pitchFamily="18" charset="0"/>
+              </a:rPr>
+              <a:t>Stutu</a:t>
+            </a:r>
+            <a:r>
+              <a:rPr lang="pt-BR" sz="2000" dirty="0">
+                <a:solidFill>
+                  <a:schemeClr val="tx1"/>
+                </a:solidFill>
+                <a:latin typeface="Times New Roman" panose="02020603050405020304" pitchFamily="18" charset="0"/>
+                <a:cs typeface="Times New Roman" panose="02020603050405020304" pitchFamily="18" charset="0"/>
+              </a:rPr>
+              <a:t> Store, por exemplo: 4GB RAM, </a:t>
+            </a:r>
+            <a:r>
+              <a:rPr lang="pt-BR" sz="2000" b="1" dirty="0">
+                <a:solidFill>
+                  <a:srgbClr val="FF0000"/>
+                </a:solidFill>
+                <a:latin typeface="Times New Roman" panose="02020603050405020304" pitchFamily="18" charset="0"/>
+                <a:cs typeface="Times New Roman" panose="02020603050405020304" pitchFamily="18" charset="0"/>
+              </a:rPr>
+              <a:t>&lt;=&gt; </a:t>
+            </a:r>
+            <a:r>
+              <a:rPr lang="pt-BR" sz="2000" b="1" dirty="0">
+                <a:solidFill>
+                  <a:schemeClr val="tx1"/>
+                </a:solidFill>
+                <a:latin typeface="Times New Roman" panose="02020603050405020304" pitchFamily="18" charset="0"/>
+                <a:cs typeface="Times New Roman" panose="02020603050405020304" pitchFamily="18" charset="0"/>
+              </a:rPr>
+              <a:t>$210</a:t>
+            </a:r>
+          </a:p>
+          <a:p>
+            <a:pPr marL="0" indent="0" algn="just">
+              <a:buNone/>
+            </a:pPr>
+            <a:r>
+              <a:rPr lang="pt-BR" sz="2000" b="1" dirty="0">
+                <a:solidFill>
+                  <a:schemeClr val="tx1"/>
+                </a:solidFill>
+                <a:latin typeface="Times New Roman" panose="02020603050405020304" pitchFamily="18" charset="0"/>
+                <a:cs typeface="Times New Roman" panose="02020603050405020304" pitchFamily="18" charset="0"/>
+              </a:rPr>
+              <a:t>Site: Mercado Livre</a:t>
+            </a:r>
+          </a:p>
+          <a:p>
+            <a:pPr marL="0" indent="0" algn="just">
+              <a:buNone/>
+            </a:pPr>
+            <a:r>
+              <a:rPr lang="pt-BR" sz="2000" b="1" dirty="0">
+                <a:solidFill>
+                  <a:schemeClr val="tx1"/>
+                </a:solidFill>
+                <a:latin typeface="Times New Roman" panose="02020603050405020304" pitchFamily="18" charset="0"/>
+                <a:cs typeface="Times New Roman" panose="02020603050405020304" pitchFamily="18" charset="0"/>
+              </a:rPr>
+              <a:t>		</a:t>
+            </a:r>
+            <a:r>
+              <a:rPr lang="pt-BR" sz="2000" dirty="0">
+                <a:solidFill>
+                  <a:schemeClr val="tx1"/>
+                </a:solidFill>
+                <a:latin typeface="Times New Roman" panose="02020603050405020304" pitchFamily="18" charset="0"/>
+                <a:cs typeface="Times New Roman" panose="02020603050405020304" pitchFamily="18" charset="0"/>
+                <a:hlinkClick r:id="rId4"/>
+              </a:rPr>
+              <a:t>https://www.mercadolivre.com.br/</a:t>
+            </a:r>
+            <a:r>
+              <a:rPr lang="pt-BR" sz="2000" dirty="0">
+                <a:solidFill>
+                  <a:schemeClr val="tx1"/>
+                </a:solidFill>
+                <a:latin typeface="Times New Roman" panose="02020603050405020304" pitchFamily="18" charset="0"/>
+                <a:cs typeface="Times New Roman" panose="02020603050405020304" pitchFamily="18" charset="0"/>
+              </a:rPr>
+              <a:t>   - </a:t>
+            </a:r>
+            <a:r>
+              <a:rPr lang="pt-BR" sz="2000" b="1" dirty="0" err="1">
+                <a:solidFill>
+                  <a:srgbClr val="FF0000"/>
+                </a:solidFill>
+                <a:latin typeface="Times New Roman" panose="02020603050405020304" pitchFamily="18" charset="0"/>
+                <a:cs typeface="Times New Roman" panose="02020603050405020304" pitchFamily="18" charset="0"/>
+              </a:rPr>
+              <a:t>apx</a:t>
+            </a:r>
+            <a:r>
+              <a:rPr lang="pt-BR" sz="2000" b="1" dirty="0">
+                <a:solidFill>
+                  <a:srgbClr val="FF0000"/>
+                </a:solidFill>
+                <a:latin typeface="Times New Roman" panose="02020603050405020304" pitchFamily="18" charset="0"/>
+                <a:cs typeface="Times New Roman" panose="02020603050405020304" pitchFamily="18" charset="0"/>
+              </a:rPr>
+              <a:t> R$550,00 + frete</a:t>
+            </a:r>
+            <a:endParaRPr lang="pt-BR" sz="2000" b="1" dirty="0">
+              <a:solidFill>
+                <a:schemeClr val="tx1"/>
+              </a:solidFill>
+              <a:latin typeface="Times New Roman" panose="02020603050405020304" pitchFamily="18" charset="0"/>
+              <a:cs typeface="Times New Roman" panose="02020603050405020304" pitchFamily="18" charset="0"/>
+            </a:endParaRPr>
+          </a:p>
+          <a:p>
+            <a:pPr marL="0" indent="0" algn="just">
+              <a:buNone/>
+            </a:pPr>
+            <a:r>
+              <a:rPr lang="pt-BR" sz="2000" b="1" dirty="0">
+                <a:solidFill>
+                  <a:schemeClr val="tx1"/>
+                </a:solidFill>
+                <a:latin typeface="Times New Roman" panose="02020603050405020304" pitchFamily="18" charset="0"/>
+                <a:cs typeface="Times New Roman" panose="02020603050405020304" pitchFamily="18" charset="0"/>
+              </a:rPr>
+              <a:t>Site: Ebay (</a:t>
+            </a:r>
+            <a:r>
+              <a:rPr lang="pt-BR" sz="2000" b="1" dirty="0">
+                <a:solidFill>
+                  <a:srgbClr val="FF0000"/>
+                </a:solidFill>
+                <a:latin typeface="Times New Roman" panose="02020603050405020304" pitchFamily="18" charset="0"/>
+                <a:cs typeface="Times New Roman" panose="02020603050405020304" pitchFamily="18" charset="0"/>
+              </a:rPr>
+              <a:t>$209</a:t>
+            </a:r>
+            <a:r>
+              <a:rPr lang="pt-BR" sz="2000" b="1" dirty="0">
+                <a:solidFill>
+                  <a:schemeClr val="tx1"/>
+                </a:solidFill>
+                <a:latin typeface="Times New Roman" panose="02020603050405020304" pitchFamily="18" charset="0"/>
+                <a:cs typeface="Times New Roman" panose="02020603050405020304" pitchFamily="18" charset="0"/>
+              </a:rPr>
+              <a:t>)</a:t>
+            </a:r>
+          </a:p>
+          <a:p>
+            <a:pPr marL="0" indent="0" algn="just">
+              <a:buNone/>
+            </a:pPr>
+            <a:r>
+              <a:rPr lang="pt-BR" sz="2000" dirty="0">
+                <a:solidFill>
+                  <a:schemeClr val="tx1"/>
+                </a:solidFill>
+                <a:latin typeface="Times New Roman" panose="02020603050405020304" pitchFamily="18" charset="0"/>
+                <a:cs typeface="Times New Roman" panose="02020603050405020304" pitchFamily="18" charset="0"/>
+              </a:rPr>
+              <a:t>		 </a:t>
+            </a:r>
+            <a:r>
+              <a:rPr lang="pt-BR" sz="2000" dirty="0">
+                <a:solidFill>
+                  <a:schemeClr val="tx1"/>
+                </a:solidFill>
+                <a:latin typeface="Times New Roman" panose="02020603050405020304" pitchFamily="18" charset="0"/>
+                <a:cs typeface="Times New Roman" panose="02020603050405020304" pitchFamily="18" charset="0"/>
+                <a:hlinkClick r:id="rId5"/>
+              </a:rPr>
+              <a:t>https://www.ebay.com/</a:t>
+            </a:r>
             <a:endParaRPr lang="pt-BR" sz="2000" dirty="0">
               <a:solidFill>
                 <a:schemeClr val="tx1"/>
@@ -11070,47 +13388,7 @@
                 <a:latin typeface="Times New Roman" panose="02020603050405020304" pitchFamily="18" charset="0"/>
                 <a:cs typeface="Times New Roman" panose="02020603050405020304" pitchFamily="18" charset="0"/>
               </a:rPr>
-              <a:t>Site: </a:t>
-            </a:r>
-            <a:r>
-              <a:rPr lang="pt-BR" sz="2000" b="1" dirty="0" err="1">
-                <a:solidFill>
-                  <a:schemeClr val="tx1"/>
-                </a:solidFill>
-                <a:latin typeface="Times New Roman" panose="02020603050405020304" pitchFamily="18" charset="0"/>
-                <a:cs typeface="Times New Roman" panose="02020603050405020304" pitchFamily="18" charset="0"/>
-              </a:rPr>
-              <a:t>Aliexpress</a:t>
-            </a:r>
-            <a:r>
-              <a:rPr lang="pt-BR" sz="2000" b="1" dirty="0">
-                <a:solidFill>
-                  <a:schemeClr val="tx1"/>
-                </a:solidFill>
-                <a:latin typeface="Times New Roman" panose="02020603050405020304" pitchFamily="18" charset="0"/>
-                <a:cs typeface="Times New Roman" panose="02020603050405020304" pitchFamily="18" charset="0"/>
-              </a:rPr>
-              <a:t> </a:t>
-            </a:r>
-            <a:r>
-              <a:rPr lang="pt-BR" sz="2000" b="1" dirty="0" err="1">
-                <a:solidFill>
-                  <a:schemeClr val="tx1"/>
-                </a:solidFill>
-                <a:latin typeface="Times New Roman" panose="02020603050405020304" pitchFamily="18" charset="0"/>
-                <a:cs typeface="Times New Roman" panose="02020603050405020304" pitchFamily="18" charset="0"/>
-              </a:rPr>
-              <a:t>raspberry</a:t>
-            </a:r>
-            <a:r>
-              <a:rPr lang="pt-BR" sz="2000" b="1" dirty="0">
-                <a:solidFill>
-                  <a:schemeClr val="tx1"/>
-                </a:solidFill>
-                <a:latin typeface="Times New Roman" panose="02020603050405020304" pitchFamily="18" charset="0"/>
-                <a:cs typeface="Times New Roman" panose="02020603050405020304" pitchFamily="18" charset="0"/>
-              </a:rPr>
-              <a:t> pi 4</a:t>
+              <a:t>Site: AWS</a:t>
             </a:r>
           </a:p>
           <a:p>
@@ -11125,83 +13403,19 @@
                 <a:latin typeface="Times New Roman" panose="02020603050405020304" pitchFamily="18" charset="0"/>
                 <a:cs typeface="Times New Roman" panose="02020603050405020304" pitchFamily="18" charset="0"/>
               </a:rPr>
-              <a:t>		</a:t>
-            </a:r>
-            <a:r>
-              <a:rPr lang="pt-BR" sz="2000" b="1" dirty="0">
-                <a:solidFill>
-                  <a:schemeClr val="tx1"/>
-                </a:solidFill>
-                <a:latin typeface="Times New Roman" panose="02020603050405020304" pitchFamily="18" charset="0"/>
-                <a:cs typeface="Times New Roman" panose="02020603050405020304" pitchFamily="18" charset="0"/>
-              </a:rPr>
-              <a:t>Loja</a:t>
-            </a:r>
-            <a:r>
-              <a:rPr lang="pt-BR" sz="2000" dirty="0">
-                <a:solidFill>
-                  <a:schemeClr val="tx1"/>
-                </a:solidFill>
-                <a:latin typeface="Times New Roman" panose="02020603050405020304" pitchFamily="18" charset="0"/>
-                <a:cs typeface="Times New Roman" panose="02020603050405020304" pitchFamily="18" charset="0"/>
-              </a:rPr>
-              <a:t>: </a:t>
-            </a:r>
-            <a:r>
-              <a:rPr lang="pt-BR" sz="2000" dirty="0" err="1">
-                <a:solidFill>
-                  <a:schemeClr val="tx1"/>
-                </a:solidFill>
-                <a:latin typeface="Times New Roman" panose="02020603050405020304" pitchFamily="18" charset="0"/>
-                <a:cs typeface="Times New Roman" panose="02020603050405020304" pitchFamily="18" charset="0"/>
-              </a:rPr>
-              <a:t>Stutu</a:t>
-            </a:r>
-            <a:r>
-              <a:rPr lang="pt-BR" sz="2000" dirty="0">
-                <a:solidFill>
-                  <a:schemeClr val="tx1"/>
-                </a:solidFill>
-                <a:latin typeface="Times New Roman" panose="02020603050405020304" pitchFamily="18" charset="0"/>
-                <a:cs typeface="Times New Roman" panose="02020603050405020304" pitchFamily="18" charset="0"/>
-              </a:rPr>
-              <a:t> Store, por exemplo: 4GB RAM, </a:t>
-            </a:r>
-            <a:r>
-              <a:rPr lang="pt-BR" sz="2000" b="1" dirty="0" err="1">
-                <a:solidFill>
-                  <a:srgbClr val="FF0000"/>
-                </a:solidFill>
-                <a:latin typeface="Times New Roman" panose="02020603050405020304" pitchFamily="18" charset="0"/>
-                <a:cs typeface="Times New Roman" panose="02020603050405020304" pitchFamily="18" charset="0"/>
-              </a:rPr>
-              <a:t>apx</a:t>
-            </a:r>
-            <a:r>
-              <a:rPr lang="pt-BR" sz="2000" b="1" dirty="0">
-                <a:solidFill>
-                  <a:srgbClr val="FF0000"/>
-                </a:solidFill>
-                <a:latin typeface="Times New Roman" panose="02020603050405020304" pitchFamily="18" charset="0"/>
-                <a:cs typeface="Times New Roman" panose="02020603050405020304" pitchFamily="18" charset="0"/>
-              </a:rPr>
-              <a:t> R$280,00 &lt;=&gt; </a:t>
-            </a:r>
-            <a:r>
-              <a:rPr lang="pt-BR" sz="2000" b="1" dirty="0">
-                <a:solidFill>
-                  <a:schemeClr val="tx1"/>
-                </a:solidFill>
-                <a:latin typeface="Times New Roman" panose="02020603050405020304" pitchFamily="18" charset="0"/>
-                <a:cs typeface="Times New Roman" panose="02020603050405020304" pitchFamily="18" charset="0"/>
-              </a:rPr>
-              <a:t>$55</a:t>
-            </a:r>
-          </a:p>
-          <a:p>
-            <a:pPr marL="0" indent="0" algn="just">
-              <a:buNone/>
-            </a:pPr>
+              <a:t>		 </a:t>
+            </a:r>
+            <a:r>
+              <a:rPr lang="pt-BR" sz="2000" dirty="0">
+                <a:solidFill>
+                  <a:schemeClr val="tx1"/>
+                </a:solidFill>
+                <a:latin typeface="Times New Roman" panose="02020603050405020304" pitchFamily="18" charset="0"/>
+                <a:cs typeface="Times New Roman" panose="02020603050405020304" pitchFamily="18" charset="0"/>
+                <a:hlinkClick r:id="rId6"/>
+              </a:rPr>
+              <a:t>https://aws.amazon.com/pt/</a:t>
+            </a:r>
             <a:endParaRPr lang="pt-BR" sz="2000" dirty="0">
               <a:solidFill>
                 <a:schemeClr val="tx1"/>
@@ -11214,82 +13428,6 @@
             <a:pPr marL="0" indent="0" algn="just">
               <a:buNone/>
             </a:pPr>
-            <a:r>
-              <a:rPr lang="pt-BR" sz="2000" b="1" dirty="0">
-                <a:solidFill>
-                  <a:schemeClr val="tx1"/>
-                </a:solidFill>
-                <a:latin typeface="Times New Roman" panose="02020603050405020304" pitchFamily="18" charset="0"/>
-                <a:cs typeface="Times New Roman" panose="02020603050405020304" pitchFamily="18" charset="0"/>
-              </a:rPr>
-              <a:t>Site: Mercado Livre</a:t>
-            </a:r>
-          </a:p>
-          <a:p>
-            <a:pPr marL="0" indent="0" algn="just">
-              <a:buNone/>
-            </a:pPr>
-            <a:r>
-              <a:rPr lang="pt-BR" sz="2000" b="1" dirty="0">
-                <a:solidFill>
-                  <a:schemeClr val="tx1"/>
-                </a:solidFill>
-                <a:latin typeface="Times New Roman" panose="02020603050405020304" pitchFamily="18" charset="0"/>
-                <a:cs typeface="Times New Roman" panose="02020603050405020304" pitchFamily="18" charset="0"/>
-              </a:rPr>
-              <a:t>		</a:t>
-            </a:r>
-            <a:r>
-              <a:rPr lang="pt-BR" sz="2000" dirty="0">
-                <a:solidFill>
-                  <a:schemeClr val="tx1"/>
-                </a:solidFill>
-                <a:latin typeface="Times New Roman" panose="02020603050405020304" pitchFamily="18" charset="0"/>
-                <a:cs typeface="Times New Roman" panose="02020603050405020304" pitchFamily="18" charset="0"/>
-                <a:hlinkClick r:id="rId4"/>
-              </a:rPr>
-              <a:t>https://www.mercadolivre.com.br/</a:t>
-            </a:r>
-            <a:r>
-              <a:rPr lang="pt-BR" sz="2000" dirty="0">
-                <a:solidFill>
-                  <a:schemeClr val="tx1"/>
-                </a:solidFill>
-                <a:latin typeface="Times New Roman" panose="02020603050405020304" pitchFamily="18" charset="0"/>
-                <a:cs typeface="Times New Roman" panose="02020603050405020304" pitchFamily="18" charset="0"/>
-              </a:rPr>
-              <a:t>   - </a:t>
-            </a:r>
-            <a:r>
-              <a:rPr lang="pt-BR" sz="2000" b="1" dirty="0" err="1">
-                <a:solidFill>
-                  <a:srgbClr val="FF0000"/>
-                </a:solidFill>
-                <a:latin typeface="Times New Roman" panose="02020603050405020304" pitchFamily="18" charset="0"/>
-                <a:cs typeface="Times New Roman" panose="02020603050405020304" pitchFamily="18" charset="0"/>
-              </a:rPr>
-              <a:t>apx</a:t>
-            </a:r>
-            <a:r>
-              <a:rPr lang="pt-BR" sz="2000" b="1" dirty="0">
-                <a:solidFill>
-                  <a:srgbClr val="FF0000"/>
-                </a:solidFill>
-                <a:latin typeface="Times New Roman" panose="02020603050405020304" pitchFamily="18" charset="0"/>
-                <a:cs typeface="Times New Roman" panose="02020603050405020304" pitchFamily="18" charset="0"/>
-              </a:rPr>
-              <a:t> R$550,00 + frete &lt;=&gt; </a:t>
-            </a:r>
-            <a:r>
-              <a:rPr lang="pt-BR" sz="2000" b="1" dirty="0">
-                <a:solidFill>
-                  <a:schemeClr val="tx1"/>
-                </a:solidFill>
-                <a:latin typeface="Times New Roman" panose="02020603050405020304" pitchFamily="18" charset="0"/>
-                <a:cs typeface="Times New Roman" panose="02020603050405020304" pitchFamily="18" charset="0"/>
-              </a:rPr>
-              <a:t>$55</a:t>
-            </a:r>
             <a:endParaRPr lang="pt-BR" sz="2000" dirty="0">
               <a:solidFill>
                 <a:schemeClr val="tx1"/>
@@ -12705,7 +14843,27 @@
                 <a:latin typeface="Times New Roman" panose="02020603050405020304" pitchFamily="18" charset="0"/>
                 <a:cs typeface="Times New Roman" panose="02020603050405020304" pitchFamily="18" charset="0"/>
               </a:rPr>
-              <a:t>: (</a:t>
+              <a:t>: </a:t>
+            </a:r>
+            <a:r>
+              <a:rPr lang="pt-BR" sz="2000" b="1" dirty="0">
+                <a:solidFill>
+                  <a:srgbClr val="FF0000"/>
+                </a:solidFill>
+                <a:latin typeface="Times New Roman" panose="02020603050405020304" pitchFamily="18" charset="0"/>
+                <a:cs typeface="Times New Roman" panose="02020603050405020304" pitchFamily="18" charset="0"/>
+              </a:rPr>
+              <a:t>modelo antigo</a:t>
+            </a:r>
+            <a:r>
+              <a:rPr lang="pt-BR" sz="2000" dirty="0">
+                <a:solidFill>
+                  <a:schemeClr val="tx1"/>
+                </a:solidFill>
+                <a:latin typeface="Times New Roman" panose="02020603050405020304" pitchFamily="18" charset="0"/>
+                <a:cs typeface="Times New Roman" panose="02020603050405020304" pitchFamily="18" charset="0"/>
+              </a:rPr>
+              <a:t>(</a:t>
             </a:r>
             <a:r>
               <a:rPr lang="pt-BR" sz="2000" b="1" dirty="0">
@@ -12751,7 +14909,7 @@
                 <a:latin typeface="Times New Roman" panose="02020603050405020304" pitchFamily="18" charset="0"/>
                 <a:cs typeface="Times New Roman" panose="02020603050405020304" pitchFamily="18" charset="0"/>
               </a:rPr>
-              <a:t>: (</a:t>
+              <a:t>: </a:t>
             </a:r>
             <a:r>
               <a:rPr lang="pt-BR" sz="2000" b="1" dirty="0">
@@ -12761,6 +14919,26 @@
                 <a:latin typeface="Times New Roman" panose="02020603050405020304" pitchFamily="18" charset="0"/>
                 <a:cs typeface="Times New Roman" panose="02020603050405020304" pitchFamily="18" charset="0"/>
               </a:rPr>
+              <a:t>modelo novo</a:t>
+            </a:r>
+            <a:r>
+              <a:rPr lang="pt-BR" sz="2000" dirty="0">
+                <a:solidFill>
+                  <a:schemeClr val="tx1"/>
+                </a:solidFill>
+                <a:latin typeface="Times New Roman" panose="02020603050405020304" pitchFamily="18" charset="0"/>
+                <a:cs typeface="Times New Roman" panose="02020603050405020304" pitchFamily="18" charset="0"/>
+              </a:rPr>
+              <a:t>(</a:t>
+            </a:r>
+            <a:r>
+              <a:rPr lang="pt-BR" sz="2000" b="1" dirty="0">
+                <a:solidFill>
+                  <a:srgbClr val="FF0000"/>
+                </a:solidFill>
+                <a:latin typeface="Times New Roman" panose="02020603050405020304" pitchFamily="18" charset="0"/>
+                <a:cs typeface="Times New Roman" panose="02020603050405020304" pitchFamily="18" charset="0"/>
+              </a:rPr>
               <a:t>CPU/GPU</a:t>
             </a:r>
             <a:r>
@@ -12771,7 +14949,7 @@
                 <a:latin typeface="Times New Roman" panose="02020603050405020304" pitchFamily="18" charset="0"/>
                 <a:cs typeface="Times New Roman" panose="02020603050405020304" pitchFamily="18" charset="0"/>
               </a:rPr>
-              <a:t>) – 4cores; 64bits; 1.5GHz, ou superior; 1GB DDR4 RAM</a:t>
+              <a:t>) – 4cores; 64bits; 1.5GHz; DDR4 RAM</a:t>
             </a:r>
           </a:p>
           <a:p>

</xml_diff>